<commit_message>
Update HTML report section in DG
</commit_message>
<xml_diff>
--- a/docs/diagrams/report-summary.pptx
+++ b/docs/diagrams/report-summary.pptx
@@ -261,7 +261,7 @@
           <a:p>
             <a:fld id="{D5F4EE06-143D-4C2F-8831-1CDA21FFE47B}" type="datetimeFigureOut">
               <a:rPr lang="en-SG" smtClean="0"/>
-              <a:t>22/2/19</a:t>
+              <a:t>12/7/19</a:t>
             </a:fld>
             <a:endParaRPr lang="en-SG"/>
           </a:p>
@@ -461,7 +461,7 @@
           <a:p>
             <a:fld id="{D5F4EE06-143D-4C2F-8831-1CDA21FFE47B}" type="datetimeFigureOut">
               <a:rPr lang="en-SG" smtClean="0"/>
-              <a:t>22/2/19</a:t>
+              <a:t>12/7/19</a:t>
             </a:fld>
             <a:endParaRPr lang="en-SG"/>
           </a:p>
@@ -671,7 +671,7 @@
           <a:p>
             <a:fld id="{D5F4EE06-143D-4C2F-8831-1CDA21FFE47B}" type="datetimeFigureOut">
               <a:rPr lang="en-SG" smtClean="0"/>
-              <a:t>22/2/19</a:t>
+              <a:t>12/7/19</a:t>
             </a:fld>
             <a:endParaRPr lang="en-SG"/>
           </a:p>
@@ -871,7 +871,7 @@
           <a:p>
             <a:fld id="{D5F4EE06-143D-4C2F-8831-1CDA21FFE47B}" type="datetimeFigureOut">
               <a:rPr lang="en-SG" smtClean="0"/>
-              <a:t>22/2/19</a:t>
+              <a:t>12/7/19</a:t>
             </a:fld>
             <a:endParaRPr lang="en-SG"/>
           </a:p>
@@ -1147,7 +1147,7 @@
           <a:p>
             <a:fld id="{D5F4EE06-143D-4C2F-8831-1CDA21FFE47B}" type="datetimeFigureOut">
               <a:rPr lang="en-SG" smtClean="0"/>
-              <a:t>22/2/19</a:t>
+              <a:t>12/7/19</a:t>
             </a:fld>
             <a:endParaRPr lang="en-SG"/>
           </a:p>
@@ -1415,7 +1415,7 @@
           <a:p>
             <a:fld id="{D5F4EE06-143D-4C2F-8831-1CDA21FFE47B}" type="datetimeFigureOut">
               <a:rPr lang="en-SG" smtClean="0"/>
-              <a:t>22/2/19</a:t>
+              <a:t>12/7/19</a:t>
             </a:fld>
             <a:endParaRPr lang="en-SG"/>
           </a:p>
@@ -1830,7 +1830,7 @@
           <a:p>
             <a:fld id="{D5F4EE06-143D-4C2F-8831-1CDA21FFE47B}" type="datetimeFigureOut">
               <a:rPr lang="en-SG" smtClean="0"/>
-              <a:t>22/2/19</a:t>
+              <a:t>12/7/19</a:t>
             </a:fld>
             <a:endParaRPr lang="en-SG"/>
           </a:p>
@@ -1972,7 +1972,7 @@
           <a:p>
             <a:fld id="{D5F4EE06-143D-4C2F-8831-1CDA21FFE47B}" type="datetimeFigureOut">
               <a:rPr lang="en-SG" smtClean="0"/>
-              <a:t>22/2/19</a:t>
+              <a:t>12/7/19</a:t>
             </a:fld>
             <a:endParaRPr lang="en-SG"/>
           </a:p>
@@ -2085,7 +2085,7 @@
           <a:p>
             <a:fld id="{D5F4EE06-143D-4C2F-8831-1CDA21FFE47B}" type="datetimeFigureOut">
               <a:rPr lang="en-SG" smtClean="0"/>
-              <a:t>22/2/19</a:t>
+              <a:t>12/7/19</a:t>
             </a:fld>
             <a:endParaRPr lang="en-SG"/>
           </a:p>
@@ -2398,7 +2398,7 @@
           <a:p>
             <a:fld id="{D5F4EE06-143D-4C2F-8831-1CDA21FFE47B}" type="datetimeFigureOut">
               <a:rPr lang="en-SG" smtClean="0"/>
-              <a:t>22/2/19</a:t>
+              <a:t>12/7/19</a:t>
             </a:fld>
             <a:endParaRPr lang="en-SG"/>
           </a:p>
@@ -2687,7 +2687,7 @@
           <a:p>
             <a:fld id="{D5F4EE06-143D-4C2F-8831-1CDA21FFE47B}" type="datetimeFigureOut">
               <a:rPr lang="en-SG" smtClean="0"/>
-              <a:t>22/2/19</a:t>
+              <a:t>12/7/19</a:t>
             </a:fld>
             <a:endParaRPr lang="en-SG"/>
           </a:p>
@@ -2930,7 +2930,7 @@
           <a:p>
             <a:fld id="{D5F4EE06-143D-4C2F-8831-1CDA21FFE47B}" type="datetimeFigureOut">
               <a:rPr lang="en-SG" smtClean="0"/>
-              <a:t>22/2/19</a:t>
+              <a:t>12/7/19</a:t>
             </a:fld>
             <a:endParaRPr lang="en-SG"/>
           </a:p>
@@ -3349,10 +3349,10 @@
       </p:grpSpPr>
       <p:pic>
         <p:nvPicPr>
-          <p:cNvPr id="5" name="Picture 4">
-            <a:extLst>
-              <a:ext uri="{FF2B5EF4-FFF2-40B4-BE49-F238E27FC236}">
-                <a16:creationId xmlns:a16="http://schemas.microsoft.com/office/drawing/2014/main" id="{0D954123-975A-3A42-A7F9-E3AC583847B8}"/>
+          <p:cNvPr id="20" name="Picture 19" descr="A screenshot of a cell phone&#10;&#10;Description automatically generated">
+            <a:extLst>
+              <a:ext uri="{FF2B5EF4-FFF2-40B4-BE49-F238E27FC236}">
+                <a16:creationId xmlns:a16="http://schemas.microsoft.com/office/drawing/2014/main" id="{348B436D-5F8F-7547-A5EE-02688017F8B6}"/>
               </a:ext>
             </a:extLst>
           </p:cNvPr>
@@ -3375,94 +3375,74 @@
         </p:blipFill>
         <p:spPr>
           <a:xfrm>
-            <a:off x="1305076" y="901373"/>
-            <a:ext cx="9487249" cy="4671748"/>
+            <a:off x="1447800" y="796318"/>
+            <a:ext cx="9304401" cy="5269897"/>
           </a:xfrm>
           <a:prstGeom prst="rect">
             <a:avLst/>
           </a:prstGeom>
         </p:spPr>
       </p:pic>
-      <p:pic>
-        <p:nvPicPr>
-          <p:cNvPr id="2" name="图片 1">
-            <a:extLst>
-              <a:ext uri="{FF2B5EF4-FFF2-40B4-BE49-F238E27FC236}">
-                <a16:creationId xmlns:a16="http://schemas.microsoft.com/office/drawing/2014/main" id="{FEEFED23-9625-46EE-A9C6-DA99D5078E60}"/>
-              </a:ext>
-            </a:extLst>
-          </p:cNvPr>
-          <p:cNvPicPr>
-            <a:picLocks noChangeAspect="1"/>
-          </p:cNvPicPr>
+      <p:sp>
+        <p:nvSpPr>
+          <p:cNvPr id="34" name="Rectangle 33">
+            <a:extLst>
+              <a:ext uri="{FF2B5EF4-FFF2-40B4-BE49-F238E27FC236}">
+                <a16:creationId xmlns:a16="http://schemas.microsoft.com/office/drawing/2014/main" id="{A39783FF-1234-8446-AB32-9380684BB1B3}"/>
+              </a:ext>
+            </a:extLst>
+          </p:cNvPr>
+          <p:cNvSpPr/>
           <p:nvPr/>
-        </p:nvPicPr>
-        <p:blipFill>
-          <a:blip r:embed="rId3"/>
-          <a:stretch>
-            <a:fillRect/>
-          </a:stretch>
-        </p:blipFill>
+        </p:nvSpPr>
         <p:spPr>
           <a:xfrm>
-            <a:off x="1064377" y="379679"/>
-            <a:ext cx="9979368" cy="704619"/>
-          </a:xfrm>
-          <a:prstGeom prst="rect">
-            <a:avLst/>
-          </a:prstGeom>
-        </p:spPr>
-      </p:pic>
-      <p:sp>
-        <p:nvSpPr>
-          <p:cNvPr id="25" name="文本框 24">
-            <a:extLst>
-              <a:ext uri="{FF2B5EF4-FFF2-40B4-BE49-F238E27FC236}">
-                <a16:creationId xmlns:a16="http://schemas.microsoft.com/office/drawing/2014/main" id="{D627E7DD-7D34-4280-A150-3B17A67A2846}"/>
-              </a:ext>
-            </a:extLst>
-          </p:cNvPr>
-          <p:cNvSpPr txBox="1"/>
-          <p:nvPr/>
-        </p:nvSpPr>
-        <p:spPr>
-          <a:xfrm>
-            <a:off x="1080115" y="991630"/>
-            <a:ext cx="5015884" cy="646331"/>
+            <a:off x="1443990" y="814386"/>
+            <a:ext cx="4607814" cy="5229225"/>
           </a:xfrm>
           <a:prstGeom prst="rect">
             <a:avLst/>
           </a:prstGeom>
           <a:noFill/>
-        </p:spPr>
-        <p:txBody>
-          <a:bodyPr wrap="square" rtlCol="0">
-            <a:spAutoFit/>
-          </a:bodyPr>
-          <a:lstStyle/>
-          <a:p>
-            <a:r>
-              <a:rPr lang="en-US" altLang="zh-CN" sz="3600" b="1" dirty="0"/>
-              <a:t>  {</a:t>
-            </a:r>
-            <a:r>
-              <a:rPr lang="en-US" altLang="zh-CN" sz="3600" dirty="0"/>
-              <a:t>                                          </a:t>
-            </a:r>
-            <a:r>
-              <a:rPr lang="en-US" altLang="zh-CN" sz="3600" b="1" dirty="0"/>
-              <a:t>}</a:t>
-            </a:r>
-            <a:endParaRPr lang="zh-CN" altLang="en-US" sz="3600" b="1" dirty="0"/>
-          </a:p>
-        </p:txBody>
-      </p:sp>
-      <p:sp>
-        <p:nvSpPr>
-          <p:cNvPr id="26" name="文本框 25">
-            <a:extLst>
-              <a:ext uri="{FF2B5EF4-FFF2-40B4-BE49-F238E27FC236}">
-                <a16:creationId xmlns:a16="http://schemas.microsoft.com/office/drawing/2014/main" id="{CEC3616D-ADDF-40F1-B171-6C3F36C22891}"/>
+          <a:ln w="57150" cap="flat" cmpd="sng" algn="ctr">
+            <a:solidFill>
+              <a:schemeClr val="accent1"/>
+            </a:solidFill>
+            <a:prstDash val="solid"/>
+            <a:round/>
+            <a:headEnd type="none" w="med" len="med"/>
+            <a:tailEnd type="none" w="med" len="med"/>
+          </a:ln>
+        </p:spPr>
+        <p:style>
+          <a:lnRef idx="0">
+            <a:scrgbClr r="0" g="0" b="0"/>
+          </a:lnRef>
+          <a:fillRef idx="0">
+            <a:scrgbClr r="0" g="0" b="0"/>
+          </a:fillRef>
+          <a:effectRef idx="0">
+            <a:scrgbClr r="0" g="0" b="0"/>
+          </a:effectRef>
+          <a:fontRef idx="minor">
+            <a:schemeClr val="accent1"/>
+          </a:fontRef>
+        </p:style>
+        <p:txBody>
+          <a:bodyPr rtlCol="0" anchor="ctr"/>
+          <a:lstStyle/>
+          <a:p>
+            <a:pPr algn="ctr"/>
+            <a:endParaRPr lang="en-SG"/>
+          </a:p>
+        </p:txBody>
+      </p:sp>
+      <p:sp>
+        <p:nvSpPr>
+          <p:cNvPr id="45" name="文本框 44">
+            <a:extLst>
+              <a:ext uri="{FF2B5EF4-FFF2-40B4-BE49-F238E27FC236}">
+                <a16:creationId xmlns:a16="http://schemas.microsoft.com/office/drawing/2014/main" id="{A0A1A4A5-828A-4BF9-94DF-CD28CBD612CF}"/>
               </a:ext>
             </a:extLst>
           </p:cNvPr>
@@ -3471,8 +3451,8 @@
         </p:nvSpPr>
         <p:spPr>
           <a:xfrm>
-            <a:off x="4338422" y="1423679"/>
-            <a:ext cx="2050741" cy="369332"/>
+            <a:off x="11042275" y="4144131"/>
+            <a:ext cx="750332" cy="276999"/>
           </a:xfrm>
           <a:prstGeom prst="rect">
             <a:avLst/>
@@ -3486,19 +3466,31 @@
           <a:lstStyle/>
           <a:p>
             <a:r>
-              <a:rPr lang="en-US" altLang="zh-CN" dirty="0"/>
-              <a:t>summary-picker</a:t>
-            </a:r>
-            <a:endParaRPr lang="zh-CN" altLang="en-US" dirty="0"/>
-          </a:p>
-        </p:txBody>
-      </p:sp>
-      <p:sp>
-        <p:nvSpPr>
-          <p:cNvPr id="27" name="文本框 26">
-            <a:extLst>
-              <a:ext uri="{FF2B5EF4-FFF2-40B4-BE49-F238E27FC236}">
-                <a16:creationId xmlns:a16="http://schemas.microsoft.com/office/drawing/2014/main" id="{048B4F0D-9235-4911-A47D-8F53A18FA157}"/>
+              <a:rPr lang="en-US" altLang="zh-CN" sz="1200" dirty="0">
+                <a:solidFill>
+                  <a:schemeClr val="accent4">
+                    <a:lumMod val="75000"/>
+                  </a:schemeClr>
+                </a:solidFill>
+              </a:rPr>
+              <a:t>file</a:t>
+            </a:r>
+            <a:endParaRPr lang="zh-CN" altLang="en-US" sz="1200" dirty="0">
+              <a:solidFill>
+                <a:schemeClr val="accent4">
+                  <a:lumMod val="75000"/>
+                </a:schemeClr>
+              </a:solidFill>
+            </a:endParaRPr>
+          </a:p>
+        </p:txBody>
+      </p:sp>
+      <p:sp>
+        <p:nvSpPr>
+          <p:cNvPr id="47" name="文本框 46">
+            <a:extLst>
+              <a:ext uri="{FF2B5EF4-FFF2-40B4-BE49-F238E27FC236}">
+                <a16:creationId xmlns:a16="http://schemas.microsoft.com/office/drawing/2014/main" id="{8A40C309-DFD1-4333-84EB-9117C609942E}"/>
               </a:ext>
             </a:extLst>
           </p:cNvPr>
@@ -3507,8 +3499,8 @@
         </p:nvSpPr>
         <p:spPr>
           <a:xfrm>
-            <a:off x="1145219" y="1778238"/>
-            <a:ext cx="5015884" cy="646331"/>
+            <a:off x="8666427" y="2315835"/>
+            <a:ext cx="849429" cy="276999"/>
           </a:xfrm>
           <a:prstGeom prst="rect">
             <a:avLst/>
@@ -3522,27 +3514,71 @@
           <a:lstStyle/>
           <a:p>
             <a:r>
-              <a:rPr lang="en-US" altLang="zh-CN" sz="3600" b="1"/>
-              <a:t>{</a:t>
-            </a:r>
-            <a:r>
-              <a:rPr lang="en-US" altLang="zh-CN" sz="3600"/>
-              <a:t>                                           </a:t>
-            </a:r>
-            <a:r>
-              <a:rPr lang="en-US" altLang="zh-CN" sz="3600" b="1"/>
-              <a:t>}</a:t>
-            </a:r>
-            <a:endParaRPr lang="zh-CN" altLang="en-US" sz="3600" b="1" dirty="0"/>
-          </a:p>
-        </p:txBody>
-      </p:sp>
-      <p:sp>
-        <p:nvSpPr>
-          <p:cNvPr id="28" name="文本框 27">
-            <a:extLst>
-              <a:ext uri="{FF2B5EF4-FFF2-40B4-BE49-F238E27FC236}">
-                <a16:creationId xmlns:a16="http://schemas.microsoft.com/office/drawing/2014/main" id="{7CB45794-D414-47BD-B3BE-1F1AD5401966}"/>
+              <a:rPr lang="en-US" altLang="zh-CN" sz="1200" dirty="0">
+                <a:solidFill>
+                  <a:srgbClr val="C00000"/>
+                </a:solidFill>
+              </a:rPr>
+              <a:t>title</a:t>
+            </a:r>
+            <a:endParaRPr lang="zh-CN" altLang="en-US" sz="1200" dirty="0">
+              <a:solidFill>
+                <a:srgbClr val="C00000"/>
+              </a:solidFill>
+            </a:endParaRPr>
+          </a:p>
+        </p:txBody>
+      </p:sp>
+      <p:sp>
+        <p:nvSpPr>
+          <p:cNvPr id="21" name="Right Brace 20">
+            <a:extLst>
+              <a:ext uri="{FF2B5EF4-FFF2-40B4-BE49-F238E27FC236}">
+                <a16:creationId xmlns:a16="http://schemas.microsoft.com/office/drawing/2014/main" id="{9BD3E903-758E-2D47-AD99-018719F72293}"/>
+              </a:ext>
+            </a:extLst>
+          </p:cNvPr>
+          <p:cNvSpPr/>
+          <p:nvPr/>
+        </p:nvSpPr>
+        <p:spPr>
+          <a:xfrm rot="16200000">
+            <a:off x="3599688" y="-1681925"/>
+            <a:ext cx="344424" cy="4648200"/>
+          </a:xfrm>
+          <a:prstGeom prst="rightBrace">
+            <a:avLst/>
+          </a:prstGeom>
+        </p:spPr>
+        <p:style>
+          <a:lnRef idx="3">
+            <a:schemeClr val="accent1"/>
+          </a:lnRef>
+          <a:fillRef idx="0">
+            <a:schemeClr val="accent1"/>
+          </a:fillRef>
+          <a:effectRef idx="2">
+            <a:schemeClr val="accent1"/>
+          </a:effectRef>
+          <a:fontRef idx="minor">
+            <a:schemeClr val="tx1"/>
+          </a:fontRef>
+        </p:style>
+        <p:txBody>
+          <a:bodyPr rtlCol="0" anchor="ctr"/>
+          <a:lstStyle/>
+          <a:p>
+            <a:pPr algn="ctr"/>
+            <a:endParaRPr lang="en-SG"/>
+          </a:p>
+        </p:txBody>
+      </p:sp>
+      <p:sp>
+        <p:nvSpPr>
+          <p:cNvPr id="24" name="TextBox 23">
+            <a:extLst>
+              <a:ext uri="{FF2B5EF4-FFF2-40B4-BE49-F238E27FC236}">
+                <a16:creationId xmlns:a16="http://schemas.microsoft.com/office/drawing/2014/main" id="{450BEBC7-C0C7-CF48-95D5-47FDD988DA61}"/>
               </a:ext>
             </a:extLst>
           </p:cNvPr>
@@ -3551,8 +3587,8 @@
         </p:nvSpPr>
         <p:spPr>
           <a:xfrm>
-            <a:off x="1385074" y="1932126"/>
-            <a:ext cx="1513234" cy="338554"/>
+            <a:off x="2726436" y="79248"/>
+            <a:ext cx="2090928" cy="276999"/>
           </a:xfrm>
           <a:prstGeom prst="rect">
             <a:avLst/>
@@ -3565,61 +3601,540 @@
           </a:bodyPr>
           <a:lstStyle/>
           <a:p>
-            <a:r>
-              <a:rPr lang="en-US" altLang="zh-CN" sz="1600" dirty="0"/>
-              <a:t>summary-chart</a:t>
-            </a:r>
-            <a:endParaRPr lang="zh-CN" altLang="en-US" sz="1600" dirty="0"/>
-          </a:p>
-        </p:txBody>
-      </p:sp>
-      <p:cxnSp>
-        <p:nvCxnSpPr>
-          <p:cNvPr id="30" name="直接箭头连接符 29">
-            <a:extLst>
-              <a:ext uri="{FF2B5EF4-FFF2-40B4-BE49-F238E27FC236}">
-                <a16:creationId xmlns:a16="http://schemas.microsoft.com/office/drawing/2014/main" id="{E32F0A57-3030-43BF-ADC0-65784D6DB3BE}"/>
-              </a:ext>
-            </a:extLst>
-          </p:cNvPr>
-          <p:cNvCxnSpPr>
-            <a:cxnSpLocks/>
-          </p:cNvCxnSpPr>
+            <a:pPr algn="ctr"/>
+            <a:r>
+              <a:rPr lang="en-US" sz="1200" dirty="0"/>
+              <a:t>summary</a:t>
+            </a:r>
+            <a:endParaRPr lang="en-SG" sz="1200" dirty="0"/>
+          </a:p>
+        </p:txBody>
+      </p:sp>
+      <p:sp>
+        <p:nvSpPr>
+          <p:cNvPr id="29" name="Right Brace 28">
+            <a:extLst>
+              <a:ext uri="{FF2B5EF4-FFF2-40B4-BE49-F238E27FC236}">
+                <a16:creationId xmlns:a16="http://schemas.microsoft.com/office/drawing/2014/main" id="{D3693491-4CC3-9C40-8CA3-0E17F4ACC7C5}"/>
+              </a:ext>
+            </a:extLst>
+          </p:cNvPr>
+          <p:cNvSpPr/>
           <p:nvPr/>
-        </p:nvCxnSpPr>
-        <p:spPr>
-          <a:xfrm flipH="1">
-            <a:off x="2219081" y="5095039"/>
-            <a:ext cx="621976" cy="325248"/>
-          </a:xfrm>
-          <a:prstGeom prst="straightConnector1">
+        </p:nvSpPr>
+        <p:spPr>
+          <a:xfrm rot="16200000">
+            <a:off x="8298180" y="-1631634"/>
+            <a:ext cx="344424" cy="4547616"/>
+          </a:xfrm>
+          <a:prstGeom prst="rightBrace">
             <a:avLst/>
           </a:prstGeom>
-          <a:ln w="28575">
-            <a:tailEnd type="triangle"/>
+        </p:spPr>
+        <p:style>
+          <a:lnRef idx="3">
+            <a:schemeClr val="accent2"/>
+          </a:lnRef>
+          <a:fillRef idx="0">
+            <a:schemeClr val="accent2"/>
+          </a:fillRef>
+          <a:effectRef idx="2">
+            <a:schemeClr val="accent2"/>
+          </a:effectRef>
+          <a:fontRef idx="minor">
+            <a:schemeClr val="tx1"/>
+          </a:fontRef>
+        </p:style>
+        <p:txBody>
+          <a:bodyPr rtlCol="0" anchor="ctr"/>
+          <a:lstStyle/>
+          <a:p>
+            <a:pPr algn="ctr"/>
+            <a:endParaRPr lang="en-SG"/>
+          </a:p>
+        </p:txBody>
+      </p:sp>
+      <p:sp>
+        <p:nvSpPr>
+          <p:cNvPr id="32" name="TextBox 31">
+            <a:extLst>
+              <a:ext uri="{FF2B5EF4-FFF2-40B4-BE49-F238E27FC236}">
+                <a16:creationId xmlns:a16="http://schemas.microsoft.com/office/drawing/2014/main" id="{4398EB41-E844-AC49-8C8F-94E761AA5F54}"/>
+              </a:ext>
+            </a:extLst>
+          </p:cNvPr>
+          <p:cNvSpPr txBox="1"/>
+          <p:nvPr/>
+        </p:nvSpPr>
+        <p:spPr>
+          <a:xfrm>
+            <a:off x="7424928" y="79248"/>
+            <a:ext cx="2090928" cy="276999"/>
+          </a:xfrm>
+          <a:prstGeom prst="rect">
+            <a:avLst/>
+          </a:prstGeom>
+          <a:noFill/>
+        </p:spPr>
+        <p:txBody>
+          <a:bodyPr wrap="square" rtlCol="0">
+            <a:spAutoFit/>
+          </a:bodyPr>
+          <a:lstStyle/>
+          <a:p>
+            <a:pPr algn="ctr"/>
+            <a:r>
+              <a:rPr lang="en-US" sz="1200" dirty="0"/>
+              <a:t>tabs-pane</a:t>
+            </a:r>
+            <a:endParaRPr lang="en-SG" sz="1200" dirty="0"/>
+          </a:p>
+        </p:txBody>
+      </p:sp>
+      <p:sp>
+        <p:nvSpPr>
+          <p:cNvPr id="36" name="Rectangle 35">
+            <a:extLst>
+              <a:ext uri="{FF2B5EF4-FFF2-40B4-BE49-F238E27FC236}">
+                <a16:creationId xmlns:a16="http://schemas.microsoft.com/office/drawing/2014/main" id="{B174F72C-650B-8E44-A379-A24D0DB5B758}"/>
+              </a:ext>
+            </a:extLst>
+          </p:cNvPr>
+          <p:cNvSpPr/>
+          <p:nvPr/>
+        </p:nvSpPr>
+        <p:spPr>
+          <a:xfrm>
+            <a:off x="6204585" y="814386"/>
+            <a:ext cx="4547616" cy="5229225"/>
+          </a:xfrm>
+          <a:prstGeom prst="rect">
+            <a:avLst/>
+          </a:prstGeom>
+          <a:noFill/>
+          <a:ln w="57150" cap="flat" cmpd="sng" algn="ctr">
+            <a:solidFill>
+              <a:schemeClr val="accent2"/>
+            </a:solidFill>
+            <a:prstDash val="solid"/>
+            <a:round/>
+            <a:headEnd type="none" w="med" len="med"/>
+            <a:tailEnd type="none" w="med" len="med"/>
+          </a:ln>
+        </p:spPr>
+        <p:style>
+          <a:lnRef idx="0">
+            <a:scrgbClr r="0" g="0" b="0"/>
+          </a:lnRef>
+          <a:fillRef idx="0">
+            <a:scrgbClr r="0" g="0" b="0"/>
+          </a:fillRef>
+          <a:effectRef idx="0">
+            <a:scrgbClr r="0" g="0" b="0"/>
+          </a:effectRef>
+          <a:fontRef idx="minor">
+            <a:schemeClr val="accent1"/>
+          </a:fontRef>
+        </p:style>
+        <p:txBody>
+          <a:bodyPr rtlCol="0" anchor="ctr"/>
+          <a:lstStyle/>
+          <a:p>
+            <a:pPr algn="ctr"/>
+            <a:endParaRPr lang="en-SG"/>
+          </a:p>
+        </p:txBody>
+      </p:sp>
+      <p:sp>
+        <p:nvSpPr>
+          <p:cNvPr id="37" name="Left Brace 36">
+            <a:extLst>
+              <a:ext uri="{FF2B5EF4-FFF2-40B4-BE49-F238E27FC236}">
+                <a16:creationId xmlns:a16="http://schemas.microsoft.com/office/drawing/2014/main" id="{9494E5A0-E147-2A47-B20B-2B69B72DDFDC}"/>
+              </a:ext>
+            </a:extLst>
+          </p:cNvPr>
+          <p:cNvSpPr/>
+          <p:nvPr/>
+        </p:nvSpPr>
+        <p:spPr>
+          <a:xfrm>
+            <a:off x="1411366" y="896446"/>
+            <a:ext cx="516530" cy="869029"/>
+          </a:xfrm>
+          <a:prstGeom prst="leftBrace">
+            <a:avLst>
+              <a:gd name="adj1" fmla="val 14462"/>
+              <a:gd name="adj2" fmla="val 50000"/>
+            </a:avLst>
+          </a:prstGeom>
+        </p:spPr>
+        <p:style>
+          <a:lnRef idx="3">
+            <a:schemeClr val="accent6"/>
+          </a:lnRef>
+          <a:fillRef idx="0">
+            <a:schemeClr val="accent6"/>
+          </a:fillRef>
+          <a:effectRef idx="2">
+            <a:schemeClr val="accent6"/>
+          </a:effectRef>
+          <a:fontRef idx="minor">
+            <a:schemeClr val="tx1"/>
+          </a:fontRef>
+        </p:style>
+        <p:txBody>
+          <a:bodyPr rtlCol="0" anchor="ctr"/>
+          <a:lstStyle/>
+          <a:p>
+            <a:pPr algn="ctr"/>
+            <a:endParaRPr lang="en-SG"/>
+          </a:p>
+        </p:txBody>
+      </p:sp>
+      <p:sp>
+        <p:nvSpPr>
+          <p:cNvPr id="40" name="TextBox 39">
+            <a:extLst>
+              <a:ext uri="{FF2B5EF4-FFF2-40B4-BE49-F238E27FC236}">
+                <a16:creationId xmlns:a16="http://schemas.microsoft.com/office/drawing/2014/main" id="{87B6C03F-369B-FC4B-A10B-9B5BFBCEF11A}"/>
+              </a:ext>
+            </a:extLst>
+          </p:cNvPr>
+          <p:cNvSpPr txBox="1"/>
+          <p:nvPr/>
+        </p:nvSpPr>
+        <p:spPr>
+          <a:xfrm>
+            <a:off x="1" y="1185282"/>
+            <a:ext cx="1422854" cy="276999"/>
+          </a:xfrm>
+          <a:prstGeom prst="rect">
+            <a:avLst/>
+          </a:prstGeom>
+          <a:noFill/>
+        </p:spPr>
+        <p:txBody>
+          <a:bodyPr wrap="square" rtlCol="0">
+            <a:spAutoFit/>
+          </a:bodyPr>
+          <a:lstStyle/>
+          <a:p>
+            <a:pPr algn="ctr"/>
+            <a:r>
+              <a:rPr lang="en-US" sz="1200" dirty="0">
+                <a:solidFill>
+                  <a:schemeClr val="accent6"/>
+                </a:solidFill>
+              </a:rPr>
+              <a:t>summary-picker</a:t>
+            </a:r>
+          </a:p>
+        </p:txBody>
+      </p:sp>
+      <p:sp>
+        <p:nvSpPr>
+          <p:cNvPr id="41" name="Rectangle 40">
+            <a:extLst>
+              <a:ext uri="{FF2B5EF4-FFF2-40B4-BE49-F238E27FC236}">
+                <a16:creationId xmlns:a16="http://schemas.microsoft.com/office/drawing/2014/main" id="{24AE4F15-738B-C34D-830A-5AA47285C7ED}"/>
+              </a:ext>
+            </a:extLst>
+          </p:cNvPr>
+          <p:cNvSpPr/>
+          <p:nvPr/>
+        </p:nvSpPr>
+        <p:spPr>
+          <a:xfrm>
+            <a:off x="1927896" y="896446"/>
+            <a:ext cx="3706363" cy="869029"/>
+          </a:xfrm>
+          <a:prstGeom prst="rect">
+            <a:avLst/>
+          </a:prstGeom>
+          <a:noFill/>
+          <a:ln w="9525" cap="flat" cmpd="sng" algn="ctr">
+            <a:solidFill>
+              <a:schemeClr val="accent6"/>
+            </a:solidFill>
+            <a:prstDash val="solid"/>
+            <a:round/>
+            <a:headEnd type="none" w="med" len="med"/>
+            <a:tailEnd type="none" w="med" len="med"/>
+          </a:ln>
+        </p:spPr>
+        <p:style>
+          <a:lnRef idx="0">
+            <a:scrgbClr r="0" g="0" b="0"/>
+          </a:lnRef>
+          <a:fillRef idx="0">
+            <a:scrgbClr r="0" g="0" b="0"/>
+          </a:fillRef>
+          <a:effectRef idx="0">
+            <a:scrgbClr r="0" g="0" b="0"/>
+          </a:effectRef>
+          <a:fontRef idx="minor">
+            <a:schemeClr val="accent6"/>
+          </a:fontRef>
+        </p:style>
+        <p:txBody>
+          <a:bodyPr rtlCol="0" anchor="ctr"/>
+          <a:lstStyle/>
+          <a:p>
+            <a:pPr algn="ctr"/>
+            <a:endParaRPr lang="en-SG"/>
+          </a:p>
+        </p:txBody>
+      </p:sp>
+      <p:sp>
+        <p:nvSpPr>
+          <p:cNvPr id="42" name="Rectangle 41">
+            <a:extLst>
+              <a:ext uri="{FF2B5EF4-FFF2-40B4-BE49-F238E27FC236}">
+                <a16:creationId xmlns:a16="http://schemas.microsoft.com/office/drawing/2014/main" id="{570EA449-180B-9046-8449-8C441F0729CF}"/>
+              </a:ext>
+            </a:extLst>
+          </p:cNvPr>
+          <p:cNvSpPr/>
+          <p:nvPr/>
+        </p:nvSpPr>
+        <p:spPr>
+          <a:xfrm>
+            <a:off x="1523483" y="1950544"/>
+            <a:ext cx="4482463" cy="449190"/>
+          </a:xfrm>
+          <a:prstGeom prst="rect">
+            <a:avLst/>
+          </a:prstGeom>
+          <a:noFill/>
+          <a:ln w="28575" cap="flat" cmpd="sng" algn="ctr">
+            <a:solidFill>
+              <a:srgbClr val="A401FF"/>
+            </a:solidFill>
+            <a:prstDash val="solid"/>
+            <a:round/>
+            <a:headEnd type="none" w="med" len="med"/>
+            <a:tailEnd type="none" w="med" len="med"/>
+          </a:ln>
+        </p:spPr>
+        <p:style>
+          <a:lnRef idx="0">
+            <a:scrgbClr r="0" g="0" b="0"/>
+          </a:lnRef>
+          <a:fillRef idx="0">
+            <a:scrgbClr r="0" g="0" b="0"/>
+          </a:fillRef>
+          <a:effectRef idx="0">
+            <a:scrgbClr r="0" g="0" b="0"/>
+          </a:effectRef>
+          <a:fontRef idx="minor">
+            <a:schemeClr val="accent4"/>
+          </a:fontRef>
+        </p:style>
+        <p:txBody>
+          <a:bodyPr rtlCol="0" anchor="ctr"/>
+          <a:lstStyle/>
+          <a:p>
+            <a:pPr algn="ctr"/>
+            <a:endParaRPr lang="en-SG"/>
+          </a:p>
+        </p:txBody>
+      </p:sp>
+      <p:sp>
+        <p:nvSpPr>
+          <p:cNvPr id="43" name="Left Brace 42">
+            <a:extLst>
+              <a:ext uri="{FF2B5EF4-FFF2-40B4-BE49-F238E27FC236}">
+                <a16:creationId xmlns:a16="http://schemas.microsoft.com/office/drawing/2014/main" id="{14E73C6F-03E1-4A48-B245-93103C46EA60}"/>
+              </a:ext>
+            </a:extLst>
+          </p:cNvPr>
+          <p:cNvSpPr/>
+          <p:nvPr/>
+        </p:nvSpPr>
+        <p:spPr>
+          <a:xfrm>
+            <a:off x="1142042" y="1950544"/>
+            <a:ext cx="348052" cy="449190"/>
+          </a:xfrm>
+          <a:prstGeom prst="leftBrace">
+            <a:avLst/>
+          </a:prstGeom>
+          <a:ln w="19050">
+            <a:solidFill>
+              <a:srgbClr val="A401FF"/>
+            </a:solidFill>
           </a:ln>
         </p:spPr>
         <p:style>
           <a:lnRef idx="1">
-            <a:schemeClr val="dk1"/>
+            <a:schemeClr val="accent1"/>
           </a:lnRef>
           <a:fillRef idx="0">
+            <a:schemeClr val="accent1"/>
+          </a:fillRef>
+          <a:effectRef idx="0">
+            <a:schemeClr val="accent1"/>
+          </a:effectRef>
+          <a:fontRef idx="minor">
+            <a:schemeClr val="tx1"/>
+          </a:fontRef>
+        </p:style>
+        <p:txBody>
+          <a:bodyPr rtlCol="0" anchor="ctr"/>
+          <a:lstStyle/>
+          <a:p>
+            <a:pPr algn="ctr"/>
+            <a:endParaRPr lang="en-SG"/>
+          </a:p>
+        </p:txBody>
+      </p:sp>
+      <p:sp>
+        <p:nvSpPr>
+          <p:cNvPr id="48" name="TextBox 47">
+            <a:extLst>
+              <a:ext uri="{FF2B5EF4-FFF2-40B4-BE49-F238E27FC236}">
+                <a16:creationId xmlns:a16="http://schemas.microsoft.com/office/drawing/2014/main" id="{A77BE544-7145-6949-94AF-AFCE5DA7C7AD}"/>
+              </a:ext>
+            </a:extLst>
+          </p:cNvPr>
+          <p:cNvSpPr txBox="1"/>
+          <p:nvPr/>
+        </p:nvSpPr>
+        <p:spPr>
+          <a:xfrm>
+            <a:off x="18534" y="2026833"/>
+            <a:ext cx="1202954" cy="276999"/>
+          </a:xfrm>
+          <a:prstGeom prst="rect">
+            <a:avLst/>
+          </a:prstGeom>
+          <a:noFill/>
+        </p:spPr>
+        <p:txBody>
+          <a:bodyPr wrap="square" rtlCol="0">
+            <a:spAutoFit/>
+          </a:bodyPr>
+          <a:lstStyle/>
+          <a:p>
+            <a:pPr algn="ctr"/>
+            <a:r>
+              <a:rPr lang="en-US" sz="1200" dirty="0">
+                <a:solidFill>
+                  <a:srgbClr val="7030A0"/>
+                </a:solidFill>
+              </a:rPr>
+              <a:t>summary-chart</a:t>
+            </a:r>
+          </a:p>
+        </p:txBody>
+      </p:sp>
+      <p:sp>
+        <p:nvSpPr>
+          <p:cNvPr id="49" name="Rectangle 48">
+            <a:extLst>
+              <a:ext uri="{FF2B5EF4-FFF2-40B4-BE49-F238E27FC236}">
+                <a16:creationId xmlns:a16="http://schemas.microsoft.com/office/drawing/2014/main" id="{5720B1C7-874B-4E44-A7D1-E44FC02B40B3}"/>
+              </a:ext>
+            </a:extLst>
+          </p:cNvPr>
+          <p:cNvSpPr/>
+          <p:nvPr/>
+        </p:nvSpPr>
+        <p:spPr>
+          <a:xfrm>
+            <a:off x="1526181" y="3880858"/>
+            <a:ext cx="4482462" cy="96793"/>
+          </a:xfrm>
+          <a:prstGeom prst="rect">
+            <a:avLst/>
+          </a:prstGeom>
+          <a:noFill/>
+          <a:ln w="9525" cap="flat" cmpd="sng" algn="ctr">
+            <a:solidFill>
+              <a:schemeClr val="dk1"/>
+            </a:solidFill>
+            <a:prstDash val="solid"/>
+            <a:round/>
+            <a:headEnd type="none" w="med" len="med"/>
+            <a:tailEnd type="none" w="med" len="med"/>
+          </a:ln>
+        </p:spPr>
+        <p:style>
+          <a:lnRef idx="0">
+            <a:scrgbClr r="0" g="0" b="0"/>
+          </a:lnRef>
+          <a:fillRef idx="0">
+            <a:scrgbClr r="0" g="0" b="0"/>
+          </a:fillRef>
+          <a:effectRef idx="0">
+            <a:scrgbClr r="0" g="0" b="0"/>
+          </a:effectRef>
+          <a:fontRef idx="minor">
+            <a:schemeClr val="dk1"/>
+          </a:fontRef>
+        </p:style>
+        <p:txBody>
+          <a:bodyPr rtlCol="0" anchor="ctr"/>
+          <a:lstStyle/>
+          <a:p>
+            <a:pPr algn="ctr"/>
+            <a:endParaRPr lang="en-SG"/>
+          </a:p>
+        </p:txBody>
+      </p:sp>
+      <p:sp>
+        <p:nvSpPr>
+          <p:cNvPr id="50" name="Arrow: Left 47">
+            <a:extLst>
+              <a:ext uri="{FF2B5EF4-FFF2-40B4-BE49-F238E27FC236}">
+                <a16:creationId xmlns:a16="http://schemas.microsoft.com/office/drawing/2014/main" id="{7457BEF7-1E31-E744-950A-37FC3FC20058}"/>
+              </a:ext>
+            </a:extLst>
+          </p:cNvPr>
+          <p:cNvSpPr/>
+          <p:nvPr/>
+        </p:nvSpPr>
+        <p:spPr>
+          <a:xfrm rot="2313406">
+            <a:off x="1193574" y="3701355"/>
+            <a:ext cx="348052" cy="96793"/>
+          </a:xfrm>
+          <a:prstGeom prst="leftArrow">
+            <a:avLst/>
+          </a:prstGeom>
+        </p:spPr>
+        <p:style>
+          <a:lnRef idx="2">
+            <a:schemeClr val="dk1">
+              <a:shade val="50000"/>
+            </a:schemeClr>
+          </a:lnRef>
+          <a:fillRef idx="1">
             <a:schemeClr val="dk1"/>
           </a:fillRef>
           <a:effectRef idx="0">
             <a:schemeClr val="dk1"/>
           </a:effectRef>
           <a:fontRef idx="minor">
-            <a:schemeClr val="tx1"/>
+            <a:schemeClr val="lt1"/>
           </a:fontRef>
         </p:style>
-      </p:cxnSp>
-      <p:sp>
-        <p:nvSpPr>
-          <p:cNvPr id="31" name="文本框 30">
-            <a:extLst>
-              <a:ext uri="{FF2B5EF4-FFF2-40B4-BE49-F238E27FC236}">
-                <a16:creationId xmlns:a16="http://schemas.microsoft.com/office/drawing/2014/main" id="{A6CD96EA-F1F9-4224-A314-6E2FC781E961}"/>
+        <p:txBody>
+          <a:bodyPr rtlCol="0" anchor="ctr"/>
+          <a:lstStyle/>
+          <a:p>
+            <a:pPr algn="ctr"/>
+            <a:endParaRPr lang="en-SG"/>
+          </a:p>
+        </p:txBody>
+      </p:sp>
+      <p:sp>
+        <p:nvSpPr>
+          <p:cNvPr id="51" name="TextBox 50">
+            <a:extLst>
+              <a:ext uri="{FF2B5EF4-FFF2-40B4-BE49-F238E27FC236}">
+                <a16:creationId xmlns:a16="http://schemas.microsoft.com/office/drawing/2014/main" id="{6C2AF7FB-234B-7347-967F-A89B873E0061}"/>
               </a:ext>
             </a:extLst>
           </p:cNvPr>
@@ -3628,8 +4143,8 @@
         </p:nvSpPr>
         <p:spPr>
           <a:xfrm>
-            <a:off x="2841057" y="4906809"/>
-            <a:ext cx="2522736" cy="369332"/>
+            <a:off x="31532" y="3188927"/>
+            <a:ext cx="1650123" cy="461665"/>
           </a:xfrm>
           <a:prstGeom prst="rect">
             <a:avLst/>
@@ -3642,24 +4157,32 @@
           </a:bodyPr>
           <a:lstStyle/>
           <a:p>
-            <a:r>
-              <a:rPr lang="en-US" altLang="zh-CN" dirty="0"/>
+            <a:pPr algn="ctr"/>
+            <a:r>
+              <a:rPr lang="en-US" sz="1200" dirty="0"/>
               <a:t>summary-</a:t>
             </a:r>
-            <a:r>
-              <a:rPr lang="en-US" altLang="zh-CN" dirty="0" err="1"/>
-              <a:t>chart__ramp</a:t>
-            </a:r>
-            <a:endParaRPr lang="zh-CN" altLang="en-US" dirty="0"/>
+          </a:p>
+          <a:p>
+            <a:pPr algn="ctr"/>
+            <a:r>
+              <a:rPr lang="en-US" sz="1200" dirty="0"/>
+              <a:t>chart__</a:t>
+            </a:r>
+            <a:r>
+              <a:rPr lang="en-US" sz="1200" dirty="0" err="1"/>
+              <a:t>contrib</a:t>
+            </a:r>
+            <a:endParaRPr lang="en-SG" sz="1200" dirty="0"/>
           </a:p>
         </p:txBody>
       </p:sp>
       <p:cxnSp>
         <p:nvCxnSpPr>
-          <p:cNvPr id="33" name="直接箭头连接符 32">
-            <a:extLst>
-              <a:ext uri="{FF2B5EF4-FFF2-40B4-BE49-F238E27FC236}">
-                <a16:creationId xmlns:a16="http://schemas.microsoft.com/office/drawing/2014/main" id="{E128B1A9-EAAA-45CA-9444-F3F1ABE070EA}"/>
+          <p:cNvPr id="58" name="Straight Arrow Connector 57">
+            <a:extLst>
+              <a:ext uri="{FF2B5EF4-FFF2-40B4-BE49-F238E27FC236}">
+                <a16:creationId xmlns:a16="http://schemas.microsoft.com/office/drawing/2014/main" id="{E1AC6A71-3A8D-E241-8A3F-9F7EE32F58B5}"/>
               </a:ext>
             </a:extLst>
           </p:cNvPr>
@@ -3669,381 +4192,447 @@
           <p:nvPr/>
         </p:nvCxnSpPr>
         <p:spPr>
-          <a:xfrm flipH="1" flipV="1">
-            <a:off x="2898308" y="4188346"/>
-            <a:ext cx="623065" cy="249554"/>
+          <a:xfrm flipV="1">
+            <a:off x="4633568" y="3669675"/>
+            <a:ext cx="0" cy="484087"/>
           </a:xfrm>
           <a:prstGeom prst="straightConnector1">
             <a:avLst/>
           </a:prstGeom>
-          <a:ln w="28575">
+          <a:ln>
             <a:tailEnd type="triangle"/>
           </a:ln>
         </p:spPr>
         <p:style>
-          <a:lnRef idx="1">
-            <a:schemeClr val="dk1"/>
+          <a:lnRef idx="3">
+            <a:schemeClr val="accent4"/>
           </a:lnRef>
           <a:fillRef idx="0">
+            <a:schemeClr val="accent4"/>
+          </a:fillRef>
+          <a:effectRef idx="2">
+            <a:schemeClr val="accent4"/>
+          </a:effectRef>
+          <a:fontRef idx="minor">
+            <a:schemeClr val="tx1"/>
+          </a:fontRef>
+        </p:style>
+      </p:cxnSp>
+      <p:sp>
+        <p:nvSpPr>
+          <p:cNvPr id="59" name="TextBox 58">
+            <a:extLst>
+              <a:ext uri="{FF2B5EF4-FFF2-40B4-BE49-F238E27FC236}">
+                <a16:creationId xmlns:a16="http://schemas.microsoft.com/office/drawing/2014/main" id="{9ED53A0E-FCFE-DE4A-9776-897FDA4E3D8F}"/>
+              </a:ext>
+            </a:extLst>
+          </p:cNvPr>
+          <p:cNvSpPr txBox="1"/>
+          <p:nvPr/>
+        </p:nvSpPr>
+        <p:spPr>
+          <a:xfrm>
+            <a:off x="3499944" y="3392676"/>
+            <a:ext cx="2516973" cy="276999"/>
+          </a:xfrm>
+          <a:prstGeom prst="rect">
+            <a:avLst/>
+          </a:prstGeom>
+          <a:noFill/>
+        </p:spPr>
+        <p:txBody>
+          <a:bodyPr wrap="square" rtlCol="0">
+            <a:spAutoFit/>
+          </a:bodyPr>
+          <a:lstStyle/>
+          <a:p>
+            <a:r>
+              <a:rPr lang="en-US" sz="1200" dirty="0">
+                <a:solidFill>
+                  <a:srgbClr val="FFC000"/>
+                </a:solidFill>
+              </a:rPr>
+              <a:t>summary-</a:t>
+            </a:r>
+            <a:r>
+              <a:rPr lang="en-US" sz="1200" dirty="0" err="1">
+                <a:solidFill>
+                  <a:srgbClr val="FFC000"/>
+                </a:solidFill>
+              </a:rPr>
+              <a:t>chart__ramp__slice</a:t>
+            </a:r>
+            <a:endParaRPr lang="en-SG" sz="1200" dirty="0">
+              <a:solidFill>
+                <a:srgbClr val="FFC000"/>
+              </a:solidFill>
+            </a:endParaRPr>
+          </a:p>
+        </p:txBody>
+      </p:sp>
+      <p:sp>
+        <p:nvSpPr>
+          <p:cNvPr id="60" name="Rectangle 59">
+            <a:extLst>
+              <a:ext uri="{FF2B5EF4-FFF2-40B4-BE49-F238E27FC236}">
+                <a16:creationId xmlns:a16="http://schemas.microsoft.com/office/drawing/2014/main" id="{0FE18B14-A8FF-CA40-9773-69CCCF32CE9A}"/>
+              </a:ext>
+            </a:extLst>
+          </p:cNvPr>
+          <p:cNvSpPr/>
+          <p:nvPr/>
+        </p:nvSpPr>
+        <p:spPr>
+          <a:xfrm>
+            <a:off x="1536198" y="2556435"/>
+            <a:ext cx="4482463" cy="305570"/>
+          </a:xfrm>
+          <a:prstGeom prst="rect">
+            <a:avLst/>
+          </a:prstGeom>
+          <a:noFill/>
+          <a:ln w="28575" cap="flat" cmpd="sng" algn="ctr">
+            <a:solidFill>
+              <a:schemeClr val="accent5"/>
+            </a:solidFill>
+            <a:prstDash val="solid"/>
+            <a:round/>
+            <a:headEnd type="none" w="med" len="med"/>
+            <a:tailEnd type="none" w="med" len="med"/>
+          </a:ln>
+        </p:spPr>
+        <p:style>
+          <a:lnRef idx="0">
+            <a:scrgbClr r="0" g="0" b="0"/>
+          </a:lnRef>
+          <a:fillRef idx="0">
+            <a:scrgbClr r="0" g="0" b="0"/>
+          </a:fillRef>
+          <a:effectRef idx="0">
+            <a:scrgbClr r="0" g="0" b="0"/>
+          </a:effectRef>
+          <a:fontRef idx="minor">
+            <a:schemeClr val="accent4"/>
+          </a:fontRef>
+        </p:style>
+        <p:txBody>
+          <a:bodyPr rtlCol="0" anchor="ctr"/>
+          <a:lstStyle/>
+          <a:p>
+            <a:pPr algn="ctr"/>
+            <a:endParaRPr lang="en-SG" dirty="0">
+              <a:highlight>
+                <a:srgbClr val="FFFF00"/>
+              </a:highlight>
+            </a:endParaRPr>
+          </a:p>
+        </p:txBody>
+      </p:sp>
+      <p:sp>
+        <p:nvSpPr>
+          <p:cNvPr id="61" name="Left Brace 60">
+            <a:extLst>
+              <a:ext uri="{FF2B5EF4-FFF2-40B4-BE49-F238E27FC236}">
+                <a16:creationId xmlns:a16="http://schemas.microsoft.com/office/drawing/2014/main" id="{0A49D9D0-8D3C-1446-A8F5-448223EAB137}"/>
+              </a:ext>
+            </a:extLst>
+          </p:cNvPr>
+          <p:cNvSpPr/>
+          <p:nvPr/>
+        </p:nvSpPr>
+        <p:spPr>
+          <a:xfrm>
+            <a:off x="1154757" y="2556435"/>
+            <a:ext cx="348052" cy="305570"/>
+          </a:xfrm>
+          <a:prstGeom prst="leftBrace">
+            <a:avLst/>
+          </a:prstGeom>
+          <a:ln w="19050">
+            <a:solidFill>
+              <a:schemeClr val="accent5"/>
+            </a:solidFill>
+          </a:ln>
+        </p:spPr>
+        <p:style>
+          <a:lnRef idx="1">
+            <a:schemeClr val="accent1"/>
+          </a:lnRef>
+          <a:fillRef idx="0">
+            <a:schemeClr val="accent1"/>
+          </a:fillRef>
+          <a:effectRef idx="0">
+            <a:schemeClr val="accent1"/>
+          </a:effectRef>
+          <a:fontRef idx="minor">
+            <a:schemeClr val="tx1"/>
+          </a:fontRef>
+        </p:style>
+        <p:txBody>
+          <a:bodyPr rtlCol="0" anchor="ctr"/>
+          <a:lstStyle/>
+          <a:p>
+            <a:pPr algn="ctr"/>
+            <a:endParaRPr lang="en-SG"/>
+          </a:p>
+        </p:txBody>
+      </p:sp>
+      <p:sp>
+        <p:nvSpPr>
+          <p:cNvPr id="62" name="TextBox 61">
+            <a:extLst>
+              <a:ext uri="{FF2B5EF4-FFF2-40B4-BE49-F238E27FC236}">
+                <a16:creationId xmlns:a16="http://schemas.microsoft.com/office/drawing/2014/main" id="{3C528547-1EDA-0344-9C22-58F28B4D7B80}"/>
+              </a:ext>
+            </a:extLst>
+          </p:cNvPr>
+          <p:cNvSpPr txBox="1"/>
+          <p:nvPr/>
+        </p:nvSpPr>
+        <p:spPr>
+          <a:xfrm>
+            <a:off x="0" y="2478387"/>
+            <a:ext cx="1243423" cy="461665"/>
+          </a:xfrm>
+          <a:prstGeom prst="rect">
+            <a:avLst/>
+          </a:prstGeom>
+          <a:noFill/>
+        </p:spPr>
+        <p:txBody>
+          <a:bodyPr wrap="square" rtlCol="0">
+            <a:spAutoFit/>
+          </a:bodyPr>
+          <a:lstStyle/>
+          <a:p>
+            <a:pPr algn="ctr"/>
+            <a:r>
+              <a:rPr lang="en-US" sz="1200" dirty="0">
+                <a:solidFill>
+                  <a:srgbClr val="0070C0"/>
+                </a:solidFill>
+              </a:rPr>
+              <a:t>summary-</a:t>
+            </a:r>
+            <a:r>
+              <a:rPr lang="en-US" sz="1200" dirty="0" err="1">
+                <a:solidFill>
+                  <a:srgbClr val="0070C0"/>
+                </a:solidFill>
+              </a:rPr>
+              <a:t>chart__ramp</a:t>
+            </a:r>
+            <a:endParaRPr lang="en-US" sz="1200" dirty="0">
+              <a:solidFill>
+                <a:srgbClr val="0070C0"/>
+              </a:solidFill>
+            </a:endParaRPr>
+          </a:p>
+        </p:txBody>
+      </p:sp>
+      <p:sp>
+        <p:nvSpPr>
+          <p:cNvPr id="68" name="Arrow: Right 11">
+            <a:extLst>
+              <a:ext uri="{FF2B5EF4-FFF2-40B4-BE49-F238E27FC236}">
+                <a16:creationId xmlns:a16="http://schemas.microsoft.com/office/drawing/2014/main" id="{11133928-A68D-214C-83C4-13C29E068764}"/>
+              </a:ext>
+            </a:extLst>
+          </p:cNvPr>
+          <p:cNvSpPr/>
+          <p:nvPr/>
+        </p:nvSpPr>
+        <p:spPr>
+          <a:xfrm>
+            <a:off x="8260503" y="1926981"/>
+            <a:ext cx="402336" cy="121920"/>
+          </a:xfrm>
+          <a:prstGeom prst="rightArrow">
+            <a:avLst/>
+          </a:prstGeom>
+        </p:spPr>
+        <p:style>
+          <a:lnRef idx="2">
+            <a:schemeClr val="accent6">
+              <a:shade val="50000"/>
+            </a:schemeClr>
+          </a:lnRef>
+          <a:fillRef idx="1">
+            <a:schemeClr val="accent6"/>
+          </a:fillRef>
+          <a:effectRef idx="0">
+            <a:schemeClr val="accent6"/>
+          </a:effectRef>
+          <a:fontRef idx="minor">
+            <a:schemeClr val="lt1"/>
+          </a:fontRef>
+        </p:style>
+        <p:txBody>
+          <a:bodyPr rtlCol="0" anchor="ctr"/>
+          <a:lstStyle/>
+          <a:p>
+            <a:pPr algn="ctr"/>
+            <a:endParaRPr lang="en-SG"/>
+          </a:p>
+        </p:txBody>
+      </p:sp>
+      <p:sp>
+        <p:nvSpPr>
+          <p:cNvPr id="69" name="TextBox 68">
+            <a:extLst>
+              <a:ext uri="{FF2B5EF4-FFF2-40B4-BE49-F238E27FC236}">
+                <a16:creationId xmlns:a16="http://schemas.microsoft.com/office/drawing/2014/main" id="{D26E4E26-EF97-A547-93AF-6C3384E7A51F}"/>
+              </a:ext>
+            </a:extLst>
+          </p:cNvPr>
+          <p:cNvSpPr txBox="1"/>
+          <p:nvPr/>
+        </p:nvSpPr>
+        <p:spPr>
+          <a:xfrm>
+            <a:off x="8662938" y="1833505"/>
+            <a:ext cx="1080151" cy="276999"/>
+          </a:xfrm>
+          <a:prstGeom prst="rect">
+            <a:avLst/>
+          </a:prstGeom>
+          <a:noFill/>
+        </p:spPr>
+        <p:txBody>
+          <a:bodyPr wrap="square" rtlCol="0">
+            <a:spAutoFit/>
+          </a:bodyPr>
+          <a:lstStyle/>
+          <a:p>
+            <a:r>
+              <a:rPr lang="en-US" sz="1200" dirty="0">
+                <a:solidFill>
+                  <a:schemeClr val="accent6">
+                    <a:lumMod val="75000"/>
+                  </a:schemeClr>
+                </a:solidFill>
+              </a:rPr>
+              <a:t>glob filter</a:t>
+            </a:r>
+            <a:endParaRPr lang="en-SG" sz="1200" dirty="0">
+              <a:solidFill>
+                <a:schemeClr val="accent6">
+                  <a:lumMod val="75000"/>
+                </a:schemeClr>
+              </a:solidFill>
+            </a:endParaRPr>
+          </a:p>
+        </p:txBody>
+      </p:sp>
+      <p:sp>
+        <p:nvSpPr>
+          <p:cNvPr id="70" name="Arrow: Left 47">
+            <a:extLst>
+              <a:ext uri="{FF2B5EF4-FFF2-40B4-BE49-F238E27FC236}">
+                <a16:creationId xmlns:a16="http://schemas.microsoft.com/office/drawing/2014/main" id="{EA9C9FB0-FAE2-D641-97A9-DF6605E5210F}"/>
+              </a:ext>
+            </a:extLst>
+          </p:cNvPr>
+          <p:cNvSpPr/>
+          <p:nvPr/>
+        </p:nvSpPr>
+        <p:spPr>
+          <a:xfrm rot="10800000">
+            <a:off x="8338253" y="2419612"/>
+            <a:ext cx="348052" cy="96793"/>
+          </a:xfrm>
+          <a:prstGeom prst="leftArrow">
+            <a:avLst/>
+          </a:prstGeom>
+          <a:solidFill>
+            <a:srgbClr val="C00000"/>
+          </a:solidFill>
+          <a:ln>
+            <a:solidFill>
+              <a:srgbClr val="C00000"/>
+            </a:solidFill>
+          </a:ln>
+        </p:spPr>
+        <p:style>
+          <a:lnRef idx="2">
+            <a:schemeClr val="dk1">
+              <a:shade val="50000"/>
+            </a:schemeClr>
+          </a:lnRef>
+          <a:fillRef idx="1">
             <a:schemeClr val="dk1"/>
           </a:fillRef>
           <a:effectRef idx="0">
             <a:schemeClr val="dk1"/>
           </a:effectRef>
           <a:fontRef idx="minor">
-            <a:schemeClr val="tx1"/>
+            <a:schemeClr val="lt1"/>
           </a:fontRef>
         </p:style>
-      </p:cxnSp>
-      <p:sp>
-        <p:nvSpPr>
-          <p:cNvPr id="35" name="文本框 34">
-            <a:extLst>
-              <a:ext uri="{FF2B5EF4-FFF2-40B4-BE49-F238E27FC236}">
-                <a16:creationId xmlns:a16="http://schemas.microsoft.com/office/drawing/2014/main" id="{35D1BD6E-5F94-4F43-8079-6CD33DA8515D}"/>
-              </a:ext>
-            </a:extLst>
-          </p:cNvPr>
-          <p:cNvSpPr txBox="1"/>
+        <p:txBody>
+          <a:bodyPr rtlCol="0" anchor="ctr"/>
+          <a:lstStyle/>
+          <a:p>
+            <a:pPr algn="ctr"/>
+            <a:endParaRPr lang="en-SG"/>
+          </a:p>
+        </p:txBody>
+      </p:sp>
+      <p:sp>
+        <p:nvSpPr>
+          <p:cNvPr id="71" name="Arrow: Left 47">
+            <a:extLst>
+              <a:ext uri="{FF2B5EF4-FFF2-40B4-BE49-F238E27FC236}">
+                <a16:creationId xmlns:a16="http://schemas.microsoft.com/office/drawing/2014/main" id="{F7FC1778-C9DC-F24D-AA1E-1D70DFA1E7D8}"/>
+              </a:ext>
+            </a:extLst>
+          </p:cNvPr>
+          <p:cNvSpPr/>
           <p:nvPr/>
         </p:nvSpPr>
         <p:spPr>
-          <a:xfrm>
-            <a:off x="2841057" y="4352409"/>
-            <a:ext cx="3537747" cy="369332"/>
-          </a:xfrm>
-          <a:prstGeom prst="rect">
+          <a:xfrm rot="10800000">
+            <a:off x="10686760" y="4241786"/>
+            <a:ext cx="348052" cy="96793"/>
+          </a:xfrm>
+          <a:prstGeom prst="leftArrow">
             <a:avLst/>
           </a:prstGeom>
-          <a:noFill/>
-        </p:spPr>
-        <p:txBody>
-          <a:bodyPr wrap="square" rtlCol="0">
-            <a:spAutoFit/>
-          </a:bodyPr>
-          <a:lstStyle/>
-          <a:p>
-            <a:r>
-              <a:rPr lang="en-US" altLang="zh-CN" dirty="0"/>
-              <a:t>summary-</a:t>
-            </a:r>
-            <a:r>
-              <a:rPr lang="en-US" altLang="zh-CN" dirty="0" err="1"/>
-              <a:t>chart__ramp__slice</a:t>
-            </a:r>
-            <a:endParaRPr lang="zh-CN" altLang="en-US" sz="1400" dirty="0"/>
-          </a:p>
-        </p:txBody>
-      </p:sp>
-      <p:cxnSp>
-        <p:nvCxnSpPr>
-          <p:cNvPr id="38" name="直接箭头连接符 37">
-            <a:extLst>
-              <a:ext uri="{FF2B5EF4-FFF2-40B4-BE49-F238E27FC236}">
-                <a16:creationId xmlns:a16="http://schemas.microsoft.com/office/drawing/2014/main" id="{0866A2EB-BEED-4C21-A5CB-7F482C925D7D}"/>
-              </a:ext>
-            </a:extLst>
-          </p:cNvPr>
-          <p:cNvCxnSpPr>
-            <a:cxnSpLocks/>
-          </p:cNvCxnSpPr>
-          <p:nvPr/>
-        </p:nvCxnSpPr>
-        <p:spPr>
-          <a:xfrm flipH="1" flipV="1">
-            <a:off x="2766975" y="3802472"/>
-            <a:ext cx="754398" cy="95995"/>
-          </a:xfrm>
-          <a:prstGeom prst="straightConnector1">
-            <a:avLst/>
-          </a:prstGeom>
-          <a:ln w="28575">
-            <a:tailEnd type="triangle"/>
+          <a:solidFill>
+            <a:schemeClr val="accent4">
+              <a:lumMod val="75000"/>
+            </a:schemeClr>
+          </a:solidFill>
+          <a:ln>
+            <a:solidFill>
+              <a:schemeClr val="accent4">
+                <a:lumMod val="75000"/>
+              </a:schemeClr>
+            </a:solidFill>
           </a:ln>
         </p:spPr>
         <p:style>
-          <a:lnRef idx="1">
-            <a:schemeClr val="dk1"/>
+          <a:lnRef idx="2">
+            <a:schemeClr val="dk1">
+              <a:shade val="50000"/>
+            </a:schemeClr>
           </a:lnRef>
-          <a:fillRef idx="0">
+          <a:fillRef idx="1">
             <a:schemeClr val="dk1"/>
           </a:fillRef>
           <a:effectRef idx="0">
             <a:schemeClr val="dk1"/>
           </a:effectRef>
           <a:fontRef idx="minor">
-            <a:schemeClr val="tx1"/>
+            <a:schemeClr val="lt1"/>
           </a:fontRef>
         </p:style>
-      </p:cxnSp>
-      <p:sp>
-        <p:nvSpPr>
-          <p:cNvPr id="39" name="文本框 38">
-            <a:extLst>
-              <a:ext uri="{FF2B5EF4-FFF2-40B4-BE49-F238E27FC236}">
-                <a16:creationId xmlns:a16="http://schemas.microsoft.com/office/drawing/2014/main" id="{C0C87854-AB17-4C5B-8C34-55C86ADFFD5A}"/>
-              </a:ext>
-            </a:extLst>
-          </p:cNvPr>
-          <p:cNvSpPr txBox="1"/>
-          <p:nvPr/>
-        </p:nvSpPr>
-        <p:spPr>
-          <a:xfrm>
-            <a:off x="3472062" y="3713801"/>
-            <a:ext cx="3788273" cy="369332"/>
-          </a:xfrm>
-          <a:prstGeom prst="rect">
-            <a:avLst/>
-          </a:prstGeom>
-          <a:noFill/>
-        </p:spPr>
-        <p:txBody>
-          <a:bodyPr wrap="square" rtlCol="0">
-            <a:spAutoFit/>
-          </a:bodyPr>
-          <a:lstStyle/>
-          <a:p>
-            <a:r>
-              <a:rPr lang="en-US" altLang="zh-CN" dirty="0"/>
-              <a:t>summary-chart__</a:t>
-            </a:r>
-            <a:r>
-              <a:rPr lang="en-US" altLang="zh-CN" dirty="0" err="1"/>
-              <a:t>contrib</a:t>
-            </a:r>
-            <a:endParaRPr lang="zh-CN" altLang="en-US" sz="1600" dirty="0"/>
-          </a:p>
-        </p:txBody>
-      </p:sp>
-      <p:cxnSp>
-        <p:nvCxnSpPr>
-          <p:cNvPr id="44" name="直接箭头连接符 43">
-            <a:extLst>
-              <a:ext uri="{FF2B5EF4-FFF2-40B4-BE49-F238E27FC236}">
-                <a16:creationId xmlns:a16="http://schemas.microsoft.com/office/drawing/2014/main" id="{5AC745B7-A422-4E0C-A7D4-2AE5E9D2CF29}"/>
-              </a:ext>
-            </a:extLst>
-          </p:cNvPr>
-          <p:cNvCxnSpPr>
-            <a:cxnSpLocks/>
-          </p:cNvCxnSpPr>
-          <p:nvPr/>
-        </p:nvCxnSpPr>
-        <p:spPr>
-          <a:xfrm flipH="1" flipV="1">
-            <a:off x="10373223" y="4537075"/>
-            <a:ext cx="754398" cy="95995"/>
-          </a:xfrm>
-          <a:prstGeom prst="straightConnector1">
-            <a:avLst/>
-          </a:prstGeom>
-          <a:ln w="28575">
-            <a:tailEnd type="triangle"/>
-          </a:ln>
-        </p:spPr>
-        <p:style>
-          <a:lnRef idx="1">
-            <a:schemeClr val="dk1"/>
-          </a:lnRef>
-          <a:fillRef idx="0">
-            <a:schemeClr val="dk1"/>
-          </a:fillRef>
-          <a:effectRef idx="0">
-            <a:schemeClr val="dk1"/>
-          </a:effectRef>
-          <a:fontRef idx="minor">
-            <a:schemeClr val="tx1"/>
-          </a:fontRef>
-        </p:style>
-      </p:cxnSp>
-      <p:sp>
-        <p:nvSpPr>
-          <p:cNvPr id="45" name="文本框 44">
-            <a:extLst>
-              <a:ext uri="{FF2B5EF4-FFF2-40B4-BE49-F238E27FC236}">
-                <a16:creationId xmlns:a16="http://schemas.microsoft.com/office/drawing/2014/main" id="{A0A1A4A5-828A-4BF9-94DF-CD28CBD612CF}"/>
-              </a:ext>
-            </a:extLst>
-          </p:cNvPr>
-          <p:cNvSpPr txBox="1"/>
-          <p:nvPr/>
-        </p:nvSpPr>
-        <p:spPr>
-          <a:xfrm>
-            <a:off x="11114306" y="4427216"/>
-            <a:ext cx="550952" cy="369332"/>
-          </a:xfrm>
-          <a:prstGeom prst="rect">
-            <a:avLst/>
-          </a:prstGeom>
-          <a:noFill/>
-        </p:spPr>
-        <p:txBody>
-          <a:bodyPr wrap="square" rtlCol="0">
-            <a:spAutoFit/>
-          </a:bodyPr>
-          <a:lstStyle/>
-          <a:p>
-            <a:r>
-              <a:rPr lang="en-US" altLang="zh-CN" dirty="0"/>
-              <a:t>file</a:t>
-            </a:r>
-            <a:endParaRPr lang="zh-CN" altLang="en-US" sz="1600" dirty="0"/>
-          </a:p>
-        </p:txBody>
-      </p:sp>
-      <p:cxnSp>
-        <p:nvCxnSpPr>
-          <p:cNvPr id="46" name="直接箭头连接符 45">
-            <a:extLst>
-              <a:ext uri="{FF2B5EF4-FFF2-40B4-BE49-F238E27FC236}">
-                <a16:creationId xmlns:a16="http://schemas.microsoft.com/office/drawing/2014/main" id="{3B381D0C-8056-4A23-A73C-A4BC566D0643}"/>
-              </a:ext>
-            </a:extLst>
-          </p:cNvPr>
-          <p:cNvCxnSpPr>
-            <a:cxnSpLocks/>
-          </p:cNvCxnSpPr>
-          <p:nvPr/>
-        </p:nvCxnSpPr>
-        <p:spPr>
-          <a:xfrm flipH="1">
-            <a:off x="8740270" y="2146335"/>
-            <a:ext cx="743681" cy="1"/>
-          </a:xfrm>
-          <a:prstGeom prst="straightConnector1">
-            <a:avLst/>
-          </a:prstGeom>
-          <a:ln w="28575">
-            <a:tailEnd type="triangle"/>
-          </a:ln>
-        </p:spPr>
-        <p:style>
-          <a:lnRef idx="1">
-            <a:schemeClr val="dk1"/>
-          </a:lnRef>
-          <a:fillRef idx="0">
-            <a:schemeClr val="dk1"/>
-          </a:fillRef>
-          <a:effectRef idx="0">
-            <a:schemeClr val="dk1"/>
-          </a:effectRef>
-          <a:fontRef idx="minor">
-            <a:schemeClr val="tx1"/>
-          </a:fontRef>
-        </p:style>
-      </p:cxnSp>
-      <p:sp>
-        <p:nvSpPr>
-          <p:cNvPr id="47" name="文本框 46">
-            <a:extLst>
-              <a:ext uri="{FF2B5EF4-FFF2-40B4-BE49-F238E27FC236}">
-                <a16:creationId xmlns:a16="http://schemas.microsoft.com/office/drawing/2014/main" id="{8A40C309-DFD1-4333-84EB-9117C609942E}"/>
-              </a:ext>
-            </a:extLst>
-          </p:cNvPr>
-          <p:cNvSpPr txBox="1"/>
-          <p:nvPr/>
-        </p:nvSpPr>
-        <p:spPr>
-          <a:xfrm>
-            <a:off x="9483951" y="1977058"/>
-            <a:ext cx="646691" cy="338554"/>
-          </a:xfrm>
-          <a:prstGeom prst="rect">
-            <a:avLst/>
-          </a:prstGeom>
-          <a:noFill/>
-        </p:spPr>
-        <p:txBody>
-          <a:bodyPr wrap="square" rtlCol="0">
-            <a:spAutoFit/>
-          </a:bodyPr>
-          <a:lstStyle/>
-          <a:p>
-            <a:r>
-              <a:rPr lang="en-US" altLang="zh-CN" sz="1600" dirty="0"/>
-              <a:t>title</a:t>
-            </a:r>
-            <a:endParaRPr lang="zh-CN" altLang="en-US" sz="1600" dirty="0"/>
-          </a:p>
-        </p:txBody>
-      </p:sp>
-      <p:cxnSp>
-        <p:nvCxnSpPr>
-          <p:cNvPr id="22" name="直接箭头连接符 45">
-            <a:extLst>
-              <a:ext uri="{FF2B5EF4-FFF2-40B4-BE49-F238E27FC236}">
-                <a16:creationId xmlns:a16="http://schemas.microsoft.com/office/drawing/2014/main" id="{6277504A-AF5B-AE43-8282-3FC382F853CA}"/>
-              </a:ext>
-            </a:extLst>
-          </p:cNvPr>
-          <p:cNvCxnSpPr>
-            <a:cxnSpLocks/>
-          </p:cNvCxnSpPr>
-          <p:nvPr/>
-        </p:nvCxnSpPr>
-        <p:spPr>
-          <a:xfrm flipH="1">
-            <a:off x="8368429" y="1778237"/>
-            <a:ext cx="743681" cy="1"/>
-          </a:xfrm>
-          <a:prstGeom prst="straightConnector1">
-            <a:avLst/>
-          </a:prstGeom>
-          <a:ln w="28575">
-            <a:tailEnd type="triangle"/>
-          </a:ln>
-        </p:spPr>
-        <p:style>
-          <a:lnRef idx="1">
-            <a:schemeClr val="dk1"/>
-          </a:lnRef>
-          <a:fillRef idx="0">
-            <a:schemeClr val="dk1"/>
-          </a:fillRef>
-          <a:effectRef idx="0">
-            <a:schemeClr val="dk1"/>
-          </a:effectRef>
-          <a:fontRef idx="minor">
-            <a:schemeClr val="tx1"/>
-          </a:fontRef>
-        </p:style>
-      </p:cxnSp>
-      <p:sp>
-        <p:nvSpPr>
-          <p:cNvPr id="23" name="文本框 46">
-            <a:extLst>
-              <a:ext uri="{FF2B5EF4-FFF2-40B4-BE49-F238E27FC236}">
-                <a16:creationId xmlns:a16="http://schemas.microsoft.com/office/drawing/2014/main" id="{E9E7343E-077D-3B43-92A7-61FB56C09A47}"/>
-              </a:ext>
-            </a:extLst>
-          </p:cNvPr>
-          <p:cNvSpPr txBox="1"/>
-          <p:nvPr/>
-        </p:nvSpPr>
-        <p:spPr>
-          <a:xfrm>
-            <a:off x="9112110" y="1593572"/>
-            <a:ext cx="1111828" cy="338554"/>
-          </a:xfrm>
-          <a:prstGeom prst="rect">
-            <a:avLst/>
-          </a:prstGeom>
-          <a:noFill/>
-        </p:spPr>
-        <p:txBody>
-          <a:bodyPr wrap="square" rtlCol="0">
-            <a:spAutoFit/>
-          </a:bodyPr>
-          <a:lstStyle/>
-          <a:p>
-            <a:r>
-              <a:rPr lang="en-US" altLang="zh-CN" sz="1600" dirty="0"/>
-              <a:t>glob filter</a:t>
-            </a:r>
-            <a:endParaRPr lang="zh-CN" altLang="en-US" sz="1600" dirty="0"/>
+        <p:txBody>
+          <a:bodyPr rtlCol="0" anchor="ctr"/>
+          <a:lstStyle/>
+          <a:p>
+            <a:pPr algn="ctr"/>
+            <a:endParaRPr lang="en-SG"/>
           </a:p>
         </p:txBody>
       </p:sp>

</xml_diff>

<commit_message>
Update report summary diagram
</commit_message>
<xml_diff>
--- a/docs/diagrams/report-summary.pptx
+++ b/docs/diagrams/report-summary.pptx
@@ -3381,6 +3381,11 @@
           <a:prstGeom prst="rect">
             <a:avLst/>
           </a:prstGeom>
+          <a:ln w="12700">
+            <a:solidFill>
+              <a:schemeClr val="tx1"/>
+            </a:solidFill>
+          </a:ln>
         </p:spPr>
       </p:pic>
       <p:sp>
@@ -3451,7 +3456,7 @@
         </p:nvSpPr>
         <p:spPr>
           <a:xfrm>
-            <a:off x="11042275" y="4144131"/>
+            <a:off x="10971251" y="4126375"/>
             <a:ext cx="750332" cy="276999"/>
           </a:xfrm>
           <a:prstGeom prst="rect">
@@ -3499,7 +3504,7 @@
         </p:nvSpPr>
         <p:spPr>
           <a:xfrm>
-            <a:off x="8666427" y="2315835"/>
+            <a:off x="8613159" y="2315835"/>
             <a:ext cx="849429" cy="276999"/>
           </a:xfrm>
           <a:prstGeom prst="rect">
@@ -3531,50 +3536,6 @@
       </p:sp>
       <p:sp>
         <p:nvSpPr>
-          <p:cNvPr id="21" name="Right Brace 20">
-            <a:extLst>
-              <a:ext uri="{FF2B5EF4-FFF2-40B4-BE49-F238E27FC236}">
-                <a16:creationId xmlns:a16="http://schemas.microsoft.com/office/drawing/2014/main" id="{9BD3E903-758E-2D47-AD99-018719F72293}"/>
-              </a:ext>
-            </a:extLst>
-          </p:cNvPr>
-          <p:cNvSpPr/>
-          <p:nvPr/>
-        </p:nvSpPr>
-        <p:spPr>
-          <a:xfrm rot="16200000">
-            <a:off x="3599688" y="-1681925"/>
-            <a:ext cx="344424" cy="4648200"/>
-          </a:xfrm>
-          <a:prstGeom prst="rightBrace">
-            <a:avLst/>
-          </a:prstGeom>
-        </p:spPr>
-        <p:style>
-          <a:lnRef idx="3">
-            <a:schemeClr val="accent1"/>
-          </a:lnRef>
-          <a:fillRef idx="0">
-            <a:schemeClr val="accent1"/>
-          </a:fillRef>
-          <a:effectRef idx="2">
-            <a:schemeClr val="accent1"/>
-          </a:effectRef>
-          <a:fontRef idx="minor">
-            <a:schemeClr val="tx1"/>
-          </a:fontRef>
-        </p:style>
-        <p:txBody>
-          <a:bodyPr rtlCol="0" anchor="ctr"/>
-          <a:lstStyle/>
-          <a:p>
-            <a:pPr algn="ctr"/>
-            <a:endParaRPr lang="en-SG"/>
-          </a:p>
-        </p:txBody>
-      </p:sp>
-      <p:sp>
-        <p:nvSpPr>
           <p:cNvPr id="24" name="TextBox 23">
             <a:extLst>
               <a:ext uri="{FF2B5EF4-FFF2-40B4-BE49-F238E27FC236}">
@@ -3587,7 +3548,7 @@
         </p:nvSpPr>
         <p:spPr>
           <a:xfrm>
-            <a:off x="2726436" y="79248"/>
+            <a:off x="2726436" y="163993"/>
             <a:ext cx="2090928" cy="276999"/>
           </a:xfrm>
           <a:prstGeom prst="rect">
@@ -3603,54 +3564,18 @@
           <a:p>
             <a:pPr algn="ctr"/>
             <a:r>
-              <a:rPr lang="en-US" sz="1200" dirty="0"/>
+              <a:rPr lang="en-US" sz="1200" dirty="0">
+                <a:solidFill>
+                  <a:schemeClr val="accent1"/>
+                </a:solidFill>
+              </a:rPr>
               <a:t>summary</a:t>
             </a:r>
-            <a:endParaRPr lang="en-SG" sz="1200" dirty="0"/>
-          </a:p>
-        </p:txBody>
-      </p:sp>
-      <p:sp>
-        <p:nvSpPr>
-          <p:cNvPr id="29" name="Right Brace 28">
-            <a:extLst>
-              <a:ext uri="{FF2B5EF4-FFF2-40B4-BE49-F238E27FC236}">
-                <a16:creationId xmlns:a16="http://schemas.microsoft.com/office/drawing/2014/main" id="{D3693491-4CC3-9C40-8CA3-0E17F4ACC7C5}"/>
-              </a:ext>
-            </a:extLst>
-          </p:cNvPr>
-          <p:cNvSpPr/>
-          <p:nvPr/>
-        </p:nvSpPr>
-        <p:spPr>
-          <a:xfrm rot="16200000">
-            <a:off x="8298180" y="-1631634"/>
-            <a:ext cx="344424" cy="4547616"/>
-          </a:xfrm>
-          <a:prstGeom prst="rightBrace">
-            <a:avLst/>
-          </a:prstGeom>
-        </p:spPr>
-        <p:style>
-          <a:lnRef idx="3">
-            <a:schemeClr val="accent2"/>
-          </a:lnRef>
-          <a:fillRef idx="0">
-            <a:schemeClr val="accent2"/>
-          </a:fillRef>
-          <a:effectRef idx="2">
-            <a:schemeClr val="accent2"/>
-          </a:effectRef>
-          <a:fontRef idx="minor">
-            <a:schemeClr val="tx1"/>
-          </a:fontRef>
-        </p:style>
-        <p:txBody>
-          <a:bodyPr rtlCol="0" anchor="ctr"/>
-          <a:lstStyle/>
-          <a:p>
-            <a:pPr algn="ctr"/>
-            <a:endParaRPr lang="en-SG"/>
+            <a:endParaRPr lang="en-SG" sz="1200" dirty="0">
+              <a:solidFill>
+                <a:schemeClr val="accent1"/>
+              </a:solidFill>
+            </a:endParaRPr>
           </a:p>
         </p:txBody>
       </p:sp>
@@ -3668,7 +3593,7 @@
         </p:nvSpPr>
         <p:spPr>
           <a:xfrm>
-            <a:off x="7424928" y="79248"/>
+            <a:off x="7432929" y="161454"/>
             <a:ext cx="2090928" cy="276999"/>
           </a:xfrm>
           <a:prstGeom prst="rect">
@@ -3684,10 +3609,18 @@
           <a:p>
             <a:pPr algn="ctr"/>
             <a:r>
-              <a:rPr lang="en-US" sz="1200" dirty="0"/>
+              <a:rPr lang="en-US" sz="1200" dirty="0">
+                <a:solidFill>
+                  <a:schemeClr val="accent2"/>
+                </a:solidFill>
+              </a:rPr>
               <a:t>tabs-pane</a:t>
             </a:r>
-            <a:endParaRPr lang="en-SG" sz="1200" dirty="0"/>
+            <a:endParaRPr lang="en-SG" sz="1200" dirty="0">
+              <a:solidFill>
+                <a:schemeClr val="accent2"/>
+              </a:solidFill>
+            </a:endParaRPr>
           </a:p>
         </p:txBody>
       </p:sp>
@@ -3747,53 +3680,6 @@
       </p:sp>
       <p:sp>
         <p:nvSpPr>
-          <p:cNvPr id="37" name="Left Brace 36">
-            <a:extLst>
-              <a:ext uri="{FF2B5EF4-FFF2-40B4-BE49-F238E27FC236}">
-                <a16:creationId xmlns:a16="http://schemas.microsoft.com/office/drawing/2014/main" id="{9494E5A0-E147-2A47-B20B-2B69B72DDFDC}"/>
-              </a:ext>
-            </a:extLst>
-          </p:cNvPr>
-          <p:cNvSpPr/>
-          <p:nvPr/>
-        </p:nvSpPr>
-        <p:spPr>
-          <a:xfrm>
-            <a:off x="1411366" y="896446"/>
-            <a:ext cx="516530" cy="869029"/>
-          </a:xfrm>
-          <a:prstGeom prst="leftBrace">
-            <a:avLst>
-              <a:gd name="adj1" fmla="val 14462"/>
-              <a:gd name="adj2" fmla="val 50000"/>
-            </a:avLst>
-          </a:prstGeom>
-        </p:spPr>
-        <p:style>
-          <a:lnRef idx="3">
-            <a:schemeClr val="accent6"/>
-          </a:lnRef>
-          <a:fillRef idx="0">
-            <a:schemeClr val="accent6"/>
-          </a:fillRef>
-          <a:effectRef idx="2">
-            <a:schemeClr val="accent6"/>
-          </a:effectRef>
-          <a:fontRef idx="minor">
-            <a:schemeClr val="tx1"/>
-          </a:fontRef>
-        </p:style>
-        <p:txBody>
-          <a:bodyPr rtlCol="0" anchor="ctr"/>
-          <a:lstStyle/>
-          <a:p>
-            <a:pPr algn="ctr"/>
-            <a:endParaRPr lang="en-SG"/>
-          </a:p>
-        </p:txBody>
-      </p:sp>
-      <p:sp>
-        <p:nvSpPr>
           <p:cNvPr id="40" name="TextBox 39">
             <a:extLst>
               <a:ext uri="{FF2B5EF4-FFF2-40B4-BE49-F238E27FC236}">
@@ -3853,7 +3739,7 @@
             <a:avLst/>
           </a:prstGeom>
           <a:noFill/>
-          <a:ln w="9525" cap="flat" cmpd="sng" algn="ctr">
+          <a:ln w="12700" cap="flat" cmpd="sng" algn="ctr">
             <a:solidFill>
               <a:schemeClr val="accent6"/>
             </a:solidFill>
@@ -3907,9 +3793,9 @@
             <a:avLst/>
           </a:prstGeom>
           <a:noFill/>
-          <a:ln w="28575" cap="flat" cmpd="sng" algn="ctr">
+          <a:ln w="12700" cap="flat" cmpd="sng" algn="ctr">
             <a:solidFill>
-              <a:srgbClr val="A401FF"/>
+              <a:srgbClr val="7030A0"/>
             </a:solidFill>
             <a:prstDash val="solid"/>
             <a:round/>
@@ -3942,10 +3828,50 @@
       </p:sp>
       <p:sp>
         <p:nvSpPr>
-          <p:cNvPr id="43" name="Left Brace 42">
-            <a:extLst>
-              <a:ext uri="{FF2B5EF4-FFF2-40B4-BE49-F238E27FC236}">
-                <a16:creationId xmlns:a16="http://schemas.microsoft.com/office/drawing/2014/main" id="{14E73C6F-03E1-4A48-B245-93103C46EA60}"/>
+          <p:cNvPr id="48" name="TextBox 47">
+            <a:extLst>
+              <a:ext uri="{FF2B5EF4-FFF2-40B4-BE49-F238E27FC236}">
+                <a16:creationId xmlns:a16="http://schemas.microsoft.com/office/drawing/2014/main" id="{A77BE544-7145-6949-94AF-AFCE5DA7C7AD}"/>
+              </a:ext>
+            </a:extLst>
+          </p:cNvPr>
+          <p:cNvSpPr txBox="1"/>
+          <p:nvPr/>
+        </p:nvSpPr>
+        <p:spPr>
+          <a:xfrm>
+            <a:off x="18534" y="2026833"/>
+            <a:ext cx="1202954" cy="276999"/>
+          </a:xfrm>
+          <a:prstGeom prst="rect">
+            <a:avLst/>
+          </a:prstGeom>
+          <a:noFill/>
+        </p:spPr>
+        <p:txBody>
+          <a:bodyPr wrap="square" rtlCol="0">
+            <a:spAutoFit/>
+          </a:bodyPr>
+          <a:lstStyle/>
+          <a:p>
+            <a:pPr algn="ctr"/>
+            <a:r>
+              <a:rPr lang="en-US" sz="1200" dirty="0">
+                <a:solidFill>
+                  <a:srgbClr val="7030A0"/>
+                </a:solidFill>
+              </a:rPr>
+              <a:t>summary-chart</a:t>
+            </a:r>
+          </a:p>
+        </p:txBody>
+      </p:sp>
+      <p:sp>
+        <p:nvSpPr>
+          <p:cNvPr id="49" name="Rectangle 48">
+            <a:extLst>
+              <a:ext uri="{FF2B5EF4-FFF2-40B4-BE49-F238E27FC236}">
+                <a16:creationId xmlns:a16="http://schemas.microsoft.com/office/drawing/2014/main" id="{5720B1C7-874B-4E44-A7D1-E44FC02B40B3}"/>
               </a:ext>
             </a:extLst>
           </p:cNvPr>
@@ -3954,17 +3880,329 @@
         </p:nvSpPr>
         <p:spPr>
           <a:xfrm>
-            <a:off x="1142042" y="1950544"/>
-            <a:ext cx="348052" cy="449190"/>
-          </a:xfrm>
-          <a:prstGeom prst="leftBrace">
+            <a:off x="1526181" y="3880858"/>
+            <a:ext cx="4482462" cy="96793"/>
+          </a:xfrm>
+          <a:prstGeom prst="rect">
             <a:avLst/>
           </a:prstGeom>
-          <a:ln w="19050">
+          <a:noFill/>
+          <a:ln w="9525" cap="flat" cmpd="sng" algn="ctr">
             <a:solidFill>
-              <a:srgbClr val="A401FF"/>
+              <a:schemeClr val="dk1"/>
             </a:solidFill>
+            <a:prstDash val="solid"/>
+            <a:round/>
+            <a:headEnd type="none" w="med" len="med"/>
+            <a:tailEnd type="none" w="med" len="med"/>
           </a:ln>
+        </p:spPr>
+        <p:style>
+          <a:lnRef idx="0">
+            <a:scrgbClr r="0" g="0" b="0"/>
+          </a:lnRef>
+          <a:fillRef idx="0">
+            <a:scrgbClr r="0" g="0" b="0"/>
+          </a:fillRef>
+          <a:effectRef idx="0">
+            <a:scrgbClr r="0" g="0" b="0"/>
+          </a:effectRef>
+          <a:fontRef idx="minor">
+            <a:schemeClr val="dk1"/>
+          </a:fontRef>
+        </p:style>
+        <p:txBody>
+          <a:bodyPr rtlCol="0" anchor="ctr"/>
+          <a:lstStyle/>
+          <a:p>
+            <a:pPr algn="ctr"/>
+            <a:endParaRPr lang="en-SG"/>
+          </a:p>
+        </p:txBody>
+      </p:sp>
+      <p:sp>
+        <p:nvSpPr>
+          <p:cNvPr id="51" name="TextBox 50">
+            <a:extLst>
+              <a:ext uri="{FF2B5EF4-FFF2-40B4-BE49-F238E27FC236}">
+                <a16:creationId xmlns:a16="http://schemas.microsoft.com/office/drawing/2014/main" id="{6C2AF7FB-234B-7347-967F-A89B873E0061}"/>
+              </a:ext>
+            </a:extLst>
+          </p:cNvPr>
+          <p:cNvSpPr txBox="1"/>
+          <p:nvPr/>
+        </p:nvSpPr>
+        <p:spPr>
+          <a:xfrm>
+            <a:off x="57153" y="3729919"/>
+            <a:ext cx="1589577" cy="461665"/>
+          </a:xfrm>
+          <a:prstGeom prst="rect">
+            <a:avLst/>
+          </a:prstGeom>
+          <a:noFill/>
+        </p:spPr>
+        <p:txBody>
+          <a:bodyPr wrap="square" rtlCol="0">
+            <a:spAutoFit/>
+          </a:bodyPr>
+          <a:lstStyle/>
+          <a:p>
+            <a:pPr algn="ctr"/>
+            <a:r>
+              <a:rPr lang="en-US" sz="1200" dirty="0"/>
+              <a:t>summary-</a:t>
+            </a:r>
+          </a:p>
+          <a:p>
+            <a:pPr algn="ctr"/>
+            <a:r>
+              <a:rPr lang="en-US" sz="1200" dirty="0"/>
+              <a:t>chart__</a:t>
+            </a:r>
+            <a:r>
+              <a:rPr lang="en-US" sz="1200" dirty="0" err="1"/>
+              <a:t>contrib</a:t>
+            </a:r>
+            <a:endParaRPr lang="en-SG" sz="1200" dirty="0"/>
+          </a:p>
+        </p:txBody>
+      </p:sp>
+      <p:sp>
+        <p:nvSpPr>
+          <p:cNvPr id="59" name="TextBox 58">
+            <a:extLst>
+              <a:ext uri="{FF2B5EF4-FFF2-40B4-BE49-F238E27FC236}">
+                <a16:creationId xmlns:a16="http://schemas.microsoft.com/office/drawing/2014/main" id="{9ED53A0E-FCFE-DE4A-9776-897FDA4E3D8F}"/>
+              </a:ext>
+            </a:extLst>
+          </p:cNvPr>
+          <p:cNvSpPr txBox="1"/>
+          <p:nvPr/>
+        </p:nvSpPr>
+        <p:spPr>
+          <a:xfrm>
+            <a:off x="3534831" y="4666268"/>
+            <a:ext cx="2516973" cy="276999"/>
+          </a:xfrm>
+          <a:prstGeom prst="rect">
+            <a:avLst/>
+          </a:prstGeom>
+          <a:noFill/>
+        </p:spPr>
+        <p:txBody>
+          <a:bodyPr wrap="square" rtlCol="0">
+            <a:spAutoFit/>
+          </a:bodyPr>
+          <a:lstStyle/>
+          <a:p>
+            <a:r>
+              <a:rPr lang="en-US" sz="1200" dirty="0">
+                <a:solidFill>
+                  <a:srgbClr val="FFC000"/>
+                </a:solidFill>
+              </a:rPr>
+              <a:t>summary-</a:t>
+            </a:r>
+            <a:r>
+              <a:rPr lang="en-US" sz="1200" dirty="0" err="1">
+                <a:solidFill>
+                  <a:srgbClr val="FFC000"/>
+                </a:solidFill>
+              </a:rPr>
+              <a:t>chart__ramp__slice</a:t>
+            </a:r>
+            <a:endParaRPr lang="en-SG" sz="1200" dirty="0">
+              <a:solidFill>
+                <a:srgbClr val="FFC000"/>
+              </a:solidFill>
+            </a:endParaRPr>
+          </a:p>
+        </p:txBody>
+      </p:sp>
+      <p:sp>
+        <p:nvSpPr>
+          <p:cNvPr id="60" name="Rectangle 59">
+            <a:extLst>
+              <a:ext uri="{FF2B5EF4-FFF2-40B4-BE49-F238E27FC236}">
+                <a16:creationId xmlns:a16="http://schemas.microsoft.com/office/drawing/2014/main" id="{0FE18B14-A8FF-CA40-9773-69CCCF32CE9A}"/>
+              </a:ext>
+            </a:extLst>
+          </p:cNvPr>
+          <p:cNvSpPr/>
+          <p:nvPr/>
+        </p:nvSpPr>
+        <p:spPr>
+          <a:xfrm>
+            <a:off x="1536198" y="2556435"/>
+            <a:ext cx="4482463" cy="305570"/>
+          </a:xfrm>
+          <a:prstGeom prst="rect">
+            <a:avLst/>
+          </a:prstGeom>
+          <a:noFill/>
+          <a:ln w="12700" cap="flat" cmpd="sng" algn="ctr">
+            <a:solidFill>
+              <a:schemeClr val="accent5"/>
+            </a:solidFill>
+            <a:prstDash val="solid"/>
+            <a:round/>
+            <a:headEnd type="none" w="med" len="med"/>
+            <a:tailEnd type="none" w="med" len="med"/>
+          </a:ln>
+        </p:spPr>
+        <p:style>
+          <a:lnRef idx="0">
+            <a:scrgbClr r="0" g="0" b="0"/>
+          </a:lnRef>
+          <a:fillRef idx="0">
+            <a:scrgbClr r="0" g="0" b="0"/>
+          </a:fillRef>
+          <a:effectRef idx="0">
+            <a:scrgbClr r="0" g="0" b="0"/>
+          </a:effectRef>
+          <a:fontRef idx="minor">
+            <a:schemeClr val="accent4"/>
+          </a:fontRef>
+        </p:style>
+        <p:txBody>
+          <a:bodyPr rtlCol="0" anchor="ctr"/>
+          <a:lstStyle/>
+          <a:p>
+            <a:pPr algn="ctr"/>
+            <a:endParaRPr lang="en-SG" dirty="0">
+              <a:highlight>
+                <a:srgbClr val="FFFF00"/>
+              </a:highlight>
+            </a:endParaRPr>
+          </a:p>
+        </p:txBody>
+      </p:sp>
+      <p:sp>
+        <p:nvSpPr>
+          <p:cNvPr id="62" name="TextBox 61">
+            <a:extLst>
+              <a:ext uri="{FF2B5EF4-FFF2-40B4-BE49-F238E27FC236}">
+                <a16:creationId xmlns:a16="http://schemas.microsoft.com/office/drawing/2014/main" id="{3C528547-1EDA-0344-9C22-58F28B4D7B80}"/>
+              </a:ext>
+            </a:extLst>
+          </p:cNvPr>
+          <p:cNvSpPr txBox="1"/>
+          <p:nvPr/>
+        </p:nvSpPr>
+        <p:spPr>
+          <a:xfrm>
+            <a:off x="0" y="2478387"/>
+            <a:ext cx="1243423" cy="461665"/>
+          </a:xfrm>
+          <a:prstGeom prst="rect">
+            <a:avLst/>
+          </a:prstGeom>
+          <a:noFill/>
+        </p:spPr>
+        <p:txBody>
+          <a:bodyPr wrap="square" rtlCol="0">
+            <a:spAutoFit/>
+          </a:bodyPr>
+          <a:lstStyle/>
+          <a:p>
+            <a:pPr algn="ctr"/>
+            <a:r>
+              <a:rPr lang="en-US" sz="1200" dirty="0">
+                <a:solidFill>
+                  <a:srgbClr val="0070C0"/>
+                </a:solidFill>
+              </a:rPr>
+              <a:t>summary-</a:t>
+            </a:r>
+            <a:r>
+              <a:rPr lang="en-US" sz="1200" dirty="0" err="1">
+                <a:solidFill>
+                  <a:srgbClr val="0070C0"/>
+                </a:solidFill>
+              </a:rPr>
+              <a:t>chart__ramp</a:t>
+            </a:r>
+            <a:endParaRPr lang="en-US" sz="1200" dirty="0">
+              <a:solidFill>
+                <a:srgbClr val="0070C0"/>
+              </a:solidFill>
+            </a:endParaRPr>
+          </a:p>
+        </p:txBody>
+      </p:sp>
+      <p:sp>
+        <p:nvSpPr>
+          <p:cNvPr id="69" name="TextBox 68">
+            <a:extLst>
+              <a:ext uri="{FF2B5EF4-FFF2-40B4-BE49-F238E27FC236}">
+                <a16:creationId xmlns:a16="http://schemas.microsoft.com/office/drawing/2014/main" id="{D26E4E26-EF97-A547-93AF-6C3384E7A51F}"/>
+              </a:ext>
+            </a:extLst>
+          </p:cNvPr>
+          <p:cNvSpPr txBox="1"/>
+          <p:nvPr/>
+        </p:nvSpPr>
+        <p:spPr>
+          <a:xfrm>
+            <a:off x="8600792" y="1869016"/>
+            <a:ext cx="1080151" cy="276999"/>
+          </a:xfrm>
+          <a:prstGeom prst="rect">
+            <a:avLst/>
+          </a:prstGeom>
+          <a:noFill/>
+        </p:spPr>
+        <p:txBody>
+          <a:bodyPr wrap="square" rtlCol="0">
+            <a:spAutoFit/>
+          </a:bodyPr>
+          <a:lstStyle/>
+          <a:p>
+            <a:r>
+              <a:rPr lang="en-US" sz="1200" dirty="0">
+                <a:solidFill>
+                  <a:schemeClr val="accent6">
+                    <a:lumMod val="75000"/>
+                  </a:schemeClr>
+                </a:solidFill>
+              </a:rPr>
+              <a:t>glob filter</a:t>
+            </a:r>
+            <a:endParaRPr lang="en-SG" sz="1200" dirty="0">
+              <a:solidFill>
+                <a:schemeClr val="accent6">
+                  <a:lumMod val="75000"/>
+                </a:schemeClr>
+              </a:solidFill>
+            </a:endParaRPr>
+          </a:p>
+        </p:txBody>
+      </p:sp>
+      <p:cxnSp>
+        <p:nvCxnSpPr>
+          <p:cNvPr id="3" name="Straight Connector 2">
+            <a:extLst>
+              <a:ext uri="{FF2B5EF4-FFF2-40B4-BE49-F238E27FC236}">
+                <a16:creationId xmlns:a16="http://schemas.microsoft.com/office/drawing/2014/main" id="{C2BD86CC-DB2A-5940-A2BC-0B4EC63FFA8A}"/>
+              </a:ext>
+            </a:extLst>
+          </p:cNvPr>
+          <p:cNvCxnSpPr>
+            <a:cxnSpLocks/>
+            <a:endCxn id="34" idx="0"/>
+          </p:cNvCxnSpPr>
+          <p:nvPr/>
+        </p:nvCxnSpPr>
+        <p:spPr>
+          <a:xfrm>
+            <a:off x="3747897" y="483476"/>
+            <a:ext cx="0" cy="330910"/>
+          </a:xfrm>
+          <a:prstGeom prst="line">
+            <a:avLst/>
+          </a:prstGeom>
+          <a:ln w="57150"/>
         </p:spPr>
         <p:style>
           <a:lnRef idx="1">
@@ -3980,209 +4218,13 @@
             <a:schemeClr val="tx1"/>
           </a:fontRef>
         </p:style>
-        <p:txBody>
-          <a:bodyPr rtlCol="0" anchor="ctr"/>
-          <a:lstStyle/>
-          <a:p>
-            <a:pPr algn="ctr"/>
-            <a:endParaRPr lang="en-SG"/>
-          </a:p>
-        </p:txBody>
-      </p:sp>
-      <p:sp>
-        <p:nvSpPr>
-          <p:cNvPr id="48" name="TextBox 47">
-            <a:extLst>
-              <a:ext uri="{FF2B5EF4-FFF2-40B4-BE49-F238E27FC236}">
-                <a16:creationId xmlns:a16="http://schemas.microsoft.com/office/drawing/2014/main" id="{A77BE544-7145-6949-94AF-AFCE5DA7C7AD}"/>
-              </a:ext>
-            </a:extLst>
-          </p:cNvPr>
-          <p:cNvSpPr txBox="1"/>
-          <p:nvPr/>
-        </p:nvSpPr>
-        <p:spPr>
-          <a:xfrm>
-            <a:off x="18534" y="2026833"/>
-            <a:ext cx="1202954" cy="276999"/>
-          </a:xfrm>
-          <a:prstGeom prst="rect">
-            <a:avLst/>
-          </a:prstGeom>
-          <a:noFill/>
-        </p:spPr>
-        <p:txBody>
-          <a:bodyPr wrap="square" rtlCol="0">
-            <a:spAutoFit/>
-          </a:bodyPr>
-          <a:lstStyle/>
-          <a:p>
-            <a:pPr algn="ctr"/>
-            <a:r>
-              <a:rPr lang="en-US" sz="1200" dirty="0">
-                <a:solidFill>
-                  <a:srgbClr val="7030A0"/>
-                </a:solidFill>
-              </a:rPr>
-              <a:t>summary-chart</a:t>
-            </a:r>
-          </a:p>
-        </p:txBody>
-      </p:sp>
-      <p:sp>
-        <p:nvSpPr>
-          <p:cNvPr id="49" name="Rectangle 48">
-            <a:extLst>
-              <a:ext uri="{FF2B5EF4-FFF2-40B4-BE49-F238E27FC236}">
-                <a16:creationId xmlns:a16="http://schemas.microsoft.com/office/drawing/2014/main" id="{5720B1C7-874B-4E44-A7D1-E44FC02B40B3}"/>
-              </a:ext>
-            </a:extLst>
-          </p:cNvPr>
-          <p:cNvSpPr/>
-          <p:nvPr/>
-        </p:nvSpPr>
-        <p:spPr>
-          <a:xfrm>
-            <a:off x="1526181" y="3880858"/>
-            <a:ext cx="4482462" cy="96793"/>
-          </a:xfrm>
-          <a:prstGeom prst="rect">
-            <a:avLst/>
-          </a:prstGeom>
-          <a:noFill/>
-          <a:ln w="9525" cap="flat" cmpd="sng" algn="ctr">
-            <a:solidFill>
-              <a:schemeClr val="dk1"/>
-            </a:solidFill>
-            <a:prstDash val="solid"/>
-            <a:round/>
-            <a:headEnd type="none" w="med" len="med"/>
-            <a:tailEnd type="none" w="med" len="med"/>
-          </a:ln>
-        </p:spPr>
-        <p:style>
-          <a:lnRef idx="0">
-            <a:scrgbClr r="0" g="0" b="0"/>
-          </a:lnRef>
-          <a:fillRef idx="0">
-            <a:scrgbClr r="0" g="0" b="0"/>
-          </a:fillRef>
-          <a:effectRef idx="0">
-            <a:scrgbClr r="0" g="0" b="0"/>
-          </a:effectRef>
-          <a:fontRef idx="minor">
-            <a:schemeClr val="dk1"/>
-          </a:fontRef>
-        </p:style>
-        <p:txBody>
-          <a:bodyPr rtlCol="0" anchor="ctr"/>
-          <a:lstStyle/>
-          <a:p>
-            <a:pPr algn="ctr"/>
-            <a:endParaRPr lang="en-SG"/>
-          </a:p>
-        </p:txBody>
-      </p:sp>
-      <p:sp>
-        <p:nvSpPr>
-          <p:cNvPr id="50" name="Arrow: Left 47">
-            <a:extLst>
-              <a:ext uri="{FF2B5EF4-FFF2-40B4-BE49-F238E27FC236}">
-                <a16:creationId xmlns:a16="http://schemas.microsoft.com/office/drawing/2014/main" id="{7457BEF7-1E31-E744-950A-37FC3FC20058}"/>
-              </a:ext>
-            </a:extLst>
-          </p:cNvPr>
-          <p:cNvSpPr/>
-          <p:nvPr/>
-        </p:nvSpPr>
-        <p:spPr>
-          <a:xfrm rot="2313406">
-            <a:off x="1193574" y="3701355"/>
-            <a:ext cx="348052" cy="96793"/>
-          </a:xfrm>
-          <a:prstGeom prst="leftArrow">
-            <a:avLst/>
-          </a:prstGeom>
-        </p:spPr>
-        <p:style>
-          <a:lnRef idx="2">
-            <a:schemeClr val="dk1">
-              <a:shade val="50000"/>
-            </a:schemeClr>
-          </a:lnRef>
-          <a:fillRef idx="1">
-            <a:schemeClr val="dk1"/>
-          </a:fillRef>
-          <a:effectRef idx="0">
-            <a:schemeClr val="dk1"/>
-          </a:effectRef>
-          <a:fontRef idx="minor">
-            <a:schemeClr val="lt1"/>
-          </a:fontRef>
-        </p:style>
-        <p:txBody>
-          <a:bodyPr rtlCol="0" anchor="ctr"/>
-          <a:lstStyle/>
-          <a:p>
-            <a:pPr algn="ctr"/>
-            <a:endParaRPr lang="en-SG"/>
-          </a:p>
-        </p:txBody>
-      </p:sp>
-      <p:sp>
-        <p:nvSpPr>
-          <p:cNvPr id="51" name="TextBox 50">
-            <a:extLst>
-              <a:ext uri="{FF2B5EF4-FFF2-40B4-BE49-F238E27FC236}">
-                <a16:creationId xmlns:a16="http://schemas.microsoft.com/office/drawing/2014/main" id="{6C2AF7FB-234B-7347-967F-A89B873E0061}"/>
-              </a:ext>
-            </a:extLst>
-          </p:cNvPr>
-          <p:cNvSpPr txBox="1"/>
-          <p:nvPr/>
-        </p:nvSpPr>
-        <p:spPr>
-          <a:xfrm>
-            <a:off x="31532" y="3188927"/>
-            <a:ext cx="1650123" cy="461665"/>
-          </a:xfrm>
-          <a:prstGeom prst="rect">
-            <a:avLst/>
-          </a:prstGeom>
-          <a:noFill/>
-        </p:spPr>
-        <p:txBody>
-          <a:bodyPr wrap="square" rtlCol="0">
-            <a:spAutoFit/>
-          </a:bodyPr>
-          <a:lstStyle/>
-          <a:p>
-            <a:pPr algn="ctr"/>
-            <a:r>
-              <a:rPr lang="en-US" sz="1200" dirty="0"/>
-              <a:t>summary-</a:t>
-            </a:r>
-          </a:p>
-          <a:p>
-            <a:pPr algn="ctr"/>
-            <a:r>
-              <a:rPr lang="en-US" sz="1200" dirty="0"/>
-              <a:t>chart__</a:t>
-            </a:r>
-            <a:r>
-              <a:rPr lang="en-US" sz="1200" dirty="0" err="1"/>
-              <a:t>contrib</a:t>
-            </a:r>
-            <a:endParaRPr lang="en-SG" sz="1200" dirty="0"/>
-          </a:p>
-        </p:txBody>
-      </p:sp>
+      </p:cxnSp>
       <p:cxnSp>
         <p:nvCxnSpPr>
-          <p:cNvPr id="58" name="Straight Arrow Connector 57">
-            <a:extLst>
-              <a:ext uri="{FF2B5EF4-FFF2-40B4-BE49-F238E27FC236}">
-                <a16:creationId xmlns:a16="http://schemas.microsoft.com/office/drawing/2014/main" id="{E1AC6A71-3A8D-E241-8A3F-9F7EE32F58B5}"/>
+          <p:cNvPr id="33" name="Straight Connector 32">
+            <a:extLst>
+              <a:ext uri="{FF2B5EF4-FFF2-40B4-BE49-F238E27FC236}">
+                <a16:creationId xmlns:a16="http://schemas.microsoft.com/office/drawing/2014/main" id="{FC014436-7174-7349-B726-708BC955C9C3}"/>
               </a:ext>
             </a:extLst>
           </p:cNvPr>
@@ -4192,165 +4234,16 @@
           <p:nvPr/>
         </p:nvCxnSpPr>
         <p:spPr>
-          <a:xfrm flipV="1">
-            <a:off x="4633568" y="3669675"/>
-            <a:ext cx="0" cy="484087"/>
-          </a:xfrm>
-          <a:prstGeom prst="straightConnector1">
+          <a:xfrm>
+            <a:off x="8482807" y="465408"/>
+            <a:ext cx="0" cy="330910"/>
+          </a:xfrm>
+          <a:prstGeom prst="line">
             <a:avLst/>
           </a:prstGeom>
-          <a:ln>
-            <a:tailEnd type="triangle"/>
-          </a:ln>
-        </p:spPr>
-        <p:style>
-          <a:lnRef idx="3">
-            <a:schemeClr val="accent4"/>
-          </a:lnRef>
-          <a:fillRef idx="0">
-            <a:schemeClr val="accent4"/>
-          </a:fillRef>
-          <a:effectRef idx="2">
-            <a:schemeClr val="accent4"/>
-          </a:effectRef>
-          <a:fontRef idx="minor">
-            <a:schemeClr val="tx1"/>
-          </a:fontRef>
-        </p:style>
-      </p:cxnSp>
-      <p:sp>
-        <p:nvSpPr>
-          <p:cNvPr id="59" name="TextBox 58">
-            <a:extLst>
-              <a:ext uri="{FF2B5EF4-FFF2-40B4-BE49-F238E27FC236}">
-                <a16:creationId xmlns:a16="http://schemas.microsoft.com/office/drawing/2014/main" id="{9ED53A0E-FCFE-DE4A-9776-897FDA4E3D8F}"/>
-              </a:ext>
-            </a:extLst>
-          </p:cNvPr>
-          <p:cNvSpPr txBox="1"/>
-          <p:nvPr/>
-        </p:nvSpPr>
-        <p:spPr>
-          <a:xfrm>
-            <a:off x="3499944" y="3392676"/>
-            <a:ext cx="2516973" cy="276999"/>
-          </a:xfrm>
-          <a:prstGeom prst="rect">
-            <a:avLst/>
-          </a:prstGeom>
-          <a:noFill/>
-        </p:spPr>
-        <p:txBody>
-          <a:bodyPr wrap="square" rtlCol="0">
-            <a:spAutoFit/>
-          </a:bodyPr>
-          <a:lstStyle/>
-          <a:p>
-            <a:r>
-              <a:rPr lang="en-US" sz="1200" dirty="0">
-                <a:solidFill>
-                  <a:srgbClr val="FFC000"/>
-                </a:solidFill>
-              </a:rPr>
-              <a:t>summary-</a:t>
-            </a:r>
-            <a:r>
-              <a:rPr lang="en-US" sz="1200" dirty="0" err="1">
-                <a:solidFill>
-                  <a:srgbClr val="FFC000"/>
-                </a:solidFill>
-              </a:rPr>
-              <a:t>chart__ramp__slice</a:t>
-            </a:r>
-            <a:endParaRPr lang="en-SG" sz="1200" dirty="0">
-              <a:solidFill>
-                <a:srgbClr val="FFC000"/>
-              </a:solidFill>
-            </a:endParaRPr>
-          </a:p>
-        </p:txBody>
-      </p:sp>
-      <p:sp>
-        <p:nvSpPr>
-          <p:cNvPr id="60" name="Rectangle 59">
-            <a:extLst>
-              <a:ext uri="{FF2B5EF4-FFF2-40B4-BE49-F238E27FC236}">
-                <a16:creationId xmlns:a16="http://schemas.microsoft.com/office/drawing/2014/main" id="{0FE18B14-A8FF-CA40-9773-69CCCF32CE9A}"/>
-              </a:ext>
-            </a:extLst>
-          </p:cNvPr>
-          <p:cNvSpPr/>
-          <p:nvPr/>
-        </p:nvSpPr>
-        <p:spPr>
-          <a:xfrm>
-            <a:off x="1536198" y="2556435"/>
-            <a:ext cx="4482463" cy="305570"/>
-          </a:xfrm>
-          <a:prstGeom prst="rect">
-            <a:avLst/>
-          </a:prstGeom>
-          <a:noFill/>
-          <a:ln w="28575" cap="flat" cmpd="sng" algn="ctr">
+          <a:ln w="57150">
             <a:solidFill>
-              <a:schemeClr val="accent5"/>
-            </a:solidFill>
-            <a:prstDash val="solid"/>
-            <a:round/>
-            <a:headEnd type="none" w="med" len="med"/>
-            <a:tailEnd type="none" w="med" len="med"/>
-          </a:ln>
-        </p:spPr>
-        <p:style>
-          <a:lnRef idx="0">
-            <a:scrgbClr r="0" g="0" b="0"/>
-          </a:lnRef>
-          <a:fillRef idx="0">
-            <a:scrgbClr r="0" g="0" b="0"/>
-          </a:fillRef>
-          <a:effectRef idx="0">
-            <a:scrgbClr r="0" g="0" b="0"/>
-          </a:effectRef>
-          <a:fontRef idx="minor">
-            <a:schemeClr val="accent4"/>
-          </a:fontRef>
-        </p:style>
-        <p:txBody>
-          <a:bodyPr rtlCol="0" anchor="ctr"/>
-          <a:lstStyle/>
-          <a:p>
-            <a:pPr algn="ctr"/>
-            <a:endParaRPr lang="en-SG" dirty="0">
-              <a:highlight>
-                <a:srgbClr val="FFFF00"/>
-              </a:highlight>
-            </a:endParaRPr>
-          </a:p>
-        </p:txBody>
-      </p:sp>
-      <p:sp>
-        <p:nvSpPr>
-          <p:cNvPr id="61" name="Left Brace 60">
-            <a:extLst>
-              <a:ext uri="{FF2B5EF4-FFF2-40B4-BE49-F238E27FC236}">
-                <a16:creationId xmlns:a16="http://schemas.microsoft.com/office/drawing/2014/main" id="{0A49D9D0-8D3C-1446-A8F5-448223EAB137}"/>
-              </a:ext>
-            </a:extLst>
-          </p:cNvPr>
-          <p:cNvSpPr/>
-          <p:nvPr/>
-        </p:nvSpPr>
-        <p:spPr>
-          <a:xfrm>
-            <a:off x="1154757" y="2556435"/>
-            <a:ext cx="348052" cy="305570"/>
-          </a:xfrm>
-          <a:prstGeom prst="leftBrace">
-            <a:avLst/>
-          </a:prstGeom>
-          <a:ln w="19050">
-            <a:solidFill>
-              <a:schemeClr val="accent5"/>
+              <a:schemeClr val="accent2"/>
             </a:solidFill>
           </a:ln>
         </p:spPr>
@@ -4368,74 +4261,329 @@
             <a:schemeClr val="tx1"/>
           </a:fontRef>
         </p:style>
-        <p:txBody>
-          <a:bodyPr rtlCol="0" anchor="ctr"/>
-          <a:lstStyle/>
-          <a:p>
-            <a:pPr algn="ctr"/>
-            <a:endParaRPr lang="en-SG"/>
-          </a:p>
-        </p:txBody>
-      </p:sp>
-      <p:sp>
-        <p:nvSpPr>
-          <p:cNvPr id="62" name="TextBox 61">
-            <a:extLst>
-              <a:ext uri="{FF2B5EF4-FFF2-40B4-BE49-F238E27FC236}">
-                <a16:creationId xmlns:a16="http://schemas.microsoft.com/office/drawing/2014/main" id="{3C528547-1EDA-0344-9C22-58F28B4D7B80}"/>
-              </a:ext>
-            </a:extLst>
-          </p:cNvPr>
-          <p:cNvSpPr txBox="1"/>
+      </p:cxnSp>
+      <p:cxnSp>
+        <p:nvCxnSpPr>
+          <p:cNvPr id="35" name="Straight Connector 34">
+            <a:extLst>
+              <a:ext uri="{FF2B5EF4-FFF2-40B4-BE49-F238E27FC236}">
+                <a16:creationId xmlns:a16="http://schemas.microsoft.com/office/drawing/2014/main" id="{A8CDE1DA-8DC0-3744-8121-745A1D5A6F15}"/>
+              </a:ext>
+            </a:extLst>
+          </p:cNvPr>
+          <p:cNvCxnSpPr>
+            <a:cxnSpLocks/>
+          </p:cNvCxnSpPr>
           <p:nvPr/>
-        </p:nvSpPr>
-        <p:spPr>
-          <a:xfrm>
-            <a:off x="0" y="2478387"/>
-            <a:ext cx="1243423" cy="461665"/>
+        </p:nvCxnSpPr>
+        <p:spPr>
+          <a:xfrm>
+            <a:off x="1320084" y="1330960"/>
+            <a:ext cx="595745" cy="0"/>
+          </a:xfrm>
+          <a:prstGeom prst="line">
+            <a:avLst/>
+          </a:prstGeom>
+          <a:ln w="12700">
+            <a:solidFill>
+              <a:schemeClr val="accent6"/>
+            </a:solidFill>
+          </a:ln>
+        </p:spPr>
+        <p:style>
+          <a:lnRef idx="1">
+            <a:schemeClr val="accent1"/>
+          </a:lnRef>
+          <a:fillRef idx="0">
+            <a:schemeClr val="accent1"/>
+          </a:fillRef>
+          <a:effectRef idx="0">
+            <a:schemeClr val="accent1"/>
+          </a:effectRef>
+          <a:fontRef idx="minor">
+            <a:schemeClr val="tx1"/>
+          </a:fontRef>
+        </p:style>
+      </p:cxnSp>
+      <p:cxnSp>
+        <p:nvCxnSpPr>
+          <p:cNvPr id="46" name="Straight Connector 45">
+            <a:extLst>
+              <a:ext uri="{FF2B5EF4-FFF2-40B4-BE49-F238E27FC236}">
+                <a16:creationId xmlns:a16="http://schemas.microsoft.com/office/drawing/2014/main" id="{6FF732E4-945B-F047-B8AA-90BB7B084A7F}"/>
+              </a:ext>
+            </a:extLst>
+          </p:cNvPr>
+          <p:cNvCxnSpPr>
+            <a:cxnSpLocks/>
+          </p:cNvCxnSpPr>
+          <p:nvPr/>
+        </p:nvCxnSpPr>
+        <p:spPr>
+          <a:xfrm>
+            <a:off x="1191138" y="2175139"/>
+            <a:ext cx="343633" cy="0"/>
+          </a:xfrm>
+          <a:prstGeom prst="line">
+            <a:avLst/>
+          </a:prstGeom>
+          <a:ln w="12700">
+            <a:solidFill>
+              <a:srgbClr val="7030A0"/>
+            </a:solidFill>
+          </a:ln>
+        </p:spPr>
+        <p:style>
+          <a:lnRef idx="1">
+            <a:schemeClr val="accent1"/>
+          </a:lnRef>
+          <a:fillRef idx="0">
+            <a:schemeClr val="accent1"/>
+          </a:fillRef>
+          <a:effectRef idx="0">
+            <a:schemeClr val="accent1"/>
+          </a:effectRef>
+          <a:fontRef idx="minor">
+            <a:schemeClr val="tx1"/>
+          </a:fontRef>
+        </p:style>
+      </p:cxnSp>
+      <p:cxnSp>
+        <p:nvCxnSpPr>
+          <p:cNvPr id="52" name="Straight Connector 51">
+            <a:extLst>
+              <a:ext uri="{FF2B5EF4-FFF2-40B4-BE49-F238E27FC236}">
+                <a16:creationId xmlns:a16="http://schemas.microsoft.com/office/drawing/2014/main" id="{CD401D7E-9C74-0C4D-B246-598FFCA72708}"/>
+              </a:ext>
+            </a:extLst>
+          </p:cNvPr>
+          <p:cNvCxnSpPr>
+            <a:cxnSpLocks/>
+          </p:cNvCxnSpPr>
+          <p:nvPr/>
+        </p:nvCxnSpPr>
+        <p:spPr>
+          <a:xfrm>
+            <a:off x="1191255" y="2712658"/>
+            <a:ext cx="343633" cy="0"/>
+          </a:xfrm>
+          <a:prstGeom prst="line">
+            <a:avLst/>
+          </a:prstGeom>
+          <a:ln w="12700">
+            <a:solidFill>
+              <a:schemeClr val="accent5"/>
+            </a:solidFill>
+          </a:ln>
+        </p:spPr>
+        <p:style>
+          <a:lnRef idx="1">
+            <a:schemeClr val="accent1"/>
+          </a:lnRef>
+          <a:fillRef idx="0">
+            <a:schemeClr val="accent1"/>
+          </a:fillRef>
+          <a:effectRef idx="0">
+            <a:schemeClr val="accent1"/>
+          </a:effectRef>
+          <a:fontRef idx="minor">
+            <a:schemeClr val="tx1"/>
+          </a:fontRef>
+        </p:style>
+      </p:cxnSp>
+      <p:cxnSp>
+        <p:nvCxnSpPr>
+          <p:cNvPr id="53" name="Straight Connector 52">
+            <a:extLst>
+              <a:ext uri="{FF2B5EF4-FFF2-40B4-BE49-F238E27FC236}">
+                <a16:creationId xmlns:a16="http://schemas.microsoft.com/office/drawing/2014/main" id="{801E91DB-7DB7-9B44-992C-0B5838F4900C}"/>
+              </a:ext>
+            </a:extLst>
+          </p:cNvPr>
+          <p:cNvCxnSpPr>
+            <a:cxnSpLocks/>
+          </p:cNvCxnSpPr>
+          <p:nvPr/>
+        </p:nvCxnSpPr>
+        <p:spPr>
+          <a:xfrm>
+            <a:off x="1330325" y="3933637"/>
+            <a:ext cx="196581" cy="0"/>
+          </a:xfrm>
+          <a:prstGeom prst="line">
+            <a:avLst/>
+          </a:prstGeom>
+          <a:ln w="12700">
+            <a:solidFill>
+              <a:schemeClr val="tx1"/>
+            </a:solidFill>
+          </a:ln>
+        </p:spPr>
+        <p:style>
+          <a:lnRef idx="1">
+            <a:schemeClr val="accent1"/>
+          </a:lnRef>
+          <a:fillRef idx="0">
+            <a:schemeClr val="accent1"/>
+          </a:fillRef>
+          <a:effectRef idx="0">
+            <a:schemeClr val="accent1"/>
+          </a:effectRef>
+          <a:fontRef idx="minor">
+            <a:schemeClr val="tx1"/>
+          </a:fontRef>
+        </p:style>
+      </p:cxnSp>
+      <p:cxnSp>
+        <p:nvCxnSpPr>
+          <p:cNvPr id="22" name="Straight Connector 21">
+            <a:extLst>
+              <a:ext uri="{FF2B5EF4-FFF2-40B4-BE49-F238E27FC236}">
+                <a16:creationId xmlns:a16="http://schemas.microsoft.com/office/drawing/2014/main" id="{7A2B2A98-389A-5040-AA98-BD78C6E5CB27}"/>
+              </a:ext>
+            </a:extLst>
+          </p:cNvPr>
+          <p:cNvCxnSpPr>
+            <a:cxnSpLocks/>
+          </p:cNvCxnSpPr>
+          <p:nvPr/>
+        </p:nvCxnSpPr>
+        <p:spPr>
+          <a:xfrm>
+            <a:off x="4617720" y="4409429"/>
+            <a:ext cx="0" cy="276871"/>
+          </a:xfrm>
+          <a:prstGeom prst="line">
+            <a:avLst/>
+          </a:prstGeom>
+          <a:ln w="12700">
+            <a:solidFill>
+              <a:srgbClr val="FFC000"/>
+            </a:solidFill>
+          </a:ln>
+        </p:spPr>
+        <p:style>
+          <a:lnRef idx="1">
+            <a:schemeClr val="accent2"/>
+          </a:lnRef>
+          <a:fillRef idx="0">
+            <a:schemeClr val="accent2"/>
+          </a:fillRef>
+          <a:effectRef idx="0">
+            <a:schemeClr val="accent2"/>
+          </a:effectRef>
+          <a:fontRef idx="minor">
+            <a:schemeClr val="tx1"/>
+          </a:fontRef>
+        </p:style>
+      </p:cxnSp>
+      <p:sp>
+        <p:nvSpPr>
+          <p:cNvPr id="56" name="Rectangle 55">
+            <a:extLst>
+              <a:ext uri="{FF2B5EF4-FFF2-40B4-BE49-F238E27FC236}">
+                <a16:creationId xmlns:a16="http://schemas.microsoft.com/office/drawing/2014/main" id="{302C24E7-F5CF-7D4F-9162-44F08F19CA6F}"/>
+              </a:ext>
+            </a:extLst>
+          </p:cNvPr>
+          <p:cNvSpPr/>
+          <p:nvPr/>
+        </p:nvSpPr>
+        <p:spPr>
+          <a:xfrm>
+            <a:off x="6242293" y="1869318"/>
+            <a:ext cx="2022818" cy="277000"/>
           </a:xfrm>
           <a:prstGeom prst="rect">
             <a:avLst/>
           </a:prstGeom>
           <a:noFill/>
-        </p:spPr>
-        <p:txBody>
-          <a:bodyPr wrap="square" rtlCol="0">
-            <a:spAutoFit/>
-          </a:bodyPr>
+          <a:ln w="12700" cap="flat" cmpd="sng" algn="ctr">
+            <a:solidFill>
+              <a:schemeClr val="accent6">
+                <a:lumMod val="75000"/>
+              </a:schemeClr>
+            </a:solidFill>
+            <a:prstDash val="solid"/>
+            <a:round/>
+            <a:headEnd type="none" w="med" len="med"/>
+            <a:tailEnd type="none" w="med" len="med"/>
+          </a:ln>
+        </p:spPr>
+        <p:style>
+          <a:lnRef idx="0">
+            <a:scrgbClr r="0" g="0" b="0"/>
+          </a:lnRef>
+          <a:fillRef idx="0">
+            <a:scrgbClr r="0" g="0" b="0"/>
+          </a:fillRef>
+          <a:effectRef idx="0">
+            <a:scrgbClr r="0" g="0" b="0"/>
+          </a:effectRef>
+          <a:fontRef idx="minor">
+            <a:schemeClr val="accent6"/>
+          </a:fontRef>
+        </p:style>
+        <p:txBody>
+          <a:bodyPr rtlCol="0" anchor="ctr"/>
           <a:lstStyle/>
           <a:p>
             <a:pPr algn="ctr"/>
-            <a:r>
-              <a:rPr lang="en-US" sz="1200" dirty="0">
-                <a:solidFill>
-                  <a:srgbClr val="0070C0"/>
-                </a:solidFill>
-              </a:rPr>
-              <a:t>summary-</a:t>
-            </a:r>
-            <a:r>
-              <a:rPr lang="en-US" sz="1200" dirty="0" err="1">
-                <a:solidFill>
-                  <a:srgbClr val="0070C0"/>
-                </a:solidFill>
-              </a:rPr>
-              <a:t>chart__ramp</a:t>
-            </a:r>
-            <a:endParaRPr lang="en-US" sz="1200" dirty="0">
-              <a:solidFill>
-                <a:srgbClr val="0070C0"/>
-              </a:solidFill>
-            </a:endParaRPr>
-          </a:p>
-        </p:txBody>
-      </p:sp>
-      <p:sp>
-        <p:nvSpPr>
-          <p:cNvPr id="68" name="Arrow: Right 11">
-            <a:extLst>
-              <a:ext uri="{FF2B5EF4-FFF2-40B4-BE49-F238E27FC236}">
-                <a16:creationId xmlns:a16="http://schemas.microsoft.com/office/drawing/2014/main" id="{11133928-A68D-214C-83C4-13C29E068764}"/>
+            <a:endParaRPr lang="en-SG"/>
+          </a:p>
+        </p:txBody>
+      </p:sp>
+      <p:cxnSp>
+        <p:nvCxnSpPr>
+          <p:cNvPr id="57" name="Straight Connector 56">
+            <a:extLst>
+              <a:ext uri="{FF2B5EF4-FFF2-40B4-BE49-F238E27FC236}">
+                <a16:creationId xmlns:a16="http://schemas.microsoft.com/office/drawing/2014/main" id="{47B72781-9621-FA44-A8D7-61DEF3E8F07F}"/>
+              </a:ext>
+            </a:extLst>
+          </p:cNvPr>
+          <p:cNvCxnSpPr>
+            <a:cxnSpLocks/>
+          </p:cNvCxnSpPr>
+          <p:nvPr/>
+        </p:nvCxnSpPr>
+        <p:spPr>
+          <a:xfrm>
+            <a:off x="8265111" y="2018745"/>
+            <a:ext cx="301840" cy="0"/>
+          </a:xfrm>
+          <a:prstGeom prst="line">
+            <a:avLst/>
+          </a:prstGeom>
+          <a:ln w="12700">
+            <a:solidFill>
+              <a:schemeClr val="accent6">
+                <a:lumMod val="75000"/>
+              </a:schemeClr>
+            </a:solidFill>
+          </a:ln>
+        </p:spPr>
+        <p:style>
+          <a:lnRef idx="1">
+            <a:schemeClr val="accent1"/>
+          </a:lnRef>
+          <a:fillRef idx="0">
+            <a:schemeClr val="accent1"/>
+          </a:fillRef>
+          <a:effectRef idx="0">
+            <a:schemeClr val="accent1"/>
+          </a:effectRef>
+          <a:fontRef idx="minor">
+            <a:schemeClr val="tx1"/>
+          </a:fontRef>
+        </p:style>
+      </p:cxnSp>
+      <p:sp>
+        <p:nvSpPr>
+          <p:cNvPr id="64" name="Rectangle 63">
+            <a:extLst>
+              <a:ext uri="{FF2B5EF4-FFF2-40B4-BE49-F238E27FC236}">
+                <a16:creationId xmlns:a16="http://schemas.microsoft.com/office/drawing/2014/main" id="{A2744CE9-0A67-9A43-A9BB-0CF02DB76205}"/>
               </a:ext>
             </a:extLst>
           </p:cNvPr>
@@ -4444,146 +4592,95 @@
         </p:nvSpPr>
         <p:spPr>
           <a:xfrm>
-            <a:off x="8260503" y="1926981"/>
-            <a:ext cx="402336" cy="121920"/>
-          </a:xfrm>
-          <a:prstGeom prst="rightArrow">
-            <a:avLst/>
-          </a:prstGeom>
-        </p:spPr>
-        <p:style>
-          <a:lnRef idx="2">
-            <a:schemeClr val="accent6">
-              <a:shade val="50000"/>
-            </a:schemeClr>
-          </a:lnRef>
-          <a:fillRef idx="1">
-            <a:schemeClr val="accent6"/>
-          </a:fillRef>
-          <a:effectRef idx="0">
-            <a:schemeClr val="accent6"/>
-          </a:effectRef>
-          <a:fontRef idx="minor">
-            <a:schemeClr val="lt1"/>
-          </a:fontRef>
-        </p:style>
-        <p:txBody>
-          <a:bodyPr rtlCol="0" anchor="ctr"/>
-          <a:lstStyle/>
-          <a:p>
-            <a:pPr algn="ctr"/>
-            <a:endParaRPr lang="en-SG"/>
-          </a:p>
-        </p:txBody>
-      </p:sp>
-      <p:sp>
-        <p:nvSpPr>
-          <p:cNvPr id="69" name="TextBox 68">
-            <a:extLst>
-              <a:ext uri="{FF2B5EF4-FFF2-40B4-BE49-F238E27FC236}">
-                <a16:creationId xmlns:a16="http://schemas.microsoft.com/office/drawing/2014/main" id="{D26E4E26-EF97-A547-93AF-6C3384E7A51F}"/>
-              </a:ext>
-            </a:extLst>
-          </p:cNvPr>
-          <p:cNvSpPr txBox="1"/>
-          <p:nvPr/>
-        </p:nvSpPr>
-        <p:spPr>
-          <a:xfrm>
-            <a:off x="8662938" y="1833505"/>
-            <a:ext cx="1080151" cy="276999"/>
+            <a:off x="6242293" y="2338728"/>
+            <a:ext cx="2022818" cy="217707"/>
           </a:xfrm>
           <a:prstGeom prst="rect">
             <a:avLst/>
           </a:prstGeom>
           <a:noFill/>
-        </p:spPr>
-        <p:txBody>
-          <a:bodyPr wrap="square" rtlCol="0">
-            <a:spAutoFit/>
-          </a:bodyPr>
-          <a:lstStyle/>
-          <a:p>
-            <a:r>
-              <a:rPr lang="en-US" sz="1200" dirty="0">
-                <a:solidFill>
-                  <a:schemeClr val="accent6">
-                    <a:lumMod val="75000"/>
-                  </a:schemeClr>
-                </a:solidFill>
-              </a:rPr>
-              <a:t>glob filter</a:t>
-            </a:r>
-            <a:endParaRPr lang="en-SG" sz="1200" dirty="0">
-              <a:solidFill>
-                <a:schemeClr val="accent6">
-                  <a:lumMod val="75000"/>
-                </a:schemeClr>
-              </a:solidFill>
-            </a:endParaRPr>
-          </a:p>
-        </p:txBody>
-      </p:sp>
-      <p:sp>
-        <p:nvSpPr>
-          <p:cNvPr id="70" name="Arrow: Left 47">
-            <a:extLst>
-              <a:ext uri="{FF2B5EF4-FFF2-40B4-BE49-F238E27FC236}">
-                <a16:creationId xmlns:a16="http://schemas.microsoft.com/office/drawing/2014/main" id="{EA9C9FB0-FAE2-D641-97A9-DF6605E5210F}"/>
-              </a:ext>
-            </a:extLst>
-          </p:cNvPr>
-          <p:cNvSpPr/>
+          <a:ln w="12700" cap="flat" cmpd="sng" algn="ctr">
+            <a:solidFill>
+              <a:srgbClr val="C00000"/>
+            </a:solidFill>
+            <a:prstDash val="solid"/>
+            <a:round/>
+            <a:headEnd type="none" w="med" len="med"/>
+            <a:tailEnd type="none" w="med" len="med"/>
+          </a:ln>
+        </p:spPr>
+        <p:style>
+          <a:lnRef idx="0">
+            <a:scrgbClr r="0" g="0" b="0"/>
+          </a:lnRef>
+          <a:fillRef idx="0">
+            <a:scrgbClr r="0" g="0" b="0"/>
+          </a:fillRef>
+          <a:effectRef idx="0">
+            <a:scrgbClr r="0" g="0" b="0"/>
+          </a:effectRef>
+          <a:fontRef idx="minor">
+            <a:schemeClr val="accent6"/>
+          </a:fontRef>
+        </p:style>
+        <p:txBody>
+          <a:bodyPr rtlCol="0" anchor="ctr"/>
+          <a:lstStyle/>
+          <a:p>
+            <a:pPr algn="ctr"/>
+            <a:endParaRPr lang="en-SG"/>
+          </a:p>
+        </p:txBody>
+      </p:sp>
+      <p:cxnSp>
+        <p:nvCxnSpPr>
+          <p:cNvPr id="65" name="Straight Connector 64">
+            <a:extLst>
+              <a:ext uri="{FF2B5EF4-FFF2-40B4-BE49-F238E27FC236}">
+                <a16:creationId xmlns:a16="http://schemas.microsoft.com/office/drawing/2014/main" id="{93D0872E-251B-B743-B71C-ACA27267523D}"/>
+              </a:ext>
+            </a:extLst>
+          </p:cNvPr>
+          <p:cNvCxnSpPr>
+            <a:cxnSpLocks/>
+          </p:cNvCxnSpPr>
           <p:nvPr/>
-        </p:nvSpPr>
-        <p:spPr>
-          <a:xfrm rot="10800000">
-            <a:off x="8338253" y="2419612"/>
-            <a:ext cx="348052" cy="96793"/>
-          </a:xfrm>
-          <a:prstGeom prst="leftArrow">
+        </p:nvCxnSpPr>
+        <p:spPr>
+          <a:xfrm>
+            <a:off x="8265111" y="2447870"/>
+            <a:ext cx="301840" cy="0"/>
+          </a:xfrm>
+          <a:prstGeom prst="line">
             <a:avLst/>
           </a:prstGeom>
-          <a:solidFill>
-            <a:srgbClr val="C00000"/>
-          </a:solidFill>
-          <a:ln>
+          <a:ln w="12700">
             <a:solidFill>
               <a:srgbClr val="C00000"/>
             </a:solidFill>
           </a:ln>
         </p:spPr>
         <p:style>
-          <a:lnRef idx="2">
-            <a:schemeClr val="dk1">
-              <a:shade val="50000"/>
-            </a:schemeClr>
+          <a:lnRef idx="1">
+            <a:schemeClr val="accent1"/>
           </a:lnRef>
-          <a:fillRef idx="1">
-            <a:schemeClr val="dk1"/>
+          <a:fillRef idx="0">
+            <a:schemeClr val="accent1"/>
           </a:fillRef>
           <a:effectRef idx="0">
-            <a:schemeClr val="dk1"/>
+            <a:schemeClr val="accent1"/>
           </a:effectRef>
           <a:fontRef idx="minor">
-            <a:schemeClr val="lt1"/>
+            <a:schemeClr val="tx1"/>
           </a:fontRef>
         </p:style>
-        <p:txBody>
-          <a:bodyPr rtlCol="0" anchor="ctr"/>
-          <a:lstStyle/>
-          <a:p>
-            <a:pPr algn="ctr"/>
-            <a:endParaRPr lang="en-SG"/>
-          </a:p>
-        </p:txBody>
-      </p:sp>
-      <p:sp>
-        <p:nvSpPr>
-          <p:cNvPr id="71" name="Arrow: Left 47">
-            <a:extLst>
-              <a:ext uri="{FF2B5EF4-FFF2-40B4-BE49-F238E27FC236}">
-                <a16:creationId xmlns:a16="http://schemas.microsoft.com/office/drawing/2014/main" id="{F7FC1778-C9DC-F24D-AA1E-1D70DFA1E7D8}"/>
+      </p:cxnSp>
+      <p:sp>
+        <p:nvSpPr>
+          <p:cNvPr id="66" name="Rectangle 65">
+            <a:extLst>
+              <a:ext uri="{FF2B5EF4-FFF2-40B4-BE49-F238E27FC236}">
+                <a16:creationId xmlns:a16="http://schemas.microsoft.com/office/drawing/2014/main" id="{C141FFD1-6C95-3144-91D0-6661C4DDF579}"/>
               </a:ext>
             </a:extLst>
           </p:cNvPr>
@@ -4591,51 +4688,94 @@
           <p:nvPr/>
         </p:nvSpPr>
         <p:spPr>
-          <a:xfrm rot="10800000">
-            <a:off x="10686760" y="4241786"/>
-            <a:ext cx="348052" cy="96793"/>
-          </a:xfrm>
-          <a:prstGeom prst="leftArrow">
+          <a:xfrm>
+            <a:off x="6252370" y="4074853"/>
+            <a:ext cx="4400833" cy="417238"/>
+          </a:xfrm>
+          <a:prstGeom prst="rect">
             <a:avLst/>
           </a:prstGeom>
-          <a:solidFill>
-            <a:schemeClr val="accent4">
-              <a:lumMod val="75000"/>
-            </a:schemeClr>
-          </a:solidFill>
-          <a:ln>
+          <a:noFill/>
+          <a:ln w="12700" cap="flat" cmpd="sng" algn="ctr">
             <a:solidFill>
               <a:schemeClr val="accent4">
-                <a:lumMod val="75000"/>
+                <a:lumMod val="50000"/>
+              </a:schemeClr>
+            </a:solidFill>
+            <a:prstDash val="solid"/>
+            <a:round/>
+            <a:headEnd type="none" w="med" len="med"/>
+            <a:tailEnd type="none" w="med" len="med"/>
+          </a:ln>
+        </p:spPr>
+        <p:style>
+          <a:lnRef idx="0">
+            <a:scrgbClr r="0" g="0" b="0"/>
+          </a:lnRef>
+          <a:fillRef idx="0">
+            <a:scrgbClr r="0" g="0" b="0"/>
+          </a:fillRef>
+          <a:effectRef idx="0">
+            <a:scrgbClr r="0" g="0" b="0"/>
+          </a:effectRef>
+          <a:fontRef idx="minor">
+            <a:schemeClr val="accent6"/>
+          </a:fontRef>
+        </p:style>
+        <p:txBody>
+          <a:bodyPr rtlCol="0" anchor="ctr"/>
+          <a:lstStyle/>
+          <a:p>
+            <a:pPr algn="ctr"/>
+            <a:endParaRPr lang="en-SG"/>
+          </a:p>
+        </p:txBody>
+      </p:sp>
+      <p:cxnSp>
+        <p:nvCxnSpPr>
+          <p:cNvPr id="67" name="Straight Connector 66">
+            <a:extLst>
+              <a:ext uri="{FF2B5EF4-FFF2-40B4-BE49-F238E27FC236}">
+                <a16:creationId xmlns:a16="http://schemas.microsoft.com/office/drawing/2014/main" id="{4E06436A-64E8-A549-AA6F-6933D8B3E0A1}"/>
+              </a:ext>
+            </a:extLst>
+          </p:cNvPr>
+          <p:cNvCxnSpPr>
+            <a:cxnSpLocks/>
+          </p:cNvCxnSpPr>
+          <p:nvPr/>
+        </p:nvCxnSpPr>
+        <p:spPr>
+          <a:xfrm>
+            <a:off x="10653203" y="4269273"/>
+            <a:ext cx="301840" cy="0"/>
+          </a:xfrm>
+          <a:prstGeom prst="line">
+            <a:avLst/>
+          </a:prstGeom>
+          <a:ln w="12700">
+            <a:solidFill>
+              <a:schemeClr val="accent4">
+                <a:lumMod val="50000"/>
               </a:schemeClr>
             </a:solidFill>
           </a:ln>
         </p:spPr>
         <p:style>
-          <a:lnRef idx="2">
-            <a:schemeClr val="dk1">
-              <a:shade val="50000"/>
-            </a:schemeClr>
+          <a:lnRef idx="1">
+            <a:schemeClr val="accent1"/>
           </a:lnRef>
-          <a:fillRef idx="1">
-            <a:schemeClr val="dk1"/>
+          <a:fillRef idx="0">
+            <a:schemeClr val="accent1"/>
           </a:fillRef>
           <a:effectRef idx="0">
-            <a:schemeClr val="dk1"/>
+            <a:schemeClr val="accent1"/>
           </a:effectRef>
           <a:fontRef idx="minor">
-            <a:schemeClr val="lt1"/>
+            <a:schemeClr val="tx1"/>
           </a:fontRef>
         </p:style>
-        <p:txBody>
-          <a:bodyPr rtlCol="0" anchor="ctr"/>
-          <a:lstStyle/>
-          <a:p>
-            <a:pPr algn="ctr"/>
-            <a:endParaRPr lang="en-SG"/>
-          </a:p>
-        </p:txBody>
-      </p:sp>
+      </p:cxnSp>
     </p:spTree>
     <p:extLst>
       <p:ext uri="{BB962C8B-B14F-4D97-AF65-F5344CB8AC3E}">

</xml_diff>

<commit_message>
Switch arrows instead of lines in report summary diagram
</commit_message>
<xml_diff>
--- a/docs/diagrams/report-summary.pptx
+++ b/docs/diagrams/report-summary.pptx
@@ -261,7 +261,7 @@
           <a:p>
             <a:fld id="{D5F4EE06-143D-4C2F-8831-1CDA21FFE47B}" type="datetimeFigureOut">
               <a:rPr lang="en-SG" smtClean="0"/>
-              <a:t>12/7/19</a:t>
+              <a:t>17/7/19</a:t>
             </a:fld>
             <a:endParaRPr lang="en-SG"/>
           </a:p>
@@ -461,7 +461,7 @@
           <a:p>
             <a:fld id="{D5F4EE06-143D-4C2F-8831-1CDA21FFE47B}" type="datetimeFigureOut">
               <a:rPr lang="en-SG" smtClean="0"/>
-              <a:t>12/7/19</a:t>
+              <a:t>17/7/19</a:t>
             </a:fld>
             <a:endParaRPr lang="en-SG"/>
           </a:p>
@@ -671,7 +671,7 @@
           <a:p>
             <a:fld id="{D5F4EE06-143D-4C2F-8831-1CDA21FFE47B}" type="datetimeFigureOut">
               <a:rPr lang="en-SG" smtClean="0"/>
-              <a:t>12/7/19</a:t>
+              <a:t>17/7/19</a:t>
             </a:fld>
             <a:endParaRPr lang="en-SG"/>
           </a:p>
@@ -871,7 +871,7 @@
           <a:p>
             <a:fld id="{D5F4EE06-143D-4C2F-8831-1CDA21FFE47B}" type="datetimeFigureOut">
               <a:rPr lang="en-SG" smtClean="0"/>
-              <a:t>12/7/19</a:t>
+              <a:t>17/7/19</a:t>
             </a:fld>
             <a:endParaRPr lang="en-SG"/>
           </a:p>
@@ -1147,7 +1147,7 @@
           <a:p>
             <a:fld id="{D5F4EE06-143D-4C2F-8831-1CDA21FFE47B}" type="datetimeFigureOut">
               <a:rPr lang="en-SG" smtClean="0"/>
-              <a:t>12/7/19</a:t>
+              <a:t>17/7/19</a:t>
             </a:fld>
             <a:endParaRPr lang="en-SG"/>
           </a:p>
@@ -1415,7 +1415,7 @@
           <a:p>
             <a:fld id="{D5F4EE06-143D-4C2F-8831-1CDA21FFE47B}" type="datetimeFigureOut">
               <a:rPr lang="en-SG" smtClean="0"/>
-              <a:t>12/7/19</a:t>
+              <a:t>17/7/19</a:t>
             </a:fld>
             <a:endParaRPr lang="en-SG"/>
           </a:p>
@@ -1830,7 +1830,7 @@
           <a:p>
             <a:fld id="{D5F4EE06-143D-4C2F-8831-1CDA21FFE47B}" type="datetimeFigureOut">
               <a:rPr lang="en-SG" smtClean="0"/>
-              <a:t>12/7/19</a:t>
+              <a:t>17/7/19</a:t>
             </a:fld>
             <a:endParaRPr lang="en-SG"/>
           </a:p>
@@ -1972,7 +1972,7 @@
           <a:p>
             <a:fld id="{D5F4EE06-143D-4C2F-8831-1CDA21FFE47B}" type="datetimeFigureOut">
               <a:rPr lang="en-SG" smtClean="0"/>
-              <a:t>12/7/19</a:t>
+              <a:t>17/7/19</a:t>
             </a:fld>
             <a:endParaRPr lang="en-SG"/>
           </a:p>
@@ -2085,7 +2085,7 @@
           <a:p>
             <a:fld id="{D5F4EE06-143D-4C2F-8831-1CDA21FFE47B}" type="datetimeFigureOut">
               <a:rPr lang="en-SG" smtClean="0"/>
-              <a:t>12/7/19</a:t>
+              <a:t>17/7/19</a:t>
             </a:fld>
             <a:endParaRPr lang="en-SG"/>
           </a:p>
@@ -2398,7 +2398,7 @@
           <a:p>
             <a:fld id="{D5F4EE06-143D-4C2F-8831-1CDA21FFE47B}" type="datetimeFigureOut">
               <a:rPr lang="en-SG" smtClean="0"/>
-              <a:t>12/7/19</a:t>
+              <a:t>17/7/19</a:t>
             </a:fld>
             <a:endParaRPr lang="en-SG"/>
           </a:p>
@@ -2687,7 +2687,7 @@
           <a:p>
             <a:fld id="{D5F4EE06-143D-4C2F-8831-1CDA21FFE47B}" type="datetimeFigureOut">
               <a:rPr lang="en-SG" smtClean="0"/>
-              <a:t>12/7/19</a:t>
+              <a:t>17/7/19</a:t>
             </a:fld>
             <a:endParaRPr lang="en-SG"/>
           </a:p>
@@ -2930,7 +2930,7 @@
           <a:p>
             <a:fld id="{D5F4EE06-143D-4C2F-8831-1CDA21FFE47B}" type="datetimeFigureOut">
               <a:rPr lang="en-SG" smtClean="0"/>
-              <a:t>12/7/19</a:t>
+              <a:t>17/7/19</a:t>
             </a:fld>
             <a:endParaRPr lang="en-SG"/>
           </a:p>
@@ -3504,7 +3504,7 @@
         </p:nvSpPr>
         <p:spPr>
           <a:xfrm>
-            <a:off x="8613159" y="2315835"/>
+            <a:off x="8726811" y="2315835"/>
             <a:ext cx="849429" cy="276999"/>
           </a:xfrm>
           <a:prstGeom prst="rect">
@@ -3840,7 +3840,7 @@
         </p:nvSpPr>
         <p:spPr>
           <a:xfrm>
-            <a:off x="18534" y="2026833"/>
+            <a:off x="12184" y="2026833"/>
             <a:ext cx="1202954" cy="276999"/>
           </a:xfrm>
           <a:prstGeom prst="rect">
@@ -3982,7 +3982,7 @@
         </p:nvSpPr>
         <p:spPr>
           <a:xfrm>
-            <a:off x="3534831" y="4666268"/>
+            <a:off x="3570993" y="4666268"/>
             <a:ext cx="2516973" cy="276999"/>
           </a:xfrm>
           <a:prstGeom prst="rect">
@@ -4145,7 +4145,7 @@
         </p:nvSpPr>
         <p:spPr>
           <a:xfrm>
-            <a:off x="8600792" y="1869016"/>
+            <a:off x="8714444" y="1869016"/>
             <a:ext cx="1080151" cy="276999"/>
           </a:xfrm>
           <a:prstGeom prst="rect">
@@ -4179,30 +4179,198 @@
           </a:p>
         </p:txBody>
       </p:sp>
+      <p:sp>
+        <p:nvSpPr>
+          <p:cNvPr id="56" name="Rectangle 55">
+            <a:extLst>
+              <a:ext uri="{FF2B5EF4-FFF2-40B4-BE49-F238E27FC236}">
+                <a16:creationId xmlns:a16="http://schemas.microsoft.com/office/drawing/2014/main" id="{302C24E7-F5CF-7D4F-9162-44F08F19CA6F}"/>
+              </a:ext>
+            </a:extLst>
+          </p:cNvPr>
+          <p:cNvSpPr/>
+          <p:nvPr/>
+        </p:nvSpPr>
+        <p:spPr>
+          <a:xfrm>
+            <a:off x="6242293" y="1869318"/>
+            <a:ext cx="2022818" cy="277000"/>
+          </a:xfrm>
+          <a:prstGeom prst="rect">
+            <a:avLst/>
+          </a:prstGeom>
+          <a:noFill/>
+          <a:ln w="12700" cap="flat" cmpd="sng" algn="ctr">
+            <a:solidFill>
+              <a:schemeClr val="accent6">
+                <a:lumMod val="75000"/>
+              </a:schemeClr>
+            </a:solidFill>
+            <a:prstDash val="solid"/>
+            <a:round/>
+            <a:headEnd type="none" w="med" len="med"/>
+            <a:tailEnd type="none" w="med" len="med"/>
+          </a:ln>
+        </p:spPr>
+        <p:style>
+          <a:lnRef idx="0">
+            <a:scrgbClr r="0" g="0" b="0"/>
+          </a:lnRef>
+          <a:fillRef idx="0">
+            <a:scrgbClr r="0" g="0" b="0"/>
+          </a:fillRef>
+          <a:effectRef idx="0">
+            <a:scrgbClr r="0" g="0" b="0"/>
+          </a:effectRef>
+          <a:fontRef idx="minor">
+            <a:schemeClr val="accent6"/>
+          </a:fontRef>
+        </p:style>
+        <p:txBody>
+          <a:bodyPr rtlCol="0" anchor="ctr"/>
+          <a:lstStyle/>
+          <a:p>
+            <a:pPr algn="ctr"/>
+            <a:endParaRPr lang="en-SG"/>
+          </a:p>
+        </p:txBody>
+      </p:sp>
+      <p:sp>
+        <p:nvSpPr>
+          <p:cNvPr id="64" name="Rectangle 63">
+            <a:extLst>
+              <a:ext uri="{FF2B5EF4-FFF2-40B4-BE49-F238E27FC236}">
+                <a16:creationId xmlns:a16="http://schemas.microsoft.com/office/drawing/2014/main" id="{A2744CE9-0A67-9A43-A9BB-0CF02DB76205}"/>
+              </a:ext>
+            </a:extLst>
+          </p:cNvPr>
+          <p:cNvSpPr/>
+          <p:nvPr/>
+        </p:nvSpPr>
+        <p:spPr>
+          <a:xfrm>
+            <a:off x="6242293" y="2338728"/>
+            <a:ext cx="2022818" cy="217707"/>
+          </a:xfrm>
+          <a:prstGeom prst="rect">
+            <a:avLst/>
+          </a:prstGeom>
+          <a:noFill/>
+          <a:ln w="12700" cap="flat" cmpd="sng" algn="ctr">
+            <a:solidFill>
+              <a:srgbClr val="C00000"/>
+            </a:solidFill>
+            <a:prstDash val="solid"/>
+            <a:round/>
+            <a:headEnd type="none" w="med" len="med"/>
+            <a:tailEnd type="none" w="med" len="med"/>
+          </a:ln>
+        </p:spPr>
+        <p:style>
+          <a:lnRef idx="0">
+            <a:scrgbClr r="0" g="0" b="0"/>
+          </a:lnRef>
+          <a:fillRef idx="0">
+            <a:scrgbClr r="0" g="0" b="0"/>
+          </a:fillRef>
+          <a:effectRef idx="0">
+            <a:scrgbClr r="0" g="0" b="0"/>
+          </a:effectRef>
+          <a:fontRef idx="minor">
+            <a:schemeClr val="accent6"/>
+          </a:fontRef>
+        </p:style>
+        <p:txBody>
+          <a:bodyPr rtlCol="0" anchor="ctr"/>
+          <a:lstStyle/>
+          <a:p>
+            <a:pPr algn="ctr"/>
+            <a:endParaRPr lang="en-SG"/>
+          </a:p>
+        </p:txBody>
+      </p:sp>
+      <p:sp>
+        <p:nvSpPr>
+          <p:cNvPr id="66" name="Rectangle 65">
+            <a:extLst>
+              <a:ext uri="{FF2B5EF4-FFF2-40B4-BE49-F238E27FC236}">
+                <a16:creationId xmlns:a16="http://schemas.microsoft.com/office/drawing/2014/main" id="{C141FFD1-6C95-3144-91D0-6661C4DDF579}"/>
+              </a:ext>
+            </a:extLst>
+          </p:cNvPr>
+          <p:cNvSpPr/>
+          <p:nvPr/>
+        </p:nvSpPr>
+        <p:spPr>
+          <a:xfrm>
+            <a:off x="6252370" y="4074853"/>
+            <a:ext cx="4400833" cy="417238"/>
+          </a:xfrm>
+          <a:prstGeom prst="rect">
+            <a:avLst/>
+          </a:prstGeom>
+          <a:noFill/>
+          <a:ln w="12700" cap="flat" cmpd="sng" algn="ctr">
+            <a:solidFill>
+              <a:schemeClr val="accent4">
+                <a:lumMod val="50000"/>
+              </a:schemeClr>
+            </a:solidFill>
+            <a:prstDash val="solid"/>
+            <a:round/>
+            <a:headEnd type="none" w="med" len="med"/>
+            <a:tailEnd type="none" w="med" len="med"/>
+          </a:ln>
+        </p:spPr>
+        <p:style>
+          <a:lnRef idx="0">
+            <a:scrgbClr r="0" g="0" b="0"/>
+          </a:lnRef>
+          <a:fillRef idx="0">
+            <a:scrgbClr r="0" g="0" b="0"/>
+          </a:fillRef>
+          <a:effectRef idx="0">
+            <a:scrgbClr r="0" g="0" b="0"/>
+          </a:effectRef>
+          <a:fontRef idx="minor">
+            <a:schemeClr val="accent6"/>
+          </a:fontRef>
+        </p:style>
+        <p:txBody>
+          <a:bodyPr rtlCol="0" anchor="ctr"/>
+          <a:lstStyle/>
+          <a:p>
+            <a:pPr algn="ctr"/>
+            <a:endParaRPr lang="en-SG"/>
+          </a:p>
+        </p:txBody>
+      </p:sp>
       <p:cxnSp>
         <p:nvCxnSpPr>
-          <p:cNvPr id="3" name="Straight Connector 2">
-            <a:extLst>
-              <a:ext uri="{FF2B5EF4-FFF2-40B4-BE49-F238E27FC236}">
-                <a16:creationId xmlns:a16="http://schemas.microsoft.com/office/drawing/2014/main" id="{C2BD86CC-DB2A-5940-A2BC-0B4EC63FFA8A}"/>
-              </a:ext>
-            </a:extLst>
-          </p:cNvPr>
-          <p:cNvCxnSpPr>
-            <a:cxnSpLocks/>
-            <a:endCxn id="34" idx="0"/>
-          </p:cNvCxnSpPr>
+          <p:cNvPr id="4" name="Straight Arrow Connector 3">
+            <a:extLst>
+              <a:ext uri="{FF2B5EF4-FFF2-40B4-BE49-F238E27FC236}">
+                <a16:creationId xmlns:a16="http://schemas.microsoft.com/office/drawing/2014/main" id="{0E1E9E40-02F3-174C-97DB-3B6E1415124B}"/>
+              </a:ext>
+            </a:extLst>
+          </p:cNvPr>
+          <p:cNvCxnSpPr/>
           <p:nvPr/>
         </p:nvCxnSpPr>
         <p:spPr>
           <a:xfrm>
-            <a:off x="3747897" y="483476"/>
-            <a:ext cx="0" cy="330910"/>
-          </a:xfrm>
-          <a:prstGeom prst="line">
+            <a:off x="1294354" y="1335408"/>
+            <a:ext cx="599900" cy="0"/>
+          </a:xfrm>
+          <a:prstGeom prst="straightConnector1">
             <a:avLst/>
           </a:prstGeom>
-          <a:ln w="57150"/>
+          <a:ln w="12700">
+            <a:solidFill>
+              <a:schemeClr val="accent6"/>
+            </a:solidFill>
+            <a:tailEnd type="triangle"/>
+          </a:ln>
         </p:spPr>
         <p:style>
           <a:lnRef idx="1">
@@ -4221,10 +4389,10 @@
       </p:cxnSp>
       <p:cxnSp>
         <p:nvCxnSpPr>
-          <p:cNvPr id="33" name="Straight Connector 32">
-            <a:extLst>
-              <a:ext uri="{FF2B5EF4-FFF2-40B4-BE49-F238E27FC236}">
-                <a16:creationId xmlns:a16="http://schemas.microsoft.com/office/drawing/2014/main" id="{FC014436-7174-7349-B726-708BC955C9C3}"/>
+          <p:cNvPr id="37" name="Straight Arrow Connector 36">
+            <a:extLst>
+              <a:ext uri="{FF2B5EF4-FFF2-40B4-BE49-F238E27FC236}">
+                <a16:creationId xmlns:a16="http://schemas.microsoft.com/office/drawing/2014/main" id="{DEEEF689-CF7E-7149-97BA-3D3957707314}"/>
               </a:ext>
             </a:extLst>
           </p:cNvPr>
@@ -4235,16 +4403,17 @@
         </p:nvCxnSpPr>
         <p:spPr>
           <a:xfrm>
-            <a:off x="8482807" y="465408"/>
-            <a:ext cx="0" cy="330910"/>
-          </a:xfrm>
-          <a:prstGeom prst="line">
+            <a:off x="1111250" y="2178394"/>
+            <a:ext cx="415745" cy="0"/>
+          </a:xfrm>
+          <a:prstGeom prst="straightConnector1">
             <a:avLst/>
           </a:prstGeom>
-          <a:ln w="57150">
+          <a:ln w="12700">
             <a:solidFill>
-              <a:schemeClr val="accent2"/>
+              <a:srgbClr val="7030A0"/>
             </a:solidFill>
+            <a:tailEnd type="triangle"/>
           </a:ln>
         </p:spPr>
         <p:style>
@@ -4264,10 +4433,10 @@
       </p:cxnSp>
       <p:cxnSp>
         <p:nvCxnSpPr>
-          <p:cNvPr id="35" name="Straight Connector 34">
-            <a:extLst>
-              <a:ext uri="{FF2B5EF4-FFF2-40B4-BE49-F238E27FC236}">
-                <a16:creationId xmlns:a16="http://schemas.microsoft.com/office/drawing/2014/main" id="{A8CDE1DA-8DC0-3744-8121-745A1D5A6F15}"/>
+          <p:cNvPr id="38" name="Straight Arrow Connector 37">
+            <a:extLst>
+              <a:ext uri="{FF2B5EF4-FFF2-40B4-BE49-F238E27FC236}">
+                <a16:creationId xmlns:a16="http://schemas.microsoft.com/office/drawing/2014/main" id="{9A9F6241-AC1E-1B48-8BC2-871CFFE15B1E}"/>
               </a:ext>
             </a:extLst>
           </p:cNvPr>
@@ -4278,16 +4447,17 @@
         </p:nvCxnSpPr>
         <p:spPr>
           <a:xfrm>
-            <a:off x="1320084" y="1330960"/>
-            <a:ext cx="595745" cy="0"/>
-          </a:xfrm>
-          <a:prstGeom prst="line">
+            <a:off x="1107533" y="2714969"/>
+            <a:ext cx="437970" cy="0"/>
+          </a:xfrm>
+          <a:prstGeom prst="straightConnector1">
             <a:avLst/>
           </a:prstGeom>
           <a:ln w="12700">
             <a:solidFill>
-              <a:schemeClr val="accent6"/>
+              <a:srgbClr val="0070C0"/>
             </a:solidFill>
+            <a:tailEnd type="triangle"/>
           </a:ln>
         </p:spPr>
         <p:style>
@@ -4307,10 +4477,10 @@
       </p:cxnSp>
       <p:cxnSp>
         <p:nvCxnSpPr>
-          <p:cNvPr id="46" name="Straight Connector 45">
-            <a:extLst>
-              <a:ext uri="{FF2B5EF4-FFF2-40B4-BE49-F238E27FC236}">
-                <a16:creationId xmlns:a16="http://schemas.microsoft.com/office/drawing/2014/main" id="{6FF732E4-945B-F047-B8AA-90BB7B084A7F}"/>
+          <p:cNvPr id="43" name="Straight Arrow Connector 42">
+            <a:extLst>
+              <a:ext uri="{FF2B5EF4-FFF2-40B4-BE49-F238E27FC236}">
+                <a16:creationId xmlns:a16="http://schemas.microsoft.com/office/drawing/2014/main" id="{984AD6F2-A33B-8148-AEDA-A8EAEFD7DC95}"/>
               </a:ext>
             </a:extLst>
           </p:cNvPr>
@@ -4321,16 +4491,17 @@
         </p:nvCxnSpPr>
         <p:spPr>
           <a:xfrm>
-            <a:off x="1191138" y="2175139"/>
-            <a:ext cx="343633" cy="0"/>
-          </a:xfrm>
-          <a:prstGeom prst="line">
+            <a:off x="1215138" y="3933171"/>
+            <a:ext cx="300327" cy="0"/>
+          </a:xfrm>
+          <a:prstGeom prst="straightConnector1">
             <a:avLst/>
           </a:prstGeom>
           <a:ln w="12700">
             <a:solidFill>
-              <a:srgbClr val="7030A0"/>
+              <a:schemeClr val="tx1"/>
             </a:solidFill>
+            <a:tailEnd type="triangle"/>
           </a:ln>
         </p:spPr>
         <p:style>
@@ -4350,30 +4521,26 @@
       </p:cxnSp>
       <p:cxnSp>
         <p:nvCxnSpPr>
-          <p:cNvPr id="52" name="Straight Connector 51">
-            <a:extLst>
-              <a:ext uri="{FF2B5EF4-FFF2-40B4-BE49-F238E27FC236}">
-                <a16:creationId xmlns:a16="http://schemas.microsoft.com/office/drawing/2014/main" id="{CD401D7E-9C74-0C4D-B246-598FFCA72708}"/>
-              </a:ext>
-            </a:extLst>
-          </p:cNvPr>
-          <p:cNvCxnSpPr>
-            <a:cxnSpLocks/>
-          </p:cNvCxnSpPr>
+          <p:cNvPr id="10" name="Straight Arrow Connector 9">
+            <a:extLst>
+              <a:ext uri="{FF2B5EF4-FFF2-40B4-BE49-F238E27FC236}">
+                <a16:creationId xmlns:a16="http://schemas.microsoft.com/office/drawing/2014/main" id="{B3FA0071-1F3A-2C42-AE98-70438B56D7BF}"/>
+              </a:ext>
+            </a:extLst>
+          </p:cNvPr>
+          <p:cNvCxnSpPr/>
           <p:nvPr/>
         </p:nvCxnSpPr>
         <p:spPr>
           <a:xfrm>
-            <a:off x="1191255" y="2712658"/>
-            <a:ext cx="343633" cy="0"/>
-          </a:xfrm>
-          <a:prstGeom prst="line">
+            <a:off x="3771899" y="483476"/>
+            <a:ext cx="0" cy="312842"/>
+          </a:xfrm>
+          <a:prstGeom prst="straightConnector1">
             <a:avLst/>
           </a:prstGeom>
           <a:ln w="12700">
-            <a:solidFill>
-              <a:schemeClr val="accent5"/>
-            </a:solidFill>
+            <a:tailEnd type="triangle"/>
           </a:ln>
         </p:spPr>
         <p:style>
@@ -4393,30 +4560,29 @@
       </p:cxnSp>
       <p:cxnSp>
         <p:nvCxnSpPr>
-          <p:cNvPr id="53" name="Straight Connector 52">
-            <a:extLst>
-              <a:ext uri="{FF2B5EF4-FFF2-40B4-BE49-F238E27FC236}">
-                <a16:creationId xmlns:a16="http://schemas.microsoft.com/office/drawing/2014/main" id="{801E91DB-7DB7-9B44-992C-0B5838F4900C}"/>
-              </a:ext>
-            </a:extLst>
-          </p:cNvPr>
-          <p:cNvCxnSpPr>
-            <a:cxnSpLocks/>
-          </p:cNvCxnSpPr>
+          <p:cNvPr id="50" name="Straight Arrow Connector 49">
+            <a:extLst>
+              <a:ext uri="{FF2B5EF4-FFF2-40B4-BE49-F238E27FC236}">
+                <a16:creationId xmlns:a16="http://schemas.microsoft.com/office/drawing/2014/main" id="{F20E8FC5-C665-144F-B0BB-107E10758C59}"/>
+              </a:ext>
+            </a:extLst>
+          </p:cNvPr>
+          <p:cNvCxnSpPr/>
           <p:nvPr/>
         </p:nvCxnSpPr>
         <p:spPr>
           <a:xfrm>
-            <a:off x="1330325" y="3933637"/>
-            <a:ext cx="196581" cy="0"/>
-          </a:xfrm>
-          <a:prstGeom prst="line">
+            <a:off x="8458331" y="465408"/>
+            <a:ext cx="0" cy="312842"/>
+          </a:xfrm>
+          <a:prstGeom prst="straightConnector1">
             <a:avLst/>
           </a:prstGeom>
           <a:ln w="12700">
             <a:solidFill>
-              <a:schemeClr val="tx1"/>
+              <a:schemeClr val="accent2"/>
             </a:solidFill>
+            <a:tailEnd type="triangle"/>
           </a:ln>
         </p:spPr>
         <p:style>
@@ -4436,10 +4602,10 @@
       </p:cxnSp>
       <p:cxnSp>
         <p:nvCxnSpPr>
-          <p:cNvPr id="22" name="Straight Connector 21">
-            <a:extLst>
-              <a:ext uri="{FF2B5EF4-FFF2-40B4-BE49-F238E27FC236}">
-                <a16:creationId xmlns:a16="http://schemas.microsoft.com/office/drawing/2014/main" id="{7A2B2A98-389A-5040-AA98-BD78C6E5CB27}"/>
+          <p:cNvPr id="55" name="Straight Arrow Connector 54">
+            <a:extLst>
+              <a:ext uri="{FF2B5EF4-FFF2-40B4-BE49-F238E27FC236}">
+                <a16:creationId xmlns:a16="http://schemas.microsoft.com/office/drawing/2014/main" id="{39E59FD8-6ED7-DE42-8608-75F1F9A40F07}"/>
               </a:ext>
             </a:extLst>
           </p:cNvPr>
@@ -4449,110 +4615,11 @@
           <p:nvPr/>
         </p:nvCxnSpPr>
         <p:spPr>
-          <a:xfrm>
-            <a:off x="4617720" y="4409429"/>
-            <a:ext cx="0" cy="276871"/>
-          </a:xfrm>
-          <a:prstGeom prst="line">
-            <a:avLst/>
-          </a:prstGeom>
-          <a:ln w="12700">
-            <a:solidFill>
-              <a:srgbClr val="FFC000"/>
-            </a:solidFill>
-          </a:ln>
-        </p:spPr>
-        <p:style>
-          <a:lnRef idx="1">
-            <a:schemeClr val="accent2"/>
-          </a:lnRef>
-          <a:fillRef idx="0">
-            <a:schemeClr val="accent2"/>
-          </a:fillRef>
-          <a:effectRef idx="0">
-            <a:schemeClr val="accent2"/>
-          </a:effectRef>
-          <a:fontRef idx="minor">
-            <a:schemeClr val="tx1"/>
-          </a:fontRef>
-        </p:style>
-      </p:cxnSp>
-      <p:sp>
-        <p:nvSpPr>
-          <p:cNvPr id="56" name="Rectangle 55">
-            <a:extLst>
-              <a:ext uri="{FF2B5EF4-FFF2-40B4-BE49-F238E27FC236}">
-                <a16:creationId xmlns:a16="http://schemas.microsoft.com/office/drawing/2014/main" id="{302C24E7-F5CF-7D4F-9162-44F08F19CA6F}"/>
-              </a:ext>
-            </a:extLst>
-          </p:cNvPr>
-          <p:cNvSpPr/>
-          <p:nvPr/>
-        </p:nvSpPr>
-        <p:spPr>
-          <a:xfrm>
-            <a:off x="6242293" y="1869318"/>
-            <a:ext cx="2022818" cy="277000"/>
-          </a:xfrm>
-          <a:prstGeom prst="rect">
-            <a:avLst/>
-          </a:prstGeom>
-          <a:noFill/>
-          <a:ln w="12700" cap="flat" cmpd="sng" algn="ctr">
-            <a:solidFill>
-              <a:schemeClr val="accent6">
-                <a:lumMod val="75000"/>
-              </a:schemeClr>
-            </a:solidFill>
-            <a:prstDash val="solid"/>
-            <a:round/>
-            <a:headEnd type="none" w="med" len="med"/>
-            <a:tailEnd type="none" w="med" len="med"/>
-          </a:ln>
-        </p:spPr>
-        <p:style>
-          <a:lnRef idx="0">
-            <a:scrgbClr r="0" g="0" b="0"/>
-          </a:lnRef>
-          <a:fillRef idx="0">
-            <a:scrgbClr r="0" g="0" b="0"/>
-          </a:fillRef>
-          <a:effectRef idx="0">
-            <a:scrgbClr r="0" g="0" b="0"/>
-          </a:effectRef>
-          <a:fontRef idx="minor">
-            <a:schemeClr val="accent6"/>
-          </a:fontRef>
-        </p:style>
-        <p:txBody>
-          <a:bodyPr rtlCol="0" anchor="ctr"/>
-          <a:lstStyle/>
-          <a:p>
-            <a:pPr algn="ctr"/>
-            <a:endParaRPr lang="en-SG"/>
-          </a:p>
-        </p:txBody>
-      </p:sp>
-      <p:cxnSp>
-        <p:nvCxnSpPr>
-          <p:cNvPr id="57" name="Straight Connector 56">
-            <a:extLst>
-              <a:ext uri="{FF2B5EF4-FFF2-40B4-BE49-F238E27FC236}">
-                <a16:creationId xmlns:a16="http://schemas.microsoft.com/office/drawing/2014/main" id="{47B72781-9621-FA44-A8D7-61DEF3E8F07F}"/>
-              </a:ext>
-            </a:extLst>
-          </p:cNvPr>
-          <p:cNvCxnSpPr>
-            <a:cxnSpLocks/>
-          </p:cNvCxnSpPr>
-          <p:nvPr/>
-        </p:nvCxnSpPr>
-        <p:spPr>
-          <a:xfrm>
-            <a:off x="8265111" y="2018745"/>
-            <a:ext cx="301840" cy="0"/>
-          </a:xfrm>
-          <a:prstGeom prst="line">
+          <a:xfrm flipH="1">
+            <a:off x="8289242" y="2020373"/>
+            <a:ext cx="436773" cy="0"/>
+          </a:xfrm>
+          <a:prstGeom prst="straightConnector1">
             <a:avLst/>
           </a:prstGeom>
           <a:ln w="12700">
@@ -4561,6 +4628,7 @@
                 <a:lumMod val="75000"/>
               </a:schemeClr>
             </a:solidFill>
+            <a:tailEnd type="triangle"/>
           </a:ln>
         </p:spPr>
         <p:style>
@@ -4578,66 +4646,12 @@
           </a:fontRef>
         </p:style>
       </p:cxnSp>
-      <p:sp>
-        <p:nvSpPr>
-          <p:cNvPr id="64" name="Rectangle 63">
-            <a:extLst>
-              <a:ext uri="{FF2B5EF4-FFF2-40B4-BE49-F238E27FC236}">
-                <a16:creationId xmlns:a16="http://schemas.microsoft.com/office/drawing/2014/main" id="{A2744CE9-0A67-9A43-A9BB-0CF02DB76205}"/>
-              </a:ext>
-            </a:extLst>
-          </p:cNvPr>
-          <p:cNvSpPr/>
-          <p:nvPr/>
-        </p:nvSpPr>
-        <p:spPr>
-          <a:xfrm>
-            <a:off x="6242293" y="2338728"/>
-            <a:ext cx="2022818" cy="217707"/>
-          </a:xfrm>
-          <a:prstGeom prst="rect">
-            <a:avLst/>
-          </a:prstGeom>
-          <a:noFill/>
-          <a:ln w="12700" cap="flat" cmpd="sng" algn="ctr">
-            <a:solidFill>
-              <a:srgbClr val="C00000"/>
-            </a:solidFill>
-            <a:prstDash val="solid"/>
-            <a:round/>
-            <a:headEnd type="none" w="med" len="med"/>
-            <a:tailEnd type="none" w="med" len="med"/>
-          </a:ln>
-        </p:spPr>
-        <p:style>
-          <a:lnRef idx="0">
-            <a:scrgbClr r="0" g="0" b="0"/>
-          </a:lnRef>
-          <a:fillRef idx="0">
-            <a:scrgbClr r="0" g="0" b="0"/>
-          </a:fillRef>
-          <a:effectRef idx="0">
-            <a:scrgbClr r="0" g="0" b="0"/>
-          </a:effectRef>
-          <a:fontRef idx="minor">
-            <a:schemeClr val="accent6"/>
-          </a:fontRef>
-        </p:style>
-        <p:txBody>
-          <a:bodyPr rtlCol="0" anchor="ctr"/>
-          <a:lstStyle/>
-          <a:p>
-            <a:pPr algn="ctr"/>
-            <a:endParaRPr lang="en-SG"/>
-          </a:p>
-        </p:txBody>
-      </p:sp>
       <p:cxnSp>
         <p:nvCxnSpPr>
-          <p:cNvPr id="65" name="Straight Connector 64">
-            <a:extLst>
-              <a:ext uri="{FF2B5EF4-FFF2-40B4-BE49-F238E27FC236}">
-                <a16:creationId xmlns:a16="http://schemas.microsoft.com/office/drawing/2014/main" id="{93D0872E-251B-B743-B71C-ACA27267523D}"/>
+          <p:cNvPr id="58" name="Straight Arrow Connector 57">
+            <a:extLst>
+              <a:ext uri="{FF2B5EF4-FFF2-40B4-BE49-F238E27FC236}">
+                <a16:creationId xmlns:a16="http://schemas.microsoft.com/office/drawing/2014/main" id="{AFA0DA7C-E4AB-7640-B648-6DBC87E6B30F}"/>
               </a:ext>
             </a:extLst>
           </p:cNvPr>
@@ -4647,17 +4661,18 @@
           <p:nvPr/>
         </p:nvCxnSpPr>
         <p:spPr>
-          <a:xfrm>
-            <a:off x="8265111" y="2447870"/>
-            <a:ext cx="301840" cy="0"/>
-          </a:xfrm>
-          <a:prstGeom prst="line">
+          <a:xfrm flipH="1">
+            <a:off x="8294408" y="2462889"/>
+            <a:ext cx="436773" cy="0"/>
+          </a:xfrm>
+          <a:prstGeom prst="straightConnector1">
             <a:avLst/>
           </a:prstGeom>
           <a:ln w="12700">
             <a:solidFill>
               <a:srgbClr val="C00000"/>
             </a:solidFill>
+            <a:tailEnd type="triangle"/>
           </a:ln>
         </p:spPr>
         <p:style>
@@ -4675,68 +4690,12 @@
           </a:fontRef>
         </p:style>
       </p:cxnSp>
-      <p:sp>
-        <p:nvSpPr>
-          <p:cNvPr id="66" name="Rectangle 65">
-            <a:extLst>
-              <a:ext uri="{FF2B5EF4-FFF2-40B4-BE49-F238E27FC236}">
-                <a16:creationId xmlns:a16="http://schemas.microsoft.com/office/drawing/2014/main" id="{C141FFD1-6C95-3144-91D0-6661C4DDF579}"/>
-              </a:ext>
-            </a:extLst>
-          </p:cNvPr>
-          <p:cNvSpPr/>
-          <p:nvPr/>
-        </p:nvSpPr>
-        <p:spPr>
-          <a:xfrm>
-            <a:off x="6252370" y="4074853"/>
-            <a:ext cx="4400833" cy="417238"/>
-          </a:xfrm>
-          <a:prstGeom prst="rect">
-            <a:avLst/>
-          </a:prstGeom>
-          <a:noFill/>
-          <a:ln w="12700" cap="flat" cmpd="sng" algn="ctr">
-            <a:solidFill>
-              <a:schemeClr val="accent4">
-                <a:lumMod val="50000"/>
-              </a:schemeClr>
-            </a:solidFill>
-            <a:prstDash val="solid"/>
-            <a:round/>
-            <a:headEnd type="none" w="med" len="med"/>
-            <a:tailEnd type="none" w="med" len="med"/>
-          </a:ln>
-        </p:spPr>
-        <p:style>
-          <a:lnRef idx="0">
-            <a:scrgbClr r="0" g="0" b="0"/>
-          </a:lnRef>
-          <a:fillRef idx="0">
-            <a:scrgbClr r="0" g="0" b="0"/>
-          </a:fillRef>
-          <a:effectRef idx="0">
-            <a:scrgbClr r="0" g="0" b="0"/>
-          </a:effectRef>
-          <a:fontRef idx="minor">
-            <a:schemeClr val="accent6"/>
-          </a:fontRef>
-        </p:style>
-        <p:txBody>
-          <a:bodyPr rtlCol="0" anchor="ctr"/>
-          <a:lstStyle/>
-          <a:p>
-            <a:pPr algn="ctr"/>
-            <a:endParaRPr lang="en-SG"/>
-          </a:p>
-        </p:txBody>
-      </p:sp>
       <p:cxnSp>
         <p:nvCxnSpPr>
-          <p:cNvPr id="67" name="Straight Connector 66">
-            <a:extLst>
-              <a:ext uri="{FF2B5EF4-FFF2-40B4-BE49-F238E27FC236}">
-                <a16:creationId xmlns:a16="http://schemas.microsoft.com/office/drawing/2014/main" id="{4E06436A-64E8-A549-AA6F-6933D8B3E0A1}"/>
+          <p:cNvPr id="61" name="Straight Arrow Connector 60">
+            <a:extLst>
+              <a:ext uri="{FF2B5EF4-FFF2-40B4-BE49-F238E27FC236}">
+                <a16:creationId xmlns:a16="http://schemas.microsoft.com/office/drawing/2014/main" id="{B3CB679E-8205-8D4E-8605-4305DBA22290}"/>
               </a:ext>
             </a:extLst>
           </p:cNvPr>
@@ -4746,11 +4705,11 @@
           <p:nvPr/>
         </p:nvCxnSpPr>
         <p:spPr>
-          <a:xfrm>
-            <a:off x="10653203" y="4269273"/>
-            <a:ext cx="301840" cy="0"/>
-          </a:xfrm>
-          <a:prstGeom prst="line">
+          <a:xfrm flipH="1" flipV="1">
+            <a:off x="10667719" y="4260483"/>
+            <a:ext cx="318046" cy="4392"/>
+          </a:xfrm>
+          <a:prstGeom prst="straightConnector1">
             <a:avLst/>
           </a:prstGeom>
           <a:ln w="12700">
@@ -4759,6 +4718,51 @@
                 <a:lumMod val="50000"/>
               </a:schemeClr>
             </a:solidFill>
+            <a:tailEnd type="triangle"/>
+          </a:ln>
+        </p:spPr>
+        <p:style>
+          <a:lnRef idx="1">
+            <a:schemeClr val="accent1"/>
+          </a:lnRef>
+          <a:fillRef idx="0">
+            <a:schemeClr val="accent1"/>
+          </a:fillRef>
+          <a:effectRef idx="0">
+            <a:schemeClr val="accent1"/>
+          </a:effectRef>
+          <a:fontRef idx="minor">
+            <a:schemeClr val="tx1"/>
+          </a:fontRef>
+        </p:style>
+      </p:cxnSp>
+      <p:cxnSp>
+        <p:nvCxnSpPr>
+          <p:cNvPr id="63" name="Straight Arrow Connector 62">
+            <a:extLst>
+              <a:ext uri="{FF2B5EF4-FFF2-40B4-BE49-F238E27FC236}">
+                <a16:creationId xmlns:a16="http://schemas.microsoft.com/office/drawing/2014/main" id="{510B956D-D846-A649-B354-69624F72C304}"/>
+              </a:ext>
+            </a:extLst>
+          </p:cNvPr>
+          <p:cNvCxnSpPr>
+            <a:cxnSpLocks/>
+          </p:cNvCxnSpPr>
+          <p:nvPr/>
+        </p:nvCxnSpPr>
+        <p:spPr>
+          <a:xfrm flipV="1">
+            <a:off x="4615090" y="4409457"/>
+            <a:ext cx="1" cy="256811"/>
+          </a:xfrm>
+          <a:prstGeom prst="straightConnector1">
+            <a:avLst/>
+          </a:prstGeom>
+          <a:ln w="12700">
+            <a:solidFill>
+              <a:schemeClr val="accent4"/>
+            </a:solidFill>
+            <a:tailEnd type="triangle"/>
           </a:ln>
         </p:spPr>
         <p:style>

</xml_diff>

<commit_message>
Update report-summary diagram with latest ui and components
</commit_message>
<xml_diff>
--- a/docs/diagrams/report-summary.pptx
+++ b/docs/diagrams/report-summary.pptx
@@ -261,7 +261,7 @@
           <a:p>
             <a:fld id="{D5F4EE06-143D-4C2F-8831-1CDA21FFE47B}" type="datetimeFigureOut">
               <a:rPr lang="en-SG" smtClean="0"/>
-              <a:t>17/7/19</a:t>
+              <a:t>22/7/19</a:t>
             </a:fld>
             <a:endParaRPr lang="en-SG"/>
           </a:p>
@@ -461,7 +461,7 @@
           <a:p>
             <a:fld id="{D5F4EE06-143D-4C2F-8831-1CDA21FFE47B}" type="datetimeFigureOut">
               <a:rPr lang="en-SG" smtClean="0"/>
-              <a:t>17/7/19</a:t>
+              <a:t>22/7/19</a:t>
             </a:fld>
             <a:endParaRPr lang="en-SG"/>
           </a:p>
@@ -671,7 +671,7 @@
           <a:p>
             <a:fld id="{D5F4EE06-143D-4C2F-8831-1CDA21FFE47B}" type="datetimeFigureOut">
               <a:rPr lang="en-SG" smtClean="0"/>
-              <a:t>17/7/19</a:t>
+              <a:t>22/7/19</a:t>
             </a:fld>
             <a:endParaRPr lang="en-SG"/>
           </a:p>
@@ -871,7 +871,7 @@
           <a:p>
             <a:fld id="{D5F4EE06-143D-4C2F-8831-1CDA21FFE47B}" type="datetimeFigureOut">
               <a:rPr lang="en-SG" smtClean="0"/>
-              <a:t>17/7/19</a:t>
+              <a:t>22/7/19</a:t>
             </a:fld>
             <a:endParaRPr lang="en-SG"/>
           </a:p>
@@ -1147,7 +1147,7 @@
           <a:p>
             <a:fld id="{D5F4EE06-143D-4C2F-8831-1CDA21FFE47B}" type="datetimeFigureOut">
               <a:rPr lang="en-SG" smtClean="0"/>
-              <a:t>17/7/19</a:t>
+              <a:t>22/7/19</a:t>
             </a:fld>
             <a:endParaRPr lang="en-SG"/>
           </a:p>
@@ -1415,7 +1415,7 @@
           <a:p>
             <a:fld id="{D5F4EE06-143D-4C2F-8831-1CDA21FFE47B}" type="datetimeFigureOut">
               <a:rPr lang="en-SG" smtClean="0"/>
-              <a:t>17/7/19</a:t>
+              <a:t>22/7/19</a:t>
             </a:fld>
             <a:endParaRPr lang="en-SG"/>
           </a:p>
@@ -1830,7 +1830,7 @@
           <a:p>
             <a:fld id="{D5F4EE06-143D-4C2F-8831-1CDA21FFE47B}" type="datetimeFigureOut">
               <a:rPr lang="en-SG" smtClean="0"/>
-              <a:t>17/7/19</a:t>
+              <a:t>22/7/19</a:t>
             </a:fld>
             <a:endParaRPr lang="en-SG"/>
           </a:p>
@@ -1972,7 +1972,7 @@
           <a:p>
             <a:fld id="{D5F4EE06-143D-4C2F-8831-1CDA21FFE47B}" type="datetimeFigureOut">
               <a:rPr lang="en-SG" smtClean="0"/>
-              <a:t>17/7/19</a:t>
+              <a:t>22/7/19</a:t>
             </a:fld>
             <a:endParaRPr lang="en-SG"/>
           </a:p>
@@ -2085,7 +2085,7 @@
           <a:p>
             <a:fld id="{D5F4EE06-143D-4C2F-8831-1CDA21FFE47B}" type="datetimeFigureOut">
               <a:rPr lang="en-SG" smtClean="0"/>
-              <a:t>17/7/19</a:t>
+              <a:t>22/7/19</a:t>
             </a:fld>
             <a:endParaRPr lang="en-SG"/>
           </a:p>
@@ -2398,7 +2398,7 @@
           <a:p>
             <a:fld id="{D5F4EE06-143D-4C2F-8831-1CDA21FFE47B}" type="datetimeFigureOut">
               <a:rPr lang="en-SG" smtClean="0"/>
-              <a:t>17/7/19</a:t>
+              <a:t>22/7/19</a:t>
             </a:fld>
             <a:endParaRPr lang="en-SG"/>
           </a:p>
@@ -2687,7 +2687,7 @@
           <a:p>
             <a:fld id="{D5F4EE06-143D-4C2F-8831-1CDA21FFE47B}" type="datetimeFigureOut">
               <a:rPr lang="en-SG" smtClean="0"/>
-              <a:t>17/7/19</a:t>
+              <a:t>22/7/19</a:t>
             </a:fld>
             <a:endParaRPr lang="en-SG"/>
           </a:p>
@@ -2930,7 +2930,7 @@
           <a:p>
             <a:fld id="{D5F4EE06-143D-4C2F-8831-1CDA21FFE47B}" type="datetimeFigureOut">
               <a:rPr lang="en-SG" smtClean="0"/>
-              <a:t>17/7/19</a:t>
+              <a:t>22/7/19</a:t>
             </a:fld>
             <a:endParaRPr lang="en-SG"/>
           </a:p>
@@ -3349,10 +3349,10 @@
       </p:grpSpPr>
       <p:pic>
         <p:nvPicPr>
-          <p:cNvPr id="20" name="Picture 19" descr="A screenshot of a cell phone&#10;&#10;Description automatically generated">
-            <a:extLst>
-              <a:ext uri="{FF2B5EF4-FFF2-40B4-BE49-F238E27FC236}">
-                <a16:creationId xmlns:a16="http://schemas.microsoft.com/office/drawing/2014/main" id="{348B436D-5F8F-7547-A5EE-02688017F8B6}"/>
+          <p:cNvPr id="5" name="Picture 4">
+            <a:extLst>
+              <a:ext uri="{FF2B5EF4-FFF2-40B4-BE49-F238E27FC236}">
+                <a16:creationId xmlns:a16="http://schemas.microsoft.com/office/drawing/2014/main" id="{57D8E422-39B9-AD4D-AEBC-CAD2FD032214}"/>
               </a:ext>
             </a:extLst>
           </p:cNvPr>
@@ -3362,21 +3362,15 @@
           <p:nvPr/>
         </p:nvPicPr>
         <p:blipFill>
-          <a:blip r:embed="rId2">
-            <a:extLst>
-              <a:ext uri="{28A0092B-C50C-407E-A947-70E740481C1C}">
-                <a14:useLocalDpi xmlns:a14="http://schemas.microsoft.com/office/drawing/2010/main" val="0"/>
-              </a:ext>
-            </a:extLst>
-          </a:blip>
+          <a:blip r:embed="rId2"/>
           <a:stretch>
             <a:fillRect/>
           </a:stretch>
         </p:blipFill>
         <p:spPr>
           <a:xfrm>
-            <a:off x="1447800" y="796318"/>
-            <a:ext cx="9304401" cy="5269897"/>
+            <a:off x="1422855" y="798089"/>
+            <a:ext cx="9317337" cy="5245522"/>
           </a:xfrm>
           <a:prstGeom prst="rect">
             <a:avLst/>
@@ -3402,8 +3396,8 @@
         </p:nvSpPr>
         <p:spPr>
           <a:xfrm>
-            <a:off x="1443990" y="814386"/>
-            <a:ext cx="4607814" cy="5229225"/>
+            <a:off x="1408787" y="814386"/>
+            <a:ext cx="4643017" cy="5229225"/>
           </a:xfrm>
           <a:prstGeom prst="rect">
             <a:avLst/>
@@ -3504,7 +3498,7 @@
         </p:nvSpPr>
         <p:spPr>
           <a:xfrm>
-            <a:off x="8726811" y="2315835"/>
+            <a:off x="9190215" y="3133527"/>
             <a:ext cx="849429" cy="276999"/>
           </a:xfrm>
           <a:prstGeom prst="rect">
@@ -3638,8 +3632,8 @@
         </p:nvSpPr>
         <p:spPr>
           <a:xfrm>
-            <a:off x="6204585" y="814386"/>
-            <a:ext cx="4547616" cy="5229225"/>
+            <a:off x="6140198" y="814386"/>
+            <a:ext cx="4612003" cy="5229225"/>
           </a:xfrm>
           <a:prstGeom prst="rect">
             <a:avLst/>
@@ -3732,8 +3726,8 @@
         </p:nvSpPr>
         <p:spPr>
           <a:xfrm>
-            <a:off x="1927896" y="896446"/>
-            <a:ext cx="3706363" cy="869029"/>
+            <a:off x="1674004" y="896446"/>
+            <a:ext cx="4074863" cy="869029"/>
           </a:xfrm>
           <a:prstGeom prst="rect">
             <a:avLst/>
@@ -3786,8 +3780,8 @@
         </p:nvSpPr>
         <p:spPr>
           <a:xfrm>
-            <a:off x="1523483" y="1950544"/>
-            <a:ext cx="4482463" cy="449190"/>
+            <a:off x="1484661" y="1950544"/>
+            <a:ext cx="4504352" cy="449190"/>
           </a:xfrm>
           <a:prstGeom prst="rect">
             <a:avLst/>
@@ -3840,7 +3834,7 @@
         </p:nvSpPr>
         <p:spPr>
           <a:xfrm>
-            <a:off x="12184" y="2026833"/>
+            <a:off x="-13217" y="2026833"/>
             <a:ext cx="1202954" cy="276999"/>
           </a:xfrm>
           <a:prstGeom prst="rect">
@@ -3880,8 +3874,8 @@
         </p:nvSpPr>
         <p:spPr>
           <a:xfrm>
-            <a:off x="1526181" y="3880858"/>
-            <a:ext cx="4482462" cy="96793"/>
+            <a:off x="1501594" y="4826286"/>
+            <a:ext cx="4482462" cy="276999"/>
           </a:xfrm>
           <a:prstGeom prst="rect">
             <a:avLst/>
@@ -3934,7 +3928,7 @@
         </p:nvSpPr>
         <p:spPr>
           <a:xfrm>
-            <a:off x="57153" y="3729919"/>
+            <a:off x="23285" y="4754389"/>
             <a:ext cx="1589577" cy="461665"/>
           </a:xfrm>
           <a:prstGeom prst="rect">
@@ -3982,7 +3976,7 @@
         </p:nvSpPr>
         <p:spPr>
           <a:xfrm>
-            <a:off x="3570993" y="4666268"/>
+            <a:off x="3232326" y="2828987"/>
             <a:ext cx="2516973" cy="276999"/>
           </a:xfrm>
           <a:prstGeom prst="rect">
@@ -4034,7 +4028,7 @@
         </p:nvSpPr>
         <p:spPr>
           <a:xfrm>
-            <a:off x="1536198" y="2556435"/>
+            <a:off x="1510797" y="2556435"/>
             <a:ext cx="4482463" cy="305570"/>
           </a:xfrm>
           <a:prstGeom prst="rect">
@@ -4145,7 +4139,7 @@
         </p:nvSpPr>
         <p:spPr>
           <a:xfrm>
-            <a:off x="8714444" y="1869016"/>
+            <a:off x="8697510" y="1792813"/>
             <a:ext cx="1080151" cy="276999"/>
           </a:xfrm>
           <a:prstGeom prst="rect">
@@ -4193,7 +4187,7 @@
         </p:nvSpPr>
         <p:spPr>
           <a:xfrm>
-            <a:off x="6242293" y="1869318"/>
+            <a:off x="6191491" y="1835450"/>
             <a:ext cx="2022818" cy="277000"/>
           </a:xfrm>
           <a:prstGeom prst="rect">
@@ -4249,8 +4243,8 @@
         </p:nvSpPr>
         <p:spPr>
           <a:xfrm>
-            <a:off x="6242293" y="2338728"/>
-            <a:ext cx="2022818" cy="217707"/>
+            <a:off x="6210157" y="3176139"/>
+            <a:ext cx="2516653" cy="217707"/>
           </a:xfrm>
           <a:prstGeom prst="rect">
             <a:avLst/>
@@ -4303,8 +4297,8 @@
         </p:nvSpPr>
         <p:spPr>
           <a:xfrm>
-            <a:off x="6252370" y="4074853"/>
-            <a:ext cx="4400833" cy="417238"/>
+            <a:off x="6186172" y="3133515"/>
+            <a:ext cx="4450097" cy="2217420"/>
           </a:xfrm>
           <a:prstGeom prst="rect">
             <a:avLst/>
@@ -4354,13 +4348,15 @@
               </a:ext>
             </a:extLst>
           </p:cNvPr>
-          <p:cNvCxnSpPr/>
+          <p:cNvCxnSpPr>
+            <a:cxnSpLocks/>
+          </p:cNvCxnSpPr>
           <p:nvPr/>
         </p:nvCxnSpPr>
         <p:spPr>
           <a:xfrm>
             <a:off x="1294354" y="1335408"/>
-            <a:ext cx="599900" cy="0"/>
+            <a:ext cx="352376" cy="0"/>
           </a:xfrm>
           <a:prstGeom prst="straightConnector1">
             <a:avLst/>
@@ -4403,7 +4399,7 @@
         </p:nvCxnSpPr>
         <p:spPr>
           <a:xfrm>
-            <a:off x="1111250" y="2178394"/>
+            <a:off x="1068915" y="2178394"/>
             <a:ext cx="415745" cy="0"/>
           </a:xfrm>
           <a:prstGeom prst="straightConnector1">
@@ -4447,7 +4443,7 @@
         </p:nvCxnSpPr>
         <p:spPr>
           <a:xfrm>
-            <a:off x="1107533" y="2714969"/>
+            <a:off x="1073665" y="2714969"/>
             <a:ext cx="437970" cy="0"/>
           </a:xfrm>
           <a:prstGeom prst="straightConnector1">
@@ -4491,7 +4487,7 @@
         </p:nvCxnSpPr>
         <p:spPr>
           <a:xfrm>
-            <a:off x="1215138" y="3933171"/>
+            <a:off x="1181270" y="4957641"/>
             <a:ext cx="300327" cy="0"/>
           </a:xfrm>
           <a:prstGeom prst="straightConnector1">
@@ -4616,7 +4612,7 @@
         </p:nvCxnSpPr>
         <p:spPr>
           <a:xfrm flipH="1">
-            <a:off x="8289242" y="2020373"/>
+            <a:off x="8272308" y="1944170"/>
             <a:ext cx="436773" cy="0"/>
           </a:xfrm>
           <a:prstGeom prst="straightConnector1">
@@ -4662,7 +4658,7 @@
         </p:nvCxnSpPr>
         <p:spPr>
           <a:xfrm flipH="1">
-            <a:off x="8294408" y="2462889"/>
+            <a:off x="8757812" y="3280581"/>
             <a:ext cx="436773" cy="0"/>
           </a:xfrm>
           <a:prstGeom prst="straightConnector1">
@@ -4751,9 +4747,9 @@
           <p:nvPr/>
         </p:nvCxnSpPr>
         <p:spPr>
-          <a:xfrm flipV="1">
-            <a:off x="4615090" y="4409457"/>
-            <a:ext cx="1" cy="256811"/>
+          <a:xfrm>
+            <a:off x="4284891" y="3125047"/>
+            <a:ext cx="0" cy="429266"/>
           </a:xfrm>
           <a:prstGeom prst="straightConnector1">
             <a:avLst/>
@@ -4761,6 +4757,163 @@
           <a:ln w="12700">
             <a:solidFill>
               <a:schemeClr val="accent4"/>
+            </a:solidFill>
+            <a:tailEnd type="triangle"/>
+          </a:ln>
+        </p:spPr>
+        <p:style>
+          <a:lnRef idx="1">
+            <a:schemeClr val="accent1"/>
+          </a:lnRef>
+          <a:fillRef idx="0">
+            <a:schemeClr val="accent1"/>
+          </a:fillRef>
+          <a:effectRef idx="0">
+            <a:schemeClr val="accent1"/>
+          </a:effectRef>
+          <a:fontRef idx="minor">
+            <a:schemeClr val="tx1"/>
+          </a:fontRef>
+        </p:style>
+      </p:cxnSp>
+      <p:sp>
+        <p:nvSpPr>
+          <p:cNvPr id="39" name="Rectangle 38">
+            <a:extLst>
+              <a:ext uri="{FF2B5EF4-FFF2-40B4-BE49-F238E27FC236}">
+                <a16:creationId xmlns:a16="http://schemas.microsoft.com/office/drawing/2014/main" id="{F1DC792B-BA68-E146-9640-3B9BBA3D37BF}"/>
+              </a:ext>
+            </a:extLst>
+          </p:cNvPr>
+          <p:cNvSpPr/>
+          <p:nvPr/>
+        </p:nvSpPr>
+        <p:spPr>
+          <a:xfrm>
+            <a:off x="6228509" y="3429000"/>
+            <a:ext cx="4354826" cy="1584566"/>
+          </a:xfrm>
+          <a:prstGeom prst="rect">
+            <a:avLst/>
+          </a:prstGeom>
+          <a:noFill/>
+          <a:ln w="12700" cap="flat" cmpd="sng" algn="ctr">
+            <a:solidFill>
+              <a:schemeClr val="accent2">
+                <a:lumMod val="60000"/>
+                <a:lumOff val="40000"/>
+              </a:schemeClr>
+            </a:solidFill>
+            <a:prstDash val="solid"/>
+            <a:round/>
+            <a:headEnd type="none" w="med" len="med"/>
+            <a:tailEnd type="none" w="med" len="med"/>
+          </a:ln>
+        </p:spPr>
+        <p:style>
+          <a:lnRef idx="0">
+            <a:scrgbClr r="0" g="0" b="0"/>
+          </a:lnRef>
+          <a:fillRef idx="0">
+            <a:scrgbClr r="0" g="0" b="0"/>
+          </a:fillRef>
+          <a:effectRef idx="0">
+            <a:scrgbClr r="0" g="0" b="0"/>
+          </a:effectRef>
+          <a:fontRef idx="minor">
+            <a:schemeClr val="accent6"/>
+          </a:fontRef>
+        </p:style>
+        <p:txBody>
+          <a:bodyPr rtlCol="0" anchor="ctr"/>
+          <a:lstStyle/>
+          <a:p>
+            <a:pPr algn="ctr"/>
+            <a:endParaRPr lang="en-SG"/>
+          </a:p>
+        </p:txBody>
+      </p:sp>
+      <p:sp>
+        <p:nvSpPr>
+          <p:cNvPr id="44" name="文本框 44">
+            <a:extLst>
+              <a:ext uri="{FF2B5EF4-FFF2-40B4-BE49-F238E27FC236}">
+                <a16:creationId xmlns:a16="http://schemas.microsoft.com/office/drawing/2014/main" id="{A899A3DB-A0EF-A042-8009-CDA2C0E753A2}"/>
+              </a:ext>
+            </a:extLst>
+          </p:cNvPr>
+          <p:cNvSpPr txBox="1"/>
+          <p:nvPr/>
+        </p:nvSpPr>
+        <p:spPr>
+          <a:xfrm>
+            <a:off x="10895046" y="3703036"/>
+            <a:ext cx="936735" cy="276999"/>
+          </a:xfrm>
+          <a:prstGeom prst="rect">
+            <a:avLst/>
+          </a:prstGeom>
+          <a:noFill/>
+          <a:ln>
+            <a:noFill/>
+          </a:ln>
+        </p:spPr>
+        <p:txBody>
+          <a:bodyPr wrap="square" rtlCol="0">
+            <a:spAutoFit/>
+          </a:bodyPr>
+          <a:lstStyle/>
+          <a:p>
+            <a:r>
+              <a:rPr lang="en-US" altLang="zh-CN" sz="1200" dirty="0">
+                <a:solidFill>
+                  <a:schemeClr val="accent2">
+                    <a:lumMod val="60000"/>
+                    <a:lumOff val="40000"/>
+                  </a:schemeClr>
+                </a:solidFill>
+              </a:rPr>
+              <a:t>segment</a:t>
+            </a:r>
+            <a:endParaRPr lang="zh-CN" altLang="en-US" sz="1200" dirty="0">
+              <a:solidFill>
+                <a:schemeClr val="accent2">
+                  <a:lumMod val="60000"/>
+                  <a:lumOff val="40000"/>
+                </a:schemeClr>
+              </a:solidFill>
+            </a:endParaRPr>
+          </a:p>
+        </p:txBody>
+      </p:sp>
+      <p:cxnSp>
+        <p:nvCxnSpPr>
+          <p:cNvPr id="46" name="Straight Arrow Connector 45">
+            <a:extLst>
+              <a:ext uri="{FF2B5EF4-FFF2-40B4-BE49-F238E27FC236}">
+                <a16:creationId xmlns:a16="http://schemas.microsoft.com/office/drawing/2014/main" id="{BE7BD8BB-4C1B-DB44-A439-079C150A181C}"/>
+              </a:ext>
+            </a:extLst>
+          </p:cNvPr>
+          <p:cNvCxnSpPr>
+            <a:cxnSpLocks/>
+          </p:cNvCxnSpPr>
+          <p:nvPr/>
+        </p:nvCxnSpPr>
+        <p:spPr>
+          <a:xfrm flipH="1" flipV="1">
+            <a:off x="10591515" y="3862545"/>
+            <a:ext cx="318046" cy="4392"/>
+          </a:xfrm>
+          <a:prstGeom prst="straightConnector1">
+            <a:avLst/>
+          </a:prstGeom>
+          <a:ln w="12700">
+            <a:solidFill>
+              <a:schemeClr val="accent2">
+                <a:lumMod val="60000"/>
+                <a:lumOff val="40000"/>
+              </a:schemeClr>
             </a:solidFill>
             <a:tailEnd type="triangle"/>
           </a:ln>

</xml_diff>

<commit_message>
[#809] DeveloperGuide: update the HTML report section (#810)
The HTML report section in our DG contains outdated info such as the
report summary diagram, sequence diagrams and the list of js files.

Let's perform promptly due update, revise the HTML report section with
the latest report summary diagram, Vue lifecycle diagram, sequence
diagrams and the descriptions of the recently added js files such as
v_ramp, v_zoom, and v_segment.
</commit_message>
<xml_diff>
--- a/docs/diagrams/report-summary.pptx
+++ b/docs/diagrams/report-summary.pptx
@@ -261,7 +261,7 @@
           <a:p>
             <a:fld id="{D5F4EE06-143D-4C2F-8831-1CDA21FFE47B}" type="datetimeFigureOut">
               <a:rPr lang="en-SG" smtClean="0"/>
-              <a:t>22/2/19</a:t>
+              <a:t>22/7/19</a:t>
             </a:fld>
             <a:endParaRPr lang="en-SG"/>
           </a:p>
@@ -461,7 +461,7 @@
           <a:p>
             <a:fld id="{D5F4EE06-143D-4C2F-8831-1CDA21FFE47B}" type="datetimeFigureOut">
               <a:rPr lang="en-SG" smtClean="0"/>
-              <a:t>22/2/19</a:t>
+              <a:t>22/7/19</a:t>
             </a:fld>
             <a:endParaRPr lang="en-SG"/>
           </a:p>
@@ -671,7 +671,7 @@
           <a:p>
             <a:fld id="{D5F4EE06-143D-4C2F-8831-1CDA21FFE47B}" type="datetimeFigureOut">
               <a:rPr lang="en-SG" smtClean="0"/>
-              <a:t>22/2/19</a:t>
+              <a:t>22/7/19</a:t>
             </a:fld>
             <a:endParaRPr lang="en-SG"/>
           </a:p>
@@ -871,7 +871,7 @@
           <a:p>
             <a:fld id="{D5F4EE06-143D-4C2F-8831-1CDA21FFE47B}" type="datetimeFigureOut">
               <a:rPr lang="en-SG" smtClean="0"/>
-              <a:t>22/2/19</a:t>
+              <a:t>22/7/19</a:t>
             </a:fld>
             <a:endParaRPr lang="en-SG"/>
           </a:p>
@@ -1147,7 +1147,7 @@
           <a:p>
             <a:fld id="{D5F4EE06-143D-4C2F-8831-1CDA21FFE47B}" type="datetimeFigureOut">
               <a:rPr lang="en-SG" smtClean="0"/>
-              <a:t>22/2/19</a:t>
+              <a:t>22/7/19</a:t>
             </a:fld>
             <a:endParaRPr lang="en-SG"/>
           </a:p>
@@ -1415,7 +1415,7 @@
           <a:p>
             <a:fld id="{D5F4EE06-143D-4C2F-8831-1CDA21FFE47B}" type="datetimeFigureOut">
               <a:rPr lang="en-SG" smtClean="0"/>
-              <a:t>22/2/19</a:t>
+              <a:t>22/7/19</a:t>
             </a:fld>
             <a:endParaRPr lang="en-SG"/>
           </a:p>
@@ -1830,7 +1830,7 @@
           <a:p>
             <a:fld id="{D5F4EE06-143D-4C2F-8831-1CDA21FFE47B}" type="datetimeFigureOut">
               <a:rPr lang="en-SG" smtClean="0"/>
-              <a:t>22/2/19</a:t>
+              <a:t>22/7/19</a:t>
             </a:fld>
             <a:endParaRPr lang="en-SG"/>
           </a:p>
@@ -1972,7 +1972,7 @@
           <a:p>
             <a:fld id="{D5F4EE06-143D-4C2F-8831-1CDA21FFE47B}" type="datetimeFigureOut">
               <a:rPr lang="en-SG" smtClean="0"/>
-              <a:t>22/2/19</a:t>
+              <a:t>22/7/19</a:t>
             </a:fld>
             <a:endParaRPr lang="en-SG"/>
           </a:p>
@@ -2085,7 +2085,7 @@
           <a:p>
             <a:fld id="{D5F4EE06-143D-4C2F-8831-1CDA21FFE47B}" type="datetimeFigureOut">
               <a:rPr lang="en-SG" smtClean="0"/>
-              <a:t>22/2/19</a:t>
+              <a:t>22/7/19</a:t>
             </a:fld>
             <a:endParaRPr lang="en-SG"/>
           </a:p>
@@ -2398,7 +2398,7 @@
           <a:p>
             <a:fld id="{D5F4EE06-143D-4C2F-8831-1CDA21FFE47B}" type="datetimeFigureOut">
               <a:rPr lang="en-SG" smtClean="0"/>
-              <a:t>22/2/19</a:t>
+              <a:t>22/7/19</a:t>
             </a:fld>
             <a:endParaRPr lang="en-SG"/>
           </a:p>
@@ -2687,7 +2687,7 @@
           <a:p>
             <a:fld id="{D5F4EE06-143D-4C2F-8831-1CDA21FFE47B}" type="datetimeFigureOut">
               <a:rPr lang="en-SG" smtClean="0"/>
-              <a:t>22/2/19</a:t>
+              <a:t>22/7/19</a:t>
             </a:fld>
             <a:endParaRPr lang="en-SG"/>
           </a:p>
@@ -2930,7 +2930,7 @@
           <a:p>
             <a:fld id="{D5F4EE06-143D-4C2F-8831-1CDA21FFE47B}" type="datetimeFigureOut">
               <a:rPr lang="en-SG" smtClean="0"/>
-              <a:t>22/2/19</a:t>
+              <a:t>22/7/19</a:t>
             </a:fld>
             <a:endParaRPr lang="en-SG"/>
           </a:p>
@@ -3352,7 +3352,7 @@
           <p:cNvPr id="5" name="Picture 4">
             <a:extLst>
               <a:ext uri="{FF2B5EF4-FFF2-40B4-BE49-F238E27FC236}">
-                <a16:creationId xmlns:a16="http://schemas.microsoft.com/office/drawing/2014/main" id="{0D954123-975A-3A42-A7F9-E3AC583847B8}"/>
+                <a16:creationId xmlns:a16="http://schemas.microsoft.com/office/drawing/2014/main" id="{57D8E422-39B9-AD4D-AEBC-CAD2FD032214}"/>
               </a:ext>
             </a:extLst>
           </p:cNvPr>
@@ -3362,107 +3362,86 @@
           <p:nvPr/>
         </p:nvPicPr>
         <p:blipFill>
-          <a:blip r:embed="rId2">
-            <a:extLst>
-              <a:ext uri="{28A0092B-C50C-407E-A947-70E740481C1C}">
-                <a14:useLocalDpi xmlns:a14="http://schemas.microsoft.com/office/drawing/2010/main" val="0"/>
-              </a:ext>
-            </a:extLst>
-          </a:blip>
+          <a:blip r:embed="rId2"/>
           <a:stretch>
             <a:fillRect/>
           </a:stretch>
         </p:blipFill>
         <p:spPr>
           <a:xfrm>
-            <a:off x="1305076" y="901373"/>
-            <a:ext cx="9487249" cy="4671748"/>
+            <a:off x="1422855" y="798089"/>
+            <a:ext cx="9317337" cy="5245522"/>
           </a:xfrm>
           <a:prstGeom prst="rect">
             <a:avLst/>
           </a:prstGeom>
+          <a:ln w="12700">
+            <a:solidFill>
+              <a:schemeClr val="tx1"/>
+            </a:solidFill>
+          </a:ln>
         </p:spPr>
       </p:pic>
-      <p:pic>
-        <p:nvPicPr>
-          <p:cNvPr id="2" name="图片 1">
-            <a:extLst>
-              <a:ext uri="{FF2B5EF4-FFF2-40B4-BE49-F238E27FC236}">
-                <a16:creationId xmlns:a16="http://schemas.microsoft.com/office/drawing/2014/main" id="{FEEFED23-9625-46EE-A9C6-DA99D5078E60}"/>
-              </a:ext>
-            </a:extLst>
-          </p:cNvPr>
-          <p:cNvPicPr>
-            <a:picLocks noChangeAspect="1"/>
-          </p:cNvPicPr>
+      <p:sp>
+        <p:nvSpPr>
+          <p:cNvPr id="34" name="Rectangle 33">
+            <a:extLst>
+              <a:ext uri="{FF2B5EF4-FFF2-40B4-BE49-F238E27FC236}">
+                <a16:creationId xmlns:a16="http://schemas.microsoft.com/office/drawing/2014/main" id="{A39783FF-1234-8446-AB32-9380684BB1B3}"/>
+              </a:ext>
+            </a:extLst>
+          </p:cNvPr>
+          <p:cNvSpPr/>
           <p:nvPr/>
-        </p:nvPicPr>
-        <p:blipFill>
-          <a:blip r:embed="rId3"/>
-          <a:stretch>
-            <a:fillRect/>
-          </a:stretch>
-        </p:blipFill>
+        </p:nvSpPr>
         <p:spPr>
           <a:xfrm>
-            <a:off x="1064377" y="379679"/>
-            <a:ext cx="9979368" cy="704619"/>
-          </a:xfrm>
-          <a:prstGeom prst="rect">
-            <a:avLst/>
-          </a:prstGeom>
-        </p:spPr>
-      </p:pic>
-      <p:sp>
-        <p:nvSpPr>
-          <p:cNvPr id="25" name="文本框 24">
-            <a:extLst>
-              <a:ext uri="{FF2B5EF4-FFF2-40B4-BE49-F238E27FC236}">
-                <a16:creationId xmlns:a16="http://schemas.microsoft.com/office/drawing/2014/main" id="{D627E7DD-7D34-4280-A150-3B17A67A2846}"/>
-              </a:ext>
-            </a:extLst>
-          </p:cNvPr>
-          <p:cNvSpPr txBox="1"/>
-          <p:nvPr/>
-        </p:nvSpPr>
-        <p:spPr>
-          <a:xfrm>
-            <a:off x="1080115" y="991630"/>
-            <a:ext cx="5015884" cy="646331"/>
+            <a:off x="1408787" y="814386"/>
+            <a:ext cx="4643017" cy="5229225"/>
           </a:xfrm>
           <a:prstGeom prst="rect">
             <a:avLst/>
           </a:prstGeom>
           <a:noFill/>
-        </p:spPr>
-        <p:txBody>
-          <a:bodyPr wrap="square" rtlCol="0">
-            <a:spAutoFit/>
-          </a:bodyPr>
-          <a:lstStyle/>
-          <a:p>
-            <a:r>
-              <a:rPr lang="en-US" altLang="zh-CN" sz="3600" b="1" dirty="0"/>
-              <a:t>  {</a:t>
-            </a:r>
-            <a:r>
-              <a:rPr lang="en-US" altLang="zh-CN" sz="3600" dirty="0"/>
-              <a:t>                                          </a:t>
-            </a:r>
-            <a:r>
-              <a:rPr lang="en-US" altLang="zh-CN" sz="3600" b="1" dirty="0"/>
-              <a:t>}</a:t>
-            </a:r>
-            <a:endParaRPr lang="zh-CN" altLang="en-US" sz="3600" b="1" dirty="0"/>
-          </a:p>
-        </p:txBody>
-      </p:sp>
-      <p:sp>
-        <p:nvSpPr>
-          <p:cNvPr id="26" name="文本框 25">
-            <a:extLst>
-              <a:ext uri="{FF2B5EF4-FFF2-40B4-BE49-F238E27FC236}">
-                <a16:creationId xmlns:a16="http://schemas.microsoft.com/office/drawing/2014/main" id="{CEC3616D-ADDF-40F1-B171-6C3F36C22891}"/>
+          <a:ln w="57150" cap="flat" cmpd="sng" algn="ctr">
+            <a:solidFill>
+              <a:schemeClr val="accent1"/>
+            </a:solidFill>
+            <a:prstDash val="solid"/>
+            <a:round/>
+            <a:headEnd type="none" w="med" len="med"/>
+            <a:tailEnd type="none" w="med" len="med"/>
+          </a:ln>
+        </p:spPr>
+        <p:style>
+          <a:lnRef idx="0">
+            <a:scrgbClr r="0" g="0" b="0"/>
+          </a:lnRef>
+          <a:fillRef idx="0">
+            <a:scrgbClr r="0" g="0" b="0"/>
+          </a:fillRef>
+          <a:effectRef idx="0">
+            <a:scrgbClr r="0" g="0" b="0"/>
+          </a:effectRef>
+          <a:fontRef idx="minor">
+            <a:schemeClr val="accent1"/>
+          </a:fontRef>
+        </p:style>
+        <p:txBody>
+          <a:bodyPr rtlCol="0" anchor="ctr"/>
+          <a:lstStyle/>
+          <a:p>
+            <a:pPr algn="ctr"/>
+            <a:endParaRPr lang="en-SG"/>
+          </a:p>
+        </p:txBody>
+      </p:sp>
+      <p:sp>
+        <p:nvSpPr>
+          <p:cNvPr id="45" name="文本框 44">
+            <a:extLst>
+              <a:ext uri="{FF2B5EF4-FFF2-40B4-BE49-F238E27FC236}">
+                <a16:creationId xmlns:a16="http://schemas.microsoft.com/office/drawing/2014/main" id="{A0A1A4A5-828A-4BF9-94DF-CD28CBD612CF}"/>
               </a:ext>
             </a:extLst>
           </p:cNvPr>
@@ -3471,8 +3450,8 @@
         </p:nvSpPr>
         <p:spPr>
           <a:xfrm>
-            <a:off x="4338422" y="1423679"/>
-            <a:ext cx="2050741" cy="369332"/>
+            <a:off x="10971251" y="4126375"/>
+            <a:ext cx="750332" cy="276999"/>
           </a:xfrm>
           <a:prstGeom prst="rect">
             <a:avLst/>
@@ -3486,19 +3465,31 @@
           <a:lstStyle/>
           <a:p>
             <a:r>
-              <a:rPr lang="en-US" altLang="zh-CN" dirty="0"/>
-              <a:t>summary-picker</a:t>
-            </a:r>
-            <a:endParaRPr lang="zh-CN" altLang="en-US" dirty="0"/>
-          </a:p>
-        </p:txBody>
-      </p:sp>
-      <p:sp>
-        <p:nvSpPr>
-          <p:cNvPr id="27" name="文本框 26">
-            <a:extLst>
-              <a:ext uri="{FF2B5EF4-FFF2-40B4-BE49-F238E27FC236}">
-                <a16:creationId xmlns:a16="http://schemas.microsoft.com/office/drawing/2014/main" id="{048B4F0D-9235-4911-A47D-8F53A18FA157}"/>
+              <a:rPr lang="en-US" altLang="zh-CN" sz="1200" dirty="0">
+                <a:solidFill>
+                  <a:schemeClr val="accent4">
+                    <a:lumMod val="75000"/>
+                  </a:schemeClr>
+                </a:solidFill>
+              </a:rPr>
+              <a:t>file</a:t>
+            </a:r>
+            <a:endParaRPr lang="zh-CN" altLang="en-US" sz="1200" dirty="0">
+              <a:solidFill>
+                <a:schemeClr val="accent4">
+                  <a:lumMod val="75000"/>
+                </a:schemeClr>
+              </a:solidFill>
+            </a:endParaRPr>
+          </a:p>
+        </p:txBody>
+      </p:sp>
+      <p:sp>
+        <p:nvSpPr>
+          <p:cNvPr id="47" name="文本框 46">
+            <a:extLst>
+              <a:ext uri="{FF2B5EF4-FFF2-40B4-BE49-F238E27FC236}">
+                <a16:creationId xmlns:a16="http://schemas.microsoft.com/office/drawing/2014/main" id="{8A40C309-DFD1-4333-84EB-9117C609942E}"/>
               </a:ext>
             </a:extLst>
           </p:cNvPr>
@@ -3507,8 +3498,8 @@
         </p:nvSpPr>
         <p:spPr>
           <a:xfrm>
-            <a:off x="1145219" y="1778238"/>
-            <a:ext cx="5015884" cy="646331"/>
+            <a:off x="9190215" y="3133527"/>
+            <a:ext cx="849429" cy="276999"/>
           </a:xfrm>
           <a:prstGeom prst="rect">
             <a:avLst/>
@@ -3522,27 +3513,27 @@
           <a:lstStyle/>
           <a:p>
             <a:r>
-              <a:rPr lang="en-US" altLang="zh-CN" sz="3600" b="1"/>
-              <a:t>{</a:t>
-            </a:r>
-            <a:r>
-              <a:rPr lang="en-US" altLang="zh-CN" sz="3600"/>
-              <a:t>                                           </a:t>
-            </a:r>
-            <a:r>
-              <a:rPr lang="en-US" altLang="zh-CN" sz="3600" b="1"/>
-              <a:t>}</a:t>
-            </a:r>
-            <a:endParaRPr lang="zh-CN" altLang="en-US" sz="3600" b="1" dirty="0"/>
-          </a:p>
-        </p:txBody>
-      </p:sp>
-      <p:sp>
-        <p:nvSpPr>
-          <p:cNvPr id="28" name="文本框 27">
-            <a:extLst>
-              <a:ext uri="{FF2B5EF4-FFF2-40B4-BE49-F238E27FC236}">
-                <a16:creationId xmlns:a16="http://schemas.microsoft.com/office/drawing/2014/main" id="{7CB45794-D414-47BD-B3BE-1F1AD5401966}"/>
+              <a:rPr lang="en-US" altLang="zh-CN" sz="1200" dirty="0">
+                <a:solidFill>
+                  <a:srgbClr val="C00000"/>
+                </a:solidFill>
+              </a:rPr>
+              <a:t>title</a:t>
+            </a:r>
+            <a:endParaRPr lang="zh-CN" altLang="en-US" sz="1200" dirty="0">
+              <a:solidFill>
+                <a:srgbClr val="C00000"/>
+              </a:solidFill>
+            </a:endParaRPr>
+          </a:p>
+        </p:txBody>
+      </p:sp>
+      <p:sp>
+        <p:nvSpPr>
+          <p:cNvPr id="24" name="TextBox 23">
+            <a:extLst>
+              <a:ext uri="{FF2B5EF4-FFF2-40B4-BE49-F238E27FC236}">
+                <a16:creationId xmlns:a16="http://schemas.microsoft.com/office/drawing/2014/main" id="{450BEBC7-C0C7-CF48-95D5-47FDD988DA61}"/>
               </a:ext>
             </a:extLst>
           </p:cNvPr>
@@ -3551,8 +3542,8 @@
         </p:nvSpPr>
         <p:spPr>
           <a:xfrm>
-            <a:off x="1385074" y="1932126"/>
-            <a:ext cx="1513234" cy="338554"/>
+            <a:off x="2726436" y="163993"/>
+            <a:ext cx="2090928" cy="276999"/>
           </a:xfrm>
           <a:prstGeom prst="rect">
             <a:avLst/>
@@ -3565,20 +3556,795 @@
           </a:bodyPr>
           <a:lstStyle/>
           <a:p>
-            <a:r>
-              <a:rPr lang="en-US" altLang="zh-CN" sz="1600" dirty="0"/>
+            <a:pPr algn="ctr"/>
+            <a:r>
+              <a:rPr lang="en-US" sz="1200" dirty="0">
+                <a:solidFill>
+                  <a:schemeClr val="accent1"/>
+                </a:solidFill>
+              </a:rPr>
+              <a:t>summary</a:t>
+            </a:r>
+            <a:endParaRPr lang="en-SG" sz="1200" dirty="0">
+              <a:solidFill>
+                <a:schemeClr val="accent1"/>
+              </a:solidFill>
+            </a:endParaRPr>
+          </a:p>
+        </p:txBody>
+      </p:sp>
+      <p:sp>
+        <p:nvSpPr>
+          <p:cNvPr id="32" name="TextBox 31">
+            <a:extLst>
+              <a:ext uri="{FF2B5EF4-FFF2-40B4-BE49-F238E27FC236}">
+                <a16:creationId xmlns:a16="http://schemas.microsoft.com/office/drawing/2014/main" id="{4398EB41-E844-AC49-8C8F-94E761AA5F54}"/>
+              </a:ext>
+            </a:extLst>
+          </p:cNvPr>
+          <p:cNvSpPr txBox="1"/>
+          <p:nvPr/>
+        </p:nvSpPr>
+        <p:spPr>
+          <a:xfrm>
+            <a:off x="7432929" y="161454"/>
+            <a:ext cx="2090928" cy="276999"/>
+          </a:xfrm>
+          <a:prstGeom prst="rect">
+            <a:avLst/>
+          </a:prstGeom>
+          <a:noFill/>
+        </p:spPr>
+        <p:txBody>
+          <a:bodyPr wrap="square" rtlCol="0">
+            <a:spAutoFit/>
+          </a:bodyPr>
+          <a:lstStyle/>
+          <a:p>
+            <a:pPr algn="ctr"/>
+            <a:r>
+              <a:rPr lang="en-US" sz="1200" dirty="0">
+                <a:solidFill>
+                  <a:schemeClr val="accent2"/>
+                </a:solidFill>
+              </a:rPr>
+              <a:t>tabs-pane</a:t>
+            </a:r>
+            <a:endParaRPr lang="en-SG" sz="1200" dirty="0">
+              <a:solidFill>
+                <a:schemeClr val="accent2"/>
+              </a:solidFill>
+            </a:endParaRPr>
+          </a:p>
+        </p:txBody>
+      </p:sp>
+      <p:sp>
+        <p:nvSpPr>
+          <p:cNvPr id="36" name="Rectangle 35">
+            <a:extLst>
+              <a:ext uri="{FF2B5EF4-FFF2-40B4-BE49-F238E27FC236}">
+                <a16:creationId xmlns:a16="http://schemas.microsoft.com/office/drawing/2014/main" id="{B174F72C-650B-8E44-A379-A24D0DB5B758}"/>
+              </a:ext>
+            </a:extLst>
+          </p:cNvPr>
+          <p:cNvSpPr/>
+          <p:nvPr/>
+        </p:nvSpPr>
+        <p:spPr>
+          <a:xfrm>
+            <a:off x="6140198" y="814386"/>
+            <a:ext cx="4612003" cy="5229225"/>
+          </a:xfrm>
+          <a:prstGeom prst="rect">
+            <a:avLst/>
+          </a:prstGeom>
+          <a:noFill/>
+          <a:ln w="57150" cap="flat" cmpd="sng" algn="ctr">
+            <a:solidFill>
+              <a:schemeClr val="accent2"/>
+            </a:solidFill>
+            <a:prstDash val="solid"/>
+            <a:round/>
+            <a:headEnd type="none" w="med" len="med"/>
+            <a:tailEnd type="none" w="med" len="med"/>
+          </a:ln>
+        </p:spPr>
+        <p:style>
+          <a:lnRef idx="0">
+            <a:scrgbClr r="0" g="0" b="0"/>
+          </a:lnRef>
+          <a:fillRef idx="0">
+            <a:scrgbClr r="0" g="0" b="0"/>
+          </a:fillRef>
+          <a:effectRef idx="0">
+            <a:scrgbClr r="0" g="0" b="0"/>
+          </a:effectRef>
+          <a:fontRef idx="minor">
+            <a:schemeClr val="accent1"/>
+          </a:fontRef>
+        </p:style>
+        <p:txBody>
+          <a:bodyPr rtlCol="0" anchor="ctr"/>
+          <a:lstStyle/>
+          <a:p>
+            <a:pPr algn="ctr"/>
+            <a:endParaRPr lang="en-SG"/>
+          </a:p>
+        </p:txBody>
+      </p:sp>
+      <p:sp>
+        <p:nvSpPr>
+          <p:cNvPr id="40" name="TextBox 39">
+            <a:extLst>
+              <a:ext uri="{FF2B5EF4-FFF2-40B4-BE49-F238E27FC236}">
+                <a16:creationId xmlns:a16="http://schemas.microsoft.com/office/drawing/2014/main" id="{87B6C03F-369B-FC4B-A10B-9B5BFBCEF11A}"/>
+              </a:ext>
+            </a:extLst>
+          </p:cNvPr>
+          <p:cNvSpPr txBox="1"/>
+          <p:nvPr/>
+        </p:nvSpPr>
+        <p:spPr>
+          <a:xfrm>
+            <a:off x="1" y="1185282"/>
+            <a:ext cx="1422854" cy="276999"/>
+          </a:xfrm>
+          <a:prstGeom prst="rect">
+            <a:avLst/>
+          </a:prstGeom>
+          <a:noFill/>
+        </p:spPr>
+        <p:txBody>
+          <a:bodyPr wrap="square" rtlCol="0">
+            <a:spAutoFit/>
+          </a:bodyPr>
+          <a:lstStyle/>
+          <a:p>
+            <a:pPr algn="ctr"/>
+            <a:r>
+              <a:rPr lang="en-US" sz="1200" dirty="0">
+                <a:solidFill>
+                  <a:schemeClr val="accent6"/>
+                </a:solidFill>
+              </a:rPr>
+              <a:t>summary-picker</a:t>
+            </a:r>
+          </a:p>
+        </p:txBody>
+      </p:sp>
+      <p:sp>
+        <p:nvSpPr>
+          <p:cNvPr id="41" name="Rectangle 40">
+            <a:extLst>
+              <a:ext uri="{FF2B5EF4-FFF2-40B4-BE49-F238E27FC236}">
+                <a16:creationId xmlns:a16="http://schemas.microsoft.com/office/drawing/2014/main" id="{24AE4F15-738B-C34D-830A-5AA47285C7ED}"/>
+              </a:ext>
+            </a:extLst>
+          </p:cNvPr>
+          <p:cNvSpPr/>
+          <p:nvPr/>
+        </p:nvSpPr>
+        <p:spPr>
+          <a:xfrm>
+            <a:off x="1674004" y="896446"/>
+            <a:ext cx="4074863" cy="869029"/>
+          </a:xfrm>
+          <a:prstGeom prst="rect">
+            <a:avLst/>
+          </a:prstGeom>
+          <a:noFill/>
+          <a:ln w="12700" cap="flat" cmpd="sng" algn="ctr">
+            <a:solidFill>
+              <a:schemeClr val="accent6"/>
+            </a:solidFill>
+            <a:prstDash val="solid"/>
+            <a:round/>
+            <a:headEnd type="none" w="med" len="med"/>
+            <a:tailEnd type="none" w="med" len="med"/>
+          </a:ln>
+        </p:spPr>
+        <p:style>
+          <a:lnRef idx="0">
+            <a:scrgbClr r="0" g="0" b="0"/>
+          </a:lnRef>
+          <a:fillRef idx="0">
+            <a:scrgbClr r="0" g="0" b="0"/>
+          </a:fillRef>
+          <a:effectRef idx="0">
+            <a:scrgbClr r="0" g="0" b="0"/>
+          </a:effectRef>
+          <a:fontRef idx="minor">
+            <a:schemeClr val="accent6"/>
+          </a:fontRef>
+        </p:style>
+        <p:txBody>
+          <a:bodyPr rtlCol="0" anchor="ctr"/>
+          <a:lstStyle/>
+          <a:p>
+            <a:pPr algn="ctr"/>
+            <a:endParaRPr lang="en-SG"/>
+          </a:p>
+        </p:txBody>
+      </p:sp>
+      <p:sp>
+        <p:nvSpPr>
+          <p:cNvPr id="42" name="Rectangle 41">
+            <a:extLst>
+              <a:ext uri="{FF2B5EF4-FFF2-40B4-BE49-F238E27FC236}">
+                <a16:creationId xmlns:a16="http://schemas.microsoft.com/office/drawing/2014/main" id="{570EA449-180B-9046-8449-8C441F0729CF}"/>
+              </a:ext>
+            </a:extLst>
+          </p:cNvPr>
+          <p:cNvSpPr/>
+          <p:nvPr/>
+        </p:nvSpPr>
+        <p:spPr>
+          <a:xfrm>
+            <a:off x="1484661" y="1950544"/>
+            <a:ext cx="4504352" cy="449190"/>
+          </a:xfrm>
+          <a:prstGeom prst="rect">
+            <a:avLst/>
+          </a:prstGeom>
+          <a:noFill/>
+          <a:ln w="12700" cap="flat" cmpd="sng" algn="ctr">
+            <a:solidFill>
+              <a:srgbClr val="7030A0"/>
+            </a:solidFill>
+            <a:prstDash val="solid"/>
+            <a:round/>
+            <a:headEnd type="none" w="med" len="med"/>
+            <a:tailEnd type="none" w="med" len="med"/>
+          </a:ln>
+        </p:spPr>
+        <p:style>
+          <a:lnRef idx="0">
+            <a:scrgbClr r="0" g="0" b="0"/>
+          </a:lnRef>
+          <a:fillRef idx="0">
+            <a:scrgbClr r="0" g="0" b="0"/>
+          </a:fillRef>
+          <a:effectRef idx="0">
+            <a:scrgbClr r="0" g="0" b="0"/>
+          </a:effectRef>
+          <a:fontRef idx="minor">
+            <a:schemeClr val="accent4"/>
+          </a:fontRef>
+        </p:style>
+        <p:txBody>
+          <a:bodyPr rtlCol="0" anchor="ctr"/>
+          <a:lstStyle/>
+          <a:p>
+            <a:pPr algn="ctr"/>
+            <a:endParaRPr lang="en-SG"/>
+          </a:p>
+        </p:txBody>
+      </p:sp>
+      <p:sp>
+        <p:nvSpPr>
+          <p:cNvPr id="48" name="TextBox 47">
+            <a:extLst>
+              <a:ext uri="{FF2B5EF4-FFF2-40B4-BE49-F238E27FC236}">
+                <a16:creationId xmlns:a16="http://schemas.microsoft.com/office/drawing/2014/main" id="{A77BE544-7145-6949-94AF-AFCE5DA7C7AD}"/>
+              </a:ext>
+            </a:extLst>
+          </p:cNvPr>
+          <p:cNvSpPr txBox="1"/>
+          <p:nvPr/>
+        </p:nvSpPr>
+        <p:spPr>
+          <a:xfrm>
+            <a:off x="-13217" y="2026833"/>
+            <a:ext cx="1202954" cy="276999"/>
+          </a:xfrm>
+          <a:prstGeom prst="rect">
+            <a:avLst/>
+          </a:prstGeom>
+          <a:noFill/>
+        </p:spPr>
+        <p:txBody>
+          <a:bodyPr wrap="square" rtlCol="0">
+            <a:spAutoFit/>
+          </a:bodyPr>
+          <a:lstStyle/>
+          <a:p>
+            <a:pPr algn="ctr"/>
+            <a:r>
+              <a:rPr lang="en-US" sz="1200" dirty="0">
+                <a:solidFill>
+                  <a:srgbClr val="7030A0"/>
+                </a:solidFill>
+              </a:rPr>
               <a:t>summary-chart</a:t>
             </a:r>
-            <a:endParaRPr lang="zh-CN" altLang="en-US" sz="1600" dirty="0"/>
+          </a:p>
+        </p:txBody>
+      </p:sp>
+      <p:sp>
+        <p:nvSpPr>
+          <p:cNvPr id="49" name="Rectangle 48">
+            <a:extLst>
+              <a:ext uri="{FF2B5EF4-FFF2-40B4-BE49-F238E27FC236}">
+                <a16:creationId xmlns:a16="http://schemas.microsoft.com/office/drawing/2014/main" id="{5720B1C7-874B-4E44-A7D1-E44FC02B40B3}"/>
+              </a:ext>
+            </a:extLst>
+          </p:cNvPr>
+          <p:cNvSpPr/>
+          <p:nvPr/>
+        </p:nvSpPr>
+        <p:spPr>
+          <a:xfrm>
+            <a:off x="1501594" y="4826286"/>
+            <a:ext cx="4482462" cy="276999"/>
+          </a:xfrm>
+          <a:prstGeom prst="rect">
+            <a:avLst/>
+          </a:prstGeom>
+          <a:noFill/>
+          <a:ln w="9525" cap="flat" cmpd="sng" algn="ctr">
+            <a:solidFill>
+              <a:schemeClr val="dk1"/>
+            </a:solidFill>
+            <a:prstDash val="solid"/>
+            <a:round/>
+            <a:headEnd type="none" w="med" len="med"/>
+            <a:tailEnd type="none" w="med" len="med"/>
+          </a:ln>
+        </p:spPr>
+        <p:style>
+          <a:lnRef idx="0">
+            <a:scrgbClr r="0" g="0" b="0"/>
+          </a:lnRef>
+          <a:fillRef idx="0">
+            <a:scrgbClr r="0" g="0" b="0"/>
+          </a:fillRef>
+          <a:effectRef idx="0">
+            <a:scrgbClr r="0" g="0" b="0"/>
+          </a:effectRef>
+          <a:fontRef idx="minor">
+            <a:schemeClr val="dk1"/>
+          </a:fontRef>
+        </p:style>
+        <p:txBody>
+          <a:bodyPr rtlCol="0" anchor="ctr"/>
+          <a:lstStyle/>
+          <a:p>
+            <a:pPr algn="ctr"/>
+            <a:endParaRPr lang="en-SG"/>
+          </a:p>
+        </p:txBody>
+      </p:sp>
+      <p:sp>
+        <p:nvSpPr>
+          <p:cNvPr id="51" name="TextBox 50">
+            <a:extLst>
+              <a:ext uri="{FF2B5EF4-FFF2-40B4-BE49-F238E27FC236}">
+                <a16:creationId xmlns:a16="http://schemas.microsoft.com/office/drawing/2014/main" id="{6C2AF7FB-234B-7347-967F-A89B873E0061}"/>
+              </a:ext>
+            </a:extLst>
+          </p:cNvPr>
+          <p:cNvSpPr txBox="1"/>
+          <p:nvPr/>
+        </p:nvSpPr>
+        <p:spPr>
+          <a:xfrm>
+            <a:off x="23285" y="4754389"/>
+            <a:ext cx="1589577" cy="461665"/>
+          </a:xfrm>
+          <a:prstGeom prst="rect">
+            <a:avLst/>
+          </a:prstGeom>
+          <a:noFill/>
+        </p:spPr>
+        <p:txBody>
+          <a:bodyPr wrap="square" rtlCol="0">
+            <a:spAutoFit/>
+          </a:bodyPr>
+          <a:lstStyle/>
+          <a:p>
+            <a:pPr algn="ctr"/>
+            <a:r>
+              <a:rPr lang="en-US" sz="1200" dirty="0"/>
+              <a:t>summary-</a:t>
+            </a:r>
+          </a:p>
+          <a:p>
+            <a:pPr algn="ctr"/>
+            <a:r>
+              <a:rPr lang="en-US" sz="1200" dirty="0"/>
+              <a:t>chart__</a:t>
+            </a:r>
+            <a:r>
+              <a:rPr lang="en-US" sz="1200" dirty="0" err="1"/>
+              <a:t>contrib</a:t>
+            </a:r>
+            <a:endParaRPr lang="en-SG" sz="1200" dirty="0"/>
+          </a:p>
+        </p:txBody>
+      </p:sp>
+      <p:sp>
+        <p:nvSpPr>
+          <p:cNvPr id="59" name="TextBox 58">
+            <a:extLst>
+              <a:ext uri="{FF2B5EF4-FFF2-40B4-BE49-F238E27FC236}">
+                <a16:creationId xmlns:a16="http://schemas.microsoft.com/office/drawing/2014/main" id="{9ED53A0E-FCFE-DE4A-9776-897FDA4E3D8F}"/>
+              </a:ext>
+            </a:extLst>
+          </p:cNvPr>
+          <p:cNvSpPr txBox="1"/>
+          <p:nvPr/>
+        </p:nvSpPr>
+        <p:spPr>
+          <a:xfrm>
+            <a:off x="3232326" y="2828987"/>
+            <a:ext cx="2516973" cy="276999"/>
+          </a:xfrm>
+          <a:prstGeom prst="rect">
+            <a:avLst/>
+          </a:prstGeom>
+          <a:noFill/>
+        </p:spPr>
+        <p:txBody>
+          <a:bodyPr wrap="square" rtlCol="0">
+            <a:spAutoFit/>
+          </a:bodyPr>
+          <a:lstStyle/>
+          <a:p>
+            <a:r>
+              <a:rPr lang="en-US" sz="1200" dirty="0">
+                <a:solidFill>
+                  <a:srgbClr val="FFC000"/>
+                </a:solidFill>
+              </a:rPr>
+              <a:t>summary-</a:t>
+            </a:r>
+            <a:r>
+              <a:rPr lang="en-US" sz="1200" dirty="0" err="1">
+                <a:solidFill>
+                  <a:srgbClr val="FFC000"/>
+                </a:solidFill>
+              </a:rPr>
+              <a:t>chart__ramp__slice</a:t>
+            </a:r>
+            <a:endParaRPr lang="en-SG" sz="1200" dirty="0">
+              <a:solidFill>
+                <a:srgbClr val="FFC000"/>
+              </a:solidFill>
+            </a:endParaRPr>
+          </a:p>
+        </p:txBody>
+      </p:sp>
+      <p:sp>
+        <p:nvSpPr>
+          <p:cNvPr id="60" name="Rectangle 59">
+            <a:extLst>
+              <a:ext uri="{FF2B5EF4-FFF2-40B4-BE49-F238E27FC236}">
+                <a16:creationId xmlns:a16="http://schemas.microsoft.com/office/drawing/2014/main" id="{0FE18B14-A8FF-CA40-9773-69CCCF32CE9A}"/>
+              </a:ext>
+            </a:extLst>
+          </p:cNvPr>
+          <p:cNvSpPr/>
+          <p:nvPr/>
+        </p:nvSpPr>
+        <p:spPr>
+          <a:xfrm>
+            <a:off x="1510797" y="2556435"/>
+            <a:ext cx="4482463" cy="305570"/>
+          </a:xfrm>
+          <a:prstGeom prst="rect">
+            <a:avLst/>
+          </a:prstGeom>
+          <a:noFill/>
+          <a:ln w="12700" cap="flat" cmpd="sng" algn="ctr">
+            <a:solidFill>
+              <a:schemeClr val="accent5"/>
+            </a:solidFill>
+            <a:prstDash val="solid"/>
+            <a:round/>
+            <a:headEnd type="none" w="med" len="med"/>
+            <a:tailEnd type="none" w="med" len="med"/>
+          </a:ln>
+        </p:spPr>
+        <p:style>
+          <a:lnRef idx="0">
+            <a:scrgbClr r="0" g="0" b="0"/>
+          </a:lnRef>
+          <a:fillRef idx="0">
+            <a:scrgbClr r="0" g="0" b="0"/>
+          </a:fillRef>
+          <a:effectRef idx="0">
+            <a:scrgbClr r="0" g="0" b="0"/>
+          </a:effectRef>
+          <a:fontRef idx="minor">
+            <a:schemeClr val="accent4"/>
+          </a:fontRef>
+        </p:style>
+        <p:txBody>
+          <a:bodyPr rtlCol="0" anchor="ctr"/>
+          <a:lstStyle/>
+          <a:p>
+            <a:pPr algn="ctr"/>
+            <a:endParaRPr lang="en-SG" dirty="0">
+              <a:highlight>
+                <a:srgbClr val="FFFF00"/>
+              </a:highlight>
+            </a:endParaRPr>
+          </a:p>
+        </p:txBody>
+      </p:sp>
+      <p:sp>
+        <p:nvSpPr>
+          <p:cNvPr id="62" name="TextBox 61">
+            <a:extLst>
+              <a:ext uri="{FF2B5EF4-FFF2-40B4-BE49-F238E27FC236}">
+                <a16:creationId xmlns:a16="http://schemas.microsoft.com/office/drawing/2014/main" id="{3C528547-1EDA-0344-9C22-58F28B4D7B80}"/>
+              </a:ext>
+            </a:extLst>
+          </p:cNvPr>
+          <p:cNvSpPr txBox="1"/>
+          <p:nvPr/>
+        </p:nvSpPr>
+        <p:spPr>
+          <a:xfrm>
+            <a:off x="0" y="2478387"/>
+            <a:ext cx="1243423" cy="461665"/>
+          </a:xfrm>
+          <a:prstGeom prst="rect">
+            <a:avLst/>
+          </a:prstGeom>
+          <a:noFill/>
+        </p:spPr>
+        <p:txBody>
+          <a:bodyPr wrap="square" rtlCol="0">
+            <a:spAutoFit/>
+          </a:bodyPr>
+          <a:lstStyle/>
+          <a:p>
+            <a:pPr algn="ctr"/>
+            <a:r>
+              <a:rPr lang="en-US" sz="1200" dirty="0">
+                <a:solidFill>
+                  <a:srgbClr val="0070C0"/>
+                </a:solidFill>
+              </a:rPr>
+              <a:t>summary-</a:t>
+            </a:r>
+            <a:r>
+              <a:rPr lang="en-US" sz="1200" dirty="0" err="1">
+                <a:solidFill>
+                  <a:srgbClr val="0070C0"/>
+                </a:solidFill>
+              </a:rPr>
+              <a:t>chart__ramp</a:t>
+            </a:r>
+            <a:endParaRPr lang="en-US" sz="1200" dirty="0">
+              <a:solidFill>
+                <a:srgbClr val="0070C0"/>
+              </a:solidFill>
+            </a:endParaRPr>
+          </a:p>
+        </p:txBody>
+      </p:sp>
+      <p:sp>
+        <p:nvSpPr>
+          <p:cNvPr id="69" name="TextBox 68">
+            <a:extLst>
+              <a:ext uri="{FF2B5EF4-FFF2-40B4-BE49-F238E27FC236}">
+                <a16:creationId xmlns:a16="http://schemas.microsoft.com/office/drawing/2014/main" id="{D26E4E26-EF97-A547-93AF-6C3384E7A51F}"/>
+              </a:ext>
+            </a:extLst>
+          </p:cNvPr>
+          <p:cNvSpPr txBox="1"/>
+          <p:nvPr/>
+        </p:nvSpPr>
+        <p:spPr>
+          <a:xfrm>
+            <a:off x="8697510" y="1792813"/>
+            <a:ext cx="1080151" cy="276999"/>
+          </a:xfrm>
+          <a:prstGeom prst="rect">
+            <a:avLst/>
+          </a:prstGeom>
+          <a:noFill/>
+        </p:spPr>
+        <p:txBody>
+          <a:bodyPr wrap="square" rtlCol="0">
+            <a:spAutoFit/>
+          </a:bodyPr>
+          <a:lstStyle/>
+          <a:p>
+            <a:r>
+              <a:rPr lang="en-US" sz="1200" dirty="0">
+                <a:solidFill>
+                  <a:schemeClr val="accent6">
+                    <a:lumMod val="75000"/>
+                  </a:schemeClr>
+                </a:solidFill>
+              </a:rPr>
+              <a:t>glob filter</a:t>
+            </a:r>
+            <a:endParaRPr lang="en-SG" sz="1200" dirty="0">
+              <a:solidFill>
+                <a:schemeClr val="accent6">
+                  <a:lumMod val="75000"/>
+                </a:schemeClr>
+              </a:solidFill>
+            </a:endParaRPr>
+          </a:p>
+        </p:txBody>
+      </p:sp>
+      <p:sp>
+        <p:nvSpPr>
+          <p:cNvPr id="56" name="Rectangle 55">
+            <a:extLst>
+              <a:ext uri="{FF2B5EF4-FFF2-40B4-BE49-F238E27FC236}">
+                <a16:creationId xmlns:a16="http://schemas.microsoft.com/office/drawing/2014/main" id="{302C24E7-F5CF-7D4F-9162-44F08F19CA6F}"/>
+              </a:ext>
+            </a:extLst>
+          </p:cNvPr>
+          <p:cNvSpPr/>
+          <p:nvPr/>
+        </p:nvSpPr>
+        <p:spPr>
+          <a:xfrm>
+            <a:off x="6191491" y="1835450"/>
+            <a:ext cx="2022818" cy="277000"/>
+          </a:xfrm>
+          <a:prstGeom prst="rect">
+            <a:avLst/>
+          </a:prstGeom>
+          <a:noFill/>
+          <a:ln w="12700" cap="flat" cmpd="sng" algn="ctr">
+            <a:solidFill>
+              <a:schemeClr val="accent6">
+                <a:lumMod val="75000"/>
+              </a:schemeClr>
+            </a:solidFill>
+            <a:prstDash val="solid"/>
+            <a:round/>
+            <a:headEnd type="none" w="med" len="med"/>
+            <a:tailEnd type="none" w="med" len="med"/>
+          </a:ln>
+        </p:spPr>
+        <p:style>
+          <a:lnRef idx="0">
+            <a:scrgbClr r="0" g="0" b="0"/>
+          </a:lnRef>
+          <a:fillRef idx="0">
+            <a:scrgbClr r="0" g="0" b="0"/>
+          </a:fillRef>
+          <a:effectRef idx="0">
+            <a:scrgbClr r="0" g="0" b="0"/>
+          </a:effectRef>
+          <a:fontRef idx="minor">
+            <a:schemeClr val="accent6"/>
+          </a:fontRef>
+        </p:style>
+        <p:txBody>
+          <a:bodyPr rtlCol="0" anchor="ctr"/>
+          <a:lstStyle/>
+          <a:p>
+            <a:pPr algn="ctr"/>
+            <a:endParaRPr lang="en-SG"/>
+          </a:p>
+        </p:txBody>
+      </p:sp>
+      <p:sp>
+        <p:nvSpPr>
+          <p:cNvPr id="64" name="Rectangle 63">
+            <a:extLst>
+              <a:ext uri="{FF2B5EF4-FFF2-40B4-BE49-F238E27FC236}">
+                <a16:creationId xmlns:a16="http://schemas.microsoft.com/office/drawing/2014/main" id="{A2744CE9-0A67-9A43-A9BB-0CF02DB76205}"/>
+              </a:ext>
+            </a:extLst>
+          </p:cNvPr>
+          <p:cNvSpPr/>
+          <p:nvPr/>
+        </p:nvSpPr>
+        <p:spPr>
+          <a:xfrm>
+            <a:off x="6210157" y="3176139"/>
+            <a:ext cx="2516653" cy="217707"/>
+          </a:xfrm>
+          <a:prstGeom prst="rect">
+            <a:avLst/>
+          </a:prstGeom>
+          <a:noFill/>
+          <a:ln w="12700" cap="flat" cmpd="sng" algn="ctr">
+            <a:solidFill>
+              <a:srgbClr val="C00000"/>
+            </a:solidFill>
+            <a:prstDash val="solid"/>
+            <a:round/>
+            <a:headEnd type="none" w="med" len="med"/>
+            <a:tailEnd type="none" w="med" len="med"/>
+          </a:ln>
+        </p:spPr>
+        <p:style>
+          <a:lnRef idx="0">
+            <a:scrgbClr r="0" g="0" b="0"/>
+          </a:lnRef>
+          <a:fillRef idx="0">
+            <a:scrgbClr r="0" g="0" b="0"/>
+          </a:fillRef>
+          <a:effectRef idx="0">
+            <a:scrgbClr r="0" g="0" b="0"/>
+          </a:effectRef>
+          <a:fontRef idx="minor">
+            <a:schemeClr val="accent6"/>
+          </a:fontRef>
+        </p:style>
+        <p:txBody>
+          <a:bodyPr rtlCol="0" anchor="ctr"/>
+          <a:lstStyle/>
+          <a:p>
+            <a:pPr algn="ctr"/>
+            <a:endParaRPr lang="en-SG"/>
+          </a:p>
+        </p:txBody>
+      </p:sp>
+      <p:sp>
+        <p:nvSpPr>
+          <p:cNvPr id="66" name="Rectangle 65">
+            <a:extLst>
+              <a:ext uri="{FF2B5EF4-FFF2-40B4-BE49-F238E27FC236}">
+                <a16:creationId xmlns:a16="http://schemas.microsoft.com/office/drawing/2014/main" id="{C141FFD1-6C95-3144-91D0-6661C4DDF579}"/>
+              </a:ext>
+            </a:extLst>
+          </p:cNvPr>
+          <p:cNvSpPr/>
+          <p:nvPr/>
+        </p:nvSpPr>
+        <p:spPr>
+          <a:xfrm>
+            <a:off x="6186172" y="3133515"/>
+            <a:ext cx="4450097" cy="2217420"/>
+          </a:xfrm>
+          <a:prstGeom prst="rect">
+            <a:avLst/>
+          </a:prstGeom>
+          <a:noFill/>
+          <a:ln w="12700" cap="flat" cmpd="sng" algn="ctr">
+            <a:solidFill>
+              <a:schemeClr val="accent4">
+                <a:lumMod val="50000"/>
+              </a:schemeClr>
+            </a:solidFill>
+            <a:prstDash val="solid"/>
+            <a:round/>
+            <a:headEnd type="none" w="med" len="med"/>
+            <a:tailEnd type="none" w="med" len="med"/>
+          </a:ln>
+        </p:spPr>
+        <p:style>
+          <a:lnRef idx="0">
+            <a:scrgbClr r="0" g="0" b="0"/>
+          </a:lnRef>
+          <a:fillRef idx="0">
+            <a:scrgbClr r="0" g="0" b="0"/>
+          </a:fillRef>
+          <a:effectRef idx="0">
+            <a:scrgbClr r="0" g="0" b="0"/>
+          </a:effectRef>
+          <a:fontRef idx="minor">
+            <a:schemeClr val="accent6"/>
+          </a:fontRef>
+        </p:style>
+        <p:txBody>
+          <a:bodyPr rtlCol="0" anchor="ctr"/>
+          <a:lstStyle/>
+          <a:p>
+            <a:pPr algn="ctr"/>
+            <a:endParaRPr lang="en-SG"/>
           </a:p>
         </p:txBody>
       </p:sp>
       <p:cxnSp>
         <p:nvCxnSpPr>
-          <p:cNvPr id="30" name="直接箭头连接符 29">
-            <a:extLst>
-              <a:ext uri="{FF2B5EF4-FFF2-40B4-BE49-F238E27FC236}">
-                <a16:creationId xmlns:a16="http://schemas.microsoft.com/office/drawing/2014/main" id="{E32F0A57-3030-43BF-ADC0-65784D6DB3BE}"/>
+          <p:cNvPr id="4" name="Straight Arrow Connector 3">
+            <a:extLst>
+              <a:ext uri="{FF2B5EF4-FFF2-40B4-BE49-F238E27FC236}">
+                <a16:creationId xmlns:a16="http://schemas.microsoft.com/office/drawing/2014/main" id="{0E1E9E40-02F3-174C-97DB-3B6E1415124B}"/>
               </a:ext>
             </a:extLst>
           </p:cNvPr>
@@ -3588,78 +4354,41 @@
           <p:nvPr/>
         </p:nvCxnSpPr>
         <p:spPr>
-          <a:xfrm flipH="1">
-            <a:off x="2219081" y="5095039"/>
-            <a:ext cx="621976" cy="325248"/>
+          <a:xfrm>
+            <a:off x="1294354" y="1335408"/>
+            <a:ext cx="352376" cy="0"/>
           </a:xfrm>
           <a:prstGeom prst="straightConnector1">
             <a:avLst/>
           </a:prstGeom>
-          <a:ln w="28575">
+          <a:ln w="12700">
+            <a:solidFill>
+              <a:schemeClr val="accent6"/>
+            </a:solidFill>
             <a:tailEnd type="triangle"/>
           </a:ln>
         </p:spPr>
         <p:style>
           <a:lnRef idx="1">
-            <a:schemeClr val="dk1"/>
+            <a:schemeClr val="accent1"/>
           </a:lnRef>
           <a:fillRef idx="0">
-            <a:schemeClr val="dk1"/>
+            <a:schemeClr val="accent1"/>
           </a:fillRef>
           <a:effectRef idx="0">
-            <a:schemeClr val="dk1"/>
+            <a:schemeClr val="accent1"/>
           </a:effectRef>
           <a:fontRef idx="minor">
             <a:schemeClr val="tx1"/>
           </a:fontRef>
         </p:style>
       </p:cxnSp>
-      <p:sp>
-        <p:nvSpPr>
-          <p:cNvPr id="31" name="文本框 30">
-            <a:extLst>
-              <a:ext uri="{FF2B5EF4-FFF2-40B4-BE49-F238E27FC236}">
-                <a16:creationId xmlns:a16="http://schemas.microsoft.com/office/drawing/2014/main" id="{A6CD96EA-F1F9-4224-A314-6E2FC781E961}"/>
-              </a:ext>
-            </a:extLst>
-          </p:cNvPr>
-          <p:cNvSpPr txBox="1"/>
-          <p:nvPr/>
-        </p:nvSpPr>
-        <p:spPr>
-          <a:xfrm>
-            <a:off x="2841057" y="4906809"/>
-            <a:ext cx="2522736" cy="369332"/>
-          </a:xfrm>
-          <a:prstGeom prst="rect">
-            <a:avLst/>
-          </a:prstGeom>
-          <a:noFill/>
-        </p:spPr>
-        <p:txBody>
-          <a:bodyPr wrap="square" rtlCol="0">
-            <a:spAutoFit/>
-          </a:bodyPr>
-          <a:lstStyle/>
-          <a:p>
-            <a:r>
-              <a:rPr lang="en-US" altLang="zh-CN" dirty="0"/>
-              <a:t>summary-</a:t>
-            </a:r>
-            <a:r>
-              <a:rPr lang="en-US" altLang="zh-CN" dirty="0" err="1"/>
-              <a:t>chart__ramp</a:t>
-            </a:r>
-            <a:endParaRPr lang="zh-CN" altLang="en-US" dirty="0"/>
-          </a:p>
-        </p:txBody>
-      </p:sp>
       <p:cxnSp>
         <p:nvCxnSpPr>
-          <p:cNvPr id="33" name="直接箭头连接符 32">
-            <a:extLst>
-              <a:ext uri="{FF2B5EF4-FFF2-40B4-BE49-F238E27FC236}">
-                <a16:creationId xmlns:a16="http://schemas.microsoft.com/office/drawing/2014/main" id="{E128B1A9-EAAA-45CA-9444-F3F1ABE070EA}"/>
+          <p:cNvPr id="37" name="Straight Arrow Connector 36">
+            <a:extLst>
+              <a:ext uri="{FF2B5EF4-FFF2-40B4-BE49-F238E27FC236}">
+                <a16:creationId xmlns:a16="http://schemas.microsoft.com/office/drawing/2014/main" id="{DEEEF689-CF7E-7149-97BA-3D3957707314}"/>
               </a:ext>
             </a:extLst>
           </p:cNvPr>
@@ -3669,78 +4398,41 @@
           <p:nvPr/>
         </p:nvCxnSpPr>
         <p:spPr>
-          <a:xfrm flipH="1" flipV="1">
-            <a:off x="2898308" y="4188346"/>
-            <a:ext cx="623065" cy="249554"/>
+          <a:xfrm>
+            <a:off x="1068915" y="2178394"/>
+            <a:ext cx="415745" cy="0"/>
           </a:xfrm>
           <a:prstGeom prst="straightConnector1">
             <a:avLst/>
           </a:prstGeom>
-          <a:ln w="28575">
+          <a:ln w="12700">
+            <a:solidFill>
+              <a:srgbClr val="7030A0"/>
+            </a:solidFill>
             <a:tailEnd type="triangle"/>
           </a:ln>
         </p:spPr>
         <p:style>
           <a:lnRef idx="1">
-            <a:schemeClr val="dk1"/>
+            <a:schemeClr val="accent1"/>
           </a:lnRef>
           <a:fillRef idx="0">
-            <a:schemeClr val="dk1"/>
+            <a:schemeClr val="accent1"/>
           </a:fillRef>
           <a:effectRef idx="0">
-            <a:schemeClr val="dk1"/>
+            <a:schemeClr val="accent1"/>
           </a:effectRef>
           <a:fontRef idx="minor">
             <a:schemeClr val="tx1"/>
           </a:fontRef>
         </p:style>
       </p:cxnSp>
-      <p:sp>
-        <p:nvSpPr>
-          <p:cNvPr id="35" name="文本框 34">
-            <a:extLst>
-              <a:ext uri="{FF2B5EF4-FFF2-40B4-BE49-F238E27FC236}">
-                <a16:creationId xmlns:a16="http://schemas.microsoft.com/office/drawing/2014/main" id="{35D1BD6E-5F94-4F43-8079-6CD33DA8515D}"/>
-              </a:ext>
-            </a:extLst>
-          </p:cNvPr>
-          <p:cNvSpPr txBox="1"/>
-          <p:nvPr/>
-        </p:nvSpPr>
-        <p:spPr>
-          <a:xfrm>
-            <a:off x="2841057" y="4352409"/>
-            <a:ext cx="3537747" cy="369332"/>
-          </a:xfrm>
-          <a:prstGeom prst="rect">
-            <a:avLst/>
-          </a:prstGeom>
-          <a:noFill/>
-        </p:spPr>
-        <p:txBody>
-          <a:bodyPr wrap="square" rtlCol="0">
-            <a:spAutoFit/>
-          </a:bodyPr>
-          <a:lstStyle/>
-          <a:p>
-            <a:r>
-              <a:rPr lang="en-US" altLang="zh-CN" dirty="0"/>
-              <a:t>summary-</a:t>
-            </a:r>
-            <a:r>
-              <a:rPr lang="en-US" altLang="zh-CN" dirty="0" err="1"/>
-              <a:t>chart__ramp__slice</a:t>
-            </a:r>
-            <a:endParaRPr lang="zh-CN" altLang="en-US" sz="1400" dirty="0"/>
-          </a:p>
-        </p:txBody>
-      </p:sp>
       <p:cxnSp>
         <p:nvCxnSpPr>
-          <p:cNvPr id="38" name="直接箭头连接符 37">
-            <a:extLst>
-              <a:ext uri="{FF2B5EF4-FFF2-40B4-BE49-F238E27FC236}">
-                <a16:creationId xmlns:a16="http://schemas.microsoft.com/office/drawing/2014/main" id="{0866A2EB-BEED-4C21-A5CB-7F482C925D7D}"/>
+          <p:cNvPr id="38" name="Straight Arrow Connector 37">
+            <a:extLst>
+              <a:ext uri="{FF2B5EF4-FFF2-40B4-BE49-F238E27FC236}">
+                <a16:creationId xmlns:a16="http://schemas.microsoft.com/office/drawing/2014/main" id="{9A9F6241-AC1E-1B48-8BC2-871CFFE15B1E}"/>
               </a:ext>
             </a:extLst>
           </p:cNvPr>
@@ -3750,78 +4442,41 @@
           <p:nvPr/>
         </p:nvCxnSpPr>
         <p:spPr>
-          <a:xfrm flipH="1" flipV="1">
-            <a:off x="2766975" y="3802472"/>
-            <a:ext cx="754398" cy="95995"/>
+          <a:xfrm>
+            <a:off x="1073665" y="2714969"/>
+            <a:ext cx="437970" cy="0"/>
           </a:xfrm>
           <a:prstGeom prst="straightConnector1">
             <a:avLst/>
           </a:prstGeom>
-          <a:ln w="28575">
+          <a:ln w="12700">
+            <a:solidFill>
+              <a:srgbClr val="0070C0"/>
+            </a:solidFill>
             <a:tailEnd type="triangle"/>
           </a:ln>
         </p:spPr>
         <p:style>
           <a:lnRef idx="1">
-            <a:schemeClr val="dk1"/>
+            <a:schemeClr val="accent1"/>
           </a:lnRef>
           <a:fillRef idx="0">
-            <a:schemeClr val="dk1"/>
+            <a:schemeClr val="accent1"/>
           </a:fillRef>
           <a:effectRef idx="0">
-            <a:schemeClr val="dk1"/>
+            <a:schemeClr val="accent1"/>
           </a:effectRef>
           <a:fontRef idx="minor">
             <a:schemeClr val="tx1"/>
           </a:fontRef>
         </p:style>
       </p:cxnSp>
-      <p:sp>
-        <p:nvSpPr>
-          <p:cNvPr id="39" name="文本框 38">
-            <a:extLst>
-              <a:ext uri="{FF2B5EF4-FFF2-40B4-BE49-F238E27FC236}">
-                <a16:creationId xmlns:a16="http://schemas.microsoft.com/office/drawing/2014/main" id="{C0C87854-AB17-4C5B-8C34-55C86ADFFD5A}"/>
-              </a:ext>
-            </a:extLst>
-          </p:cNvPr>
-          <p:cNvSpPr txBox="1"/>
-          <p:nvPr/>
-        </p:nvSpPr>
-        <p:spPr>
-          <a:xfrm>
-            <a:off x="3472062" y="3713801"/>
-            <a:ext cx="3788273" cy="369332"/>
-          </a:xfrm>
-          <a:prstGeom prst="rect">
-            <a:avLst/>
-          </a:prstGeom>
-          <a:noFill/>
-        </p:spPr>
-        <p:txBody>
-          <a:bodyPr wrap="square" rtlCol="0">
-            <a:spAutoFit/>
-          </a:bodyPr>
-          <a:lstStyle/>
-          <a:p>
-            <a:r>
-              <a:rPr lang="en-US" altLang="zh-CN" dirty="0"/>
-              <a:t>summary-chart__</a:t>
-            </a:r>
-            <a:r>
-              <a:rPr lang="en-US" altLang="zh-CN" dirty="0" err="1"/>
-              <a:t>contrib</a:t>
-            </a:r>
-            <a:endParaRPr lang="zh-CN" altLang="en-US" sz="1600" dirty="0"/>
-          </a:p>
-        </p:txBody>
-      </p:sp>
       <p:cxnSp>
         <p:nvCxnSpPr>
-          <p:cNvPr id="44" name="直接箭头连接符 43">
-            <a:extLst>
-              <a:ext uri="{FF2B5EF4-FFF2-40B4-BE49-F238E27FC236}">
-                <a16:creationId xmlns:a16="http://schemas.microsoft.com/office/drawing/2014/main" id="{5AC745B7-A422-4E0C-A7D4-2AE5E9D2CF29}"/>
+          <p:cNvPr id="43" name="Straight Arrow Connector 42">
+            <a:extLst>
+              <a:ext uri="{FF2B5EF4-FFF2-40B4-BE49-F238E27FC236}">
+                <a16:creationId xmlns:a16="http://schemas.microsoft.com/office/drawing/2014/main" id="{984AD6F2-A33B-8148-AEDA-A8EAEFD7DC95}"/>
               </a:ext>
             </a:extLst>
           </p:cNvPr>
@@ -3831,207 +4486,377 @@
           <p:nvPr/>
         </p:nvCxnSpPr>
         <p:spPr>
-          <a:xfrm flipH="1" flipV="1">
-            <a:off x="10373223" y="4537075"/>
-            <a:ext cx="754398" cy="95995"/>
+          <a:xfrm>
+            <a:off x="1181270" y="4957641"/>
+            <a:ext cx="300327" cy="0"/>
           </a:xfrm>
           <a:prstGeom prst="straightConnector1">
             <a:avLst/>
           </a:prstGeom>
-          <a:ln w="28575">
+          <a:ln w="12700">
+            <a:solidFill>
+              <a:schemeClr val="tx1"/>
+            </a:solidFill>
             <a:tailEnd type="triangle"/>
           </a:ln>
         </p:spPr>
         <p:style>
           <a:lnRef idx="1">
-            <a:schemeClr val="dk1"/>
+            <a:schemeClr val="accent1"/>
           </a:lnRef>
           <a:fillRef idx="0">
-            <a:schemeClr val="dk1"/>
+            <a:schemeClr val="accent1"/>
           </a:fillRef>
           <a:effectRef idx="0">
-            <a:schemeClr val="dk1"/>
+            <a:schemeClr val="accent1"/>
           </a:effectRef>
           <a:fontRef idx="minor">
             <a:schemeClr val="tx1"/>
           </a:fontRef>
         </p:style>
       </p:cxnSp>
-      <p:sp>
-        <p:nvSpPr>
-          <p:cNvPr id="45" name="文本框 44">
-            <a:extLst>
-              <a:ext uri="{FF2B5EF4-FFF2-40B4-BE49-F238E27FC236}">
-                <a16:creationId xmlns:a16="http://schemas.microsoft.com/office/drawing/2014/main" id="{A0A1A4A5-828A-4BF9-94DF-CD28CBD612CF}"/>
-              </a:ext>
-            </a:extLst>
-          </p:cNvPr>
-          <p:cNvSpPr txBox="1"/>
-          <p:nvPr/>
-        </p:nvSpPr>
-        <p:spPr>
-          <a:xfrm>
-            <a:off x="11114306" y="4427216"/>
-            <a:ext cx="550952" cy="369332"/>
-          </a:xfrm>
-          <a:prstGeom prst="rect">
-            <a:avLst/>
-          </a:prstGeom>
-          <a:noFill/>
-        </p:spPr>
-        <p:txBody>
-          <a:bodyPr wrap="square" rtlCol="0">
-            <a:spAutoFit/>
-          </a:bodyPr>
-          <a:lstStyle/>
-          <a:p>
-            <a:r>
-              <a:rPr lang="en-US" altLang="zh-CN" dirty="0"/>
-              <a:t>file</a:t>
-            </a:r>
-            <a:endParaRPr lang="zh-CN" altLang="en-US" sz="1600" dirty="0"/>
-          </a:p>
-        </p:txBody>
-      </p:sp>
       <p:cxnSp>
         <p:nvCxnSpPr>
-          <p:cNvPr id="46" name="直接箭头连接符 45">
-            <a:extLst>
-              <a:ext uri="{FF2B5EF4-FFF2-40B4-BE49-F238E27FC236}">
-                <a16:creationId xmlns:a16="http://schemas.microsoft.com/office/drawing/2014/main" id="{3B381D0C-8056-4A23-A73C-A4BC566D0643}"/>
-              </a:ext>
-            </a:extLst>
-          </p:cNvPr>
-          <p:cNvCxnSpPr>
-            <a:cxnSpLocks/>
-          </p:cNvCxnSpPr>
+          <p:cNvPr id="10" name="Straight Arrow Connector 9">
+            <a:extLst>
+              <a:ext uri="{FF2B5EF4-FFF2-40B4-BE49-F238E27FC236}">
+                <a16:creationId xmlns:a16="http://schemas.microsoft.com/office/drawing/2014/main" id="{B3FA0071-1F3A-2C42-AE98-70438B56D7BF}"/>
+              </a:ext>
+            </a:extLst>
+          </p:cNvPr>
+          <p:cNvCxnSpPr/>
           <p:nvPr/>
         </p:nvCxnSpPr>
         <p:spPr>
-          <a:xfrm flipH="1">
-            <a:off x="8740270" y="2146335"/>
-            <a:ext cx="743681" cy="1"/>
+          <a:xfrm>
+            <a:off x="3771899" y="483476"/>
+            <a:ext cx="0" cy="312842"/>
           </a:xfrm>
           <a:prstGeom prst="straightConnector1">
             <a:avLst/>
           </a:prstGeom>
-          <a:ln w="28575">
+          <a:ln w="12700">
             <a:tailEnd type="triangle"/>
           </a:ln>
         </p:spPr>
         <p:style>
           <a:lnRef idx="1">
-            <a:schemeClr val="dk1"/>
+            <a:schemeClr val="accent1"/>
           </a:lnRef>
           <a:fillRef idx="0">
-            <a:schemeClr val="dk1"/>
+            <a:schemeClr val="accent1"/>
           </a:fillRef>
           <a:effectRef idx="0">
-            <a:schemeClr val="dk1"/>
+            <a:schemeClr val="accent1"/>
           </a:effectRef>
           <a:fontRef idx="minor">
             <a:schemeClr val="tx1"/>
           </a:fontRef>
         </p:style>
       </p:cxnSp>
-      <p:sp>
-        <p:nvSpPr>
-          <p:cNvPr id="47" name="文本框 46">
-            <a:extLst>
-              <a:ext uri="{FF2B5EF4-FFF2-40B4-BE49-F238E27FC236}">
-                <a16:creationId xmlns:a16="http://schemas.microsoft.com/office/drawing/2014/main" id="{8A40C309-DFD1-4333-84EB-9117C609942E}"/>
-              </a:ext>
-            </a:extLst>
-          </p:cNvPr>
-          <p:cNvSpPr txBox="1"/>
-          <p:nvPr/>
-        </p:nvSpPr>
-        <p:spPr>
-          <a:xfrm>
-            <a:off x="9483951" y="1977058"/>
-            <a:ext cx="646691" cy="338554"/>
-          </a:xfrm>
-          <a:prstGeom prst="rect">
-            <a:avLst/>
-          </a:prstGeom>
-          <a:noFill/>
-        </p:spPr>
-        <p:txBody>
-          <a:bodyPr wrap="square" rtlCol="0">
-            <a:spAutoFit/>
-          </a:bodyPr>
-          <a:lstStyle/>
-          <a:p>
-            <a:r>
-              <a:rPr lang="en-US" altLang="zh-CN" sz="1600" dirty="0"/>
-              <a:t>title</a:t>
-            </a:r>
-            <a:endParaRPr lang="zh-CN" altLang="en-US" sz="1600" dirty="0"/>
-          </a:p>
-        </p:txBody>
-      </p:sp>
       <p:cxnSp>
         <p:nvCxnSpPr>
-          <p:cNvPr id="22" name="直接箭头连接符 45">
-            <a:extLst>
-              <a:ext uri="{FF2B5EF4-FFF2-40B4-BE49-F238E27FC236}">
-                <a16:creationId xmlns:a16="http://schemas.microsoft.com/office/drawing/2014/main" id="{6277504A-AF5B-AE43-8282-3FC382F853CA}"/>
-              </a:ext>
-            </a:extLst>
-          </p:cNvPr>
-          <p:cNvCxnSpPr>
-            <a:cxnSpLocks/>
-          </p:cNvCxnSpPr>
+          <p:cNvPr id="50" name="Straight Arrow Connector 49">
+            <a:extLst>
+              <a:ext uri="{FF2B5EF4-FFF2-40B4-BE49-F238E27FC236}">
+                <a16:creationId xmlns:a16="http://schemas.microsoft.com/office/drawing/2014/main" id="{F20E8FC5-C665-144F-B0BB-107E10758C59}"/>
+              </a:ext>
+            </a:extLst>
+          </p:cNvPr>
+          <p:cNvCxnSpPr/>
           <p:nvPr/>
         </p:nvCxnSpPr>
         <p:spPr>
-          <a:xfrm flipH="1">
-            <a:off x="8368429" y="1778237"/>
-            <a:ext cx="743681" cy="1"/>
+          <a:xfrm>
+            <a:off x="8458331" y="465408"/>
+            <a:ext cx="0" cy="312842"/>
           </a:xfrm>
           <a:prstGeom prst="straightConnector1">
             <a:avLst/>
           </a:prstGeom>
-          <a:ln w="28575">
+          <a:ln w="12700">
+            <a:solidFill>
+              <a:schemeClr val="accent2"/>
+            </a:solidFill>
             <a:tailEnd type="triangle"/>
           </a:ln>
         </p:spPr>
         <p:style>
           <a:lnRef idx="1">
-            <a:schemeClr val="dk1"/>
+            <a:schemeClr val="accent1"/>
           </a:lnRef>
           <a:fillRef idx="0">
-            <a:schemeClr val="dk1"/>
+            <a:schemeClr val="accent1"/>
           </a:fillRef>
           <a:effectRef idx="0">
-            <a:schemeClr val="dk1"/>
+            <a:schemeClr val="accent1"/>
           </a:effectRef>
           <a:fontRef idx="minor">
             <a:schemeClr val="tx1"/>
           </a:fontRef>
         </p:style>
       </p:cxnSp>
-      <p:sp>
-        <p:nvSpPr>
-          <p:cNvPr id="23" name="文本框 46">
-            <a:extLst>
-              <a:ext uri="{FF2B5EF4-FFF2-40B4-BE49-F238E27FC236}">
-                <a16:creationId xmlns:a16="http://schemas.microsoft.com/office/drawing/2014/main" id="{E9E7343E-077D-3B43-92A7-61FB56C09A47}"/>
-              </a:ext>
-            </a:extLst>
-          </p:cNvPr>
-          <p:cNvSpPr txBox="1"/>
+      <p:cxnSp>
+        <p:nvCxnSpPr>
+          <p:cNvPr id="55" name="Straight Arrow Connector 54">
+            <a:extLst>
+              <a:ext uri="{FF2B5EF4-FFF2-40B4-BE49-F238E27FC236}">
+                <a16:creationId xmlns:a16="http://schemas.microsoft.com/office/drawing/2014/main" id="{39E59FD8-6ED7-DE42-8608-75F1F9A40F07}"/>
+              </a:ext>
+            </a:extLst>
+          </p:cNvPr>
+          <p:cNvCxnSpPr>
+            <a:cxnSpLocks/>
+          </p:cNvCxnSpPr>
           <p:nvPr/>
-        </p:nvSpPr>
+        </p:nvCxnSpPr>
+        <p:spPr>
+          <a:xfrm flipH="1">
+            <a:off x="8272308" y="1944170"/>
+            <a:ext cx="436773" cy="0"/>
+          </a:xfrm>
+          <a:prstGeom prst="straightConnector1">
+            <a:avLst/>
+          </a:prstGeom>
+          <a:ln w="12700">
+            <a:solidFill>
+              <a:schemeClr val="accent6">
+                <a:lumMod val="75000"/>
+              </a:schemeClr>
+            </a:solidFill>
+            <a:tailEnd type="triangle"/>
+          </a:ln>
+        </p:spPr>
+        <p:style>
+          <a:lnRef idx="1">
+            <a:schemeClr val="accent1"/>
+          </a:lnRef>
+          <a:fillRef idx="0">
+            <a:schemeClr val="accent1"/>
+          </a:fillRef>
+          <a:effectRef idx="0">
+            <a:schemeClr val="accent1"/>
+          </a:effectRef>
+          <a:fontRef idx="minor">
+            <a:schemeClr val="tx1"/>
+          </a:fontRef>
+        </p:style>
+      </p:cxnSp>
+      <p:cxnSp>
+        <p:nvCxnSpPr>
+          <p:cNvPr id="58" name="Straight Arrow Connector 57">
+            <a:extLst>
+              <a:ext uri="{FF2B5EF4-FFF2-40B4-BE49-F238E27FC236}">
+                <a16:creationId xmlns:a16="http://schemas.microsoft.com/office/drawing/2014/main" id="{AFA0DA7C-E4AB-7640-B648-6DBC87E6B30F}"/>
+              </a:ext>
+            </a:extLst>
+          </p:cNvPr>
+          <p:cNvCxnSpPr>
+            <a:cxnSpLocks/>
+          </p:cNvCxnSpPr>
+          <p:nvPr/>
+        </p:nvCxnSpPr>
+        <p:spPr>
+          <a:xfrm flipH="1">
+            <a:off x="8757812" y="3280581"/>
+            <a:ext cx="436773" cy="0"/>
+          </a:xfrm>
+          <a:prstGeom prst="straightConnector1">
+            <a:avLst/>
+          </a:prstGeom>
+          <a:ln w="12700">
+            <a:solidFill>
+              <a:srgbClr val="C00000"/>
+            </a:solidFill>
+            <a:tailEnd type="triangle"/>
+          </a:ln>
+        </p:spPr>
+        <p:style>
+          <a:lnRef idx="1">
+            <a:schemeClr val="accent1"/>
+          </a:lnRef>
+          <a:fillRef idx="0">
+            <a:schemeClr val="accent1"/>
+          </a:fillRef>
+          <a:effectRef idx="0">
+            <a:schemeClr val="accent1"/>
+          </a:effectRef>
+          <a:fontRef idx="minor">
+            <a:schemeClr val="tx1"/>
+          </a:fontRef>
+        </p:style>
+      </p:cxnSp>
+      <p:cxnSp>
+        <p:nvCxnSpPr>
+          <p:cNvPr id="61" name="Straight Arrow Connector 60">
+            <a:extLst>
+              <a:ext uri="{FF2B5EF4-FFF2-40B4-BE49-F238E27FC236}">
+                <a16:creationId xmlns:a16="http://schemas.microsoft.com/office/drawing/2014/main" id="{B3CB679E-8205-8D4E-8605-4305DBA22290}"/>
+              </a:ext>
+            </a:extLst>
+          </p:cNvPr>
+          <p:cNvCxnSpPr>
+            <a:cxnSpLocks/>
+          </p:cNvCxnSpPr>
+          <p:nvPr/>
+        </p:nvCxnSpPr>
+        <p:spPr>
+          <a:xfrm flipH="1" flipV="1">
+            <a:off x="10667719" y="4260483"/>
+            <a:ext cx="318046" cy="4392"/>
+          </a:xfrm>
+          <a:prstGeom prst="straightConnector1">
+            <a:avLst/>
+          </a:prstGeom>
+          <a:ln w="12700">
+            <a:solidFill>
+              <a:schemeClr val="accent4">
+                <a:lumMod val="50000"/>
+              </a:schemeClr>
+            </a:solidFill>
+            <a:tailEnd type="triangle"/>
+          </a:ln>
+        </p:spPr>
+        <p:style>
+          <a:lnRef idx="1">
+            <a:schemeClr val="accent1"/>
+          </a:lnRef>
+          <a:fillRef idx="0">
+            <a:schemeClr val="accent1"/>
+          </a:fillRef>
+          <a:effectRef idx="0">
+            <a:schemeClr val="accent1"/>
+          </a:effectRef>
+          <a:fontRef idx="minor">
+            <a:schemeClr val="tx1"/>
+          </a:fontRef>
+        </p:style>
+      </p:cxnSp>
+      <p:cxnSp>
+        <p:nvCxnSpPr>
+          <p:cNvPr id="63" name="Straight Arrow Connector 62">
+            <a:extLst>
+              <a:ext uri="{FF2B5EF4-FFF2-40B4-BE49-F238E27FC236}">
+                <a16:creationId xmlns:a16="http://schemas.microsoft.com/office/drawing/2014/main" id="{510B956D-D846-A649-B354-69624F72C304}"/>
+              </a:ext>
+            </a:extLst>
+          </p:cNvPr>
+          <p:cNvCxnSpPr>
+            <a:cxnSpLocks/>
+          </p:cNvCxnSpPr>
+          <p:nvPr/>
+        </p:nvCxnSpPr>
         <p:spPr>
           <a:xfrm>
-            <a:off x="9112110" y="1593572"/>
-            <a:ext cx="1111828" cy="338554"/>
+            <a:off x="4284891" y="3125047"/>
+            <a:ext cx="0" cy="429266"/>
+          </a:xfrm>
+          <a:prstGeom prst="straightConnector1">
+            <a:avLst/>
+          </a:prstGeom>
+          <a:ln w="12700">
+            <a:solidFill>
+              <a:schemeClr val="accent4"/>
+            </a:solidFill>
+            <a:tailEnd type="triangle"/>
+          </a:ln>
+        </p:spPr>
+        <p:style>
+          <a:lnRef idx="1">
+            <a:schemeClr val="accent1"/>
+          </a:lnRef>
+          <a:fillRef idx="0">
+            <a:schemeClr val="accent1"/>
+          </a:fillRef>
+          <a:effectRef idx="0">
+            <a:schemeClr val="accent1"/>
+          </a:effectRef>
+          <a:fontRef idx="minor">
+            <a:schemeClr val="tx1"/>
+          </a:fontRef>
+        </p:style>
+      </p:cxnSp>
+      <p:sp>
+        <p:nvSpPr>
+          <p:cNvPr id="39" name="Rectangle 38">
+            <a:extLst>
+              <a:ext uri="{FF2B5EF4-FFF2-40B4-BE49-F238E27FC236}">
+                <a16:creationId xmlns:a16="http://schemas.microsoft.com/office/drawing/2014/main" id="{F1DC792B-BA68-E146-9640-3B9BBA3D37BF}"/>
+              </a:ext>
+            </a:extLst>
+          </p:cNvPr>
+          <p:cNvSpPr/>
+          <p:nvPr/>
+        </p:nvSpPr>
+        <p:spPr>
+          <a:xfrm>
+            <a:off x="6228509" y="3429000"/>
+            <a:ext cx="4354826" cy="1584566"/>
           </a:xfrm>
           <a:prstGeom prst="rect">
             <a:avLst/>
           </a:prstGeom>
           <a:noFill/>
+          <a:ln w="12700" cap="flat" cmpd="sng" algn="ctr">
+            <a:solidFill>
+              <a:schemeClr val="accent2">
+                <a:lumMod val="60000"/>
+                <a:lumOff val="40000"/>
+              </a:schemeClr>
+            </a:solidFill>
+            <a:prstDash val="solid"/>
+            <a:round/>
+            <a:headEnd type="none" w="med" len="med"/>
+            <a:tailEnd type="none" w="med" len="med"/>
+          </a:ln>
+        </p:spPr>
+        <p:style>
+          <a:lnRef idx="0">
+            <a:scrgbClr r="0" g="0" b="0"/>
+          </a:lnRef>
+          <a:fillRef idx="0">
+            <a:scrgbClr r="0" g="0" b="0"/>
+          </a:fillRef>
+          <a:effectRef idx="0">
+            <a:scrgbClr r="0" g="0" b="0"/>
+          </a:effectRef>
+          <a:fontRef idx="minor">
+            <a:schemeClr val="accent6"/>
+          </a:fontRef>
+        </p:style>
+        <p:txBody>
+          <a:bodyPr rtlCol="0" anchor="ctr"/>
+          <a:lstStyle/>
+          <a:p>
+            <a:pPr algn="ctr"/>
+            <a:endParaRPr lang="en-SG"/>
+          </a:p>
+        </p:txBody>
+      </p:sp>
+      <p:sp>
+        <p:nvSpPr>
+          <p:cNvPr id="44" name="文本框 44">
+            <a:extLst>
+              <a:ext uri="{FF2B5EF4-FFF2-40B4-BE49-F238E27FC236}">
+                <a16:creationId xmlns:a16="http://schemas.microsoft.com/office/drawing/2014/main" id="{A899A3DB-A0EF-A042-8009-CDA2C0E753A2}"/>
+              </a:ext>
+            </a:extLst>
+          </p:cNvPr>
+          <p:cNvSpPr txBox="1"/>
+          <p:nvPr/>
+        </p:nvSpPr>
+        <p:spPr>
+          <a:xfrm>
+            <a:off x="10895046" y="3703036"/>
+            <a:ext cx="936735" cy="276999"/>
+          </a:xfrm>
+          <a:prstGeom prst="rect">
+            <a:avLst/>
+          </a:prstGeom>
+          <a:noFill/>
+          <a:ln>
+            <a:noFill/>
+          </a:ln>
         </p:spPr>
         <p:txBody>
           <a:bodyPr wrap="square" rtlCol="0">
@@ -4040,13 +4865,74 @@
           <a:lstStyle/>
           <a:p>
             <a:r>
-              <a:rPr lang="en-US" altLang="zh-CN" sz="1600" dirty="0"/>
-              <a:t>glob filter</a:t>
-            </a:r>
-            <a:endParaRPr lang="zh-CN" altLang="en-US" sz="1600" dirty="0"/>
-          </a:p>
-        </p:txBody>
-      </p:sp>
+              <a:rPr lang="en-US" altLang="zh-CN" sz="1200" dirty="0">
+                <a:solidFill>
+                  <a:schemeClr val="accent2">
+                    <a:lumMod val="60000"/>
+                    <a:lumOff val="40000"/>
+                  </a:schemeClr>
+                </a:solidFill>
+              </a:rPr>
+              <a:t>segment</a:t>
+            </a:r>
+            <a:endParaRPr lang="zh-CN" altLang="en-US" sz="1200" dirty="0">
+              <a:solidFill>
+                <a:schemeClr val="accent2">
+                  <a:lumMod val="60000"/>
+                  <a:lumOff val="40000"/>
+                </a:schemeClr>
+              </a:solidFill>
+            </a:endParaRPr>
+          </a:p>
+        </p:txBody>
+      </p:sp>
+      <p:cxnSp>
+        <p:nvCxnSpPr>
+          <p:cNvPr id="46" name="Straight Arrow Connector 45">
+            <a:extLst>
+              <a:ext uri="{FF2B5EF4-FFF2-40B4-BE49-F238E27FC236}">
+                <a16:creationId xmlns:a16="http://schemas.microsoft.com/office/drawing/2014/main" id="{BE7BD8BB-4C1B-DB44-A439-079C150A181C}"/>
+              </a:ext>
+            </a:extLst>
+          </p:cNvPr>
+          <p:cNvCxnSpPr>
+            <a:cxnSpLocks/>
+          </p:cNvCxnSpPr>
+          <p:nvPr/>
+        </p:nvCxnSpPr>
+        <p:spPr>
+          <a:xfrm flipH="1" flipV="1">
+            <a:off x="10591515" y="3862545"/>
+            <a:ext cx="318046" cy="4392"/>
+          </a:xfrm>
+          <a:prstGeom prst="straightConnector1">
+            <a:avLst/>
+          </a:prstGeom>
+          <a:ln w="12700">
+            <a:solidFill>
+              <a:schemeClr val="accent2">
+                <a:lumMod val="60000"/>
+                <a:lumOff val="40000"/>
+              </a:schemeClr>
+            </a:solidFill>
+            <a:tailEnd type="triangle"/>
+          </a:ln>
+        </p:spPr>
+        <p:style>
+          <a:lnRef idx="1">
+            <a:schemeClr val="accent1"/>
+          </a:lnRef>
+          <a:fillRef idx="0">
+            <a:schemeClr val="accent1"/>
+          </a:fillRef>
+          <a:effectRef idx="0">
+            <a:schemeClr val="accent1"/>
+          </a:effectRef>
+          <a:fontRef idx="minor">
+            <a:schemeClr val="tx1"/>
+          </a:fontRef>
+        </p:style>
+      </p:cxnSp>
     </p:spTree>
     <p:extLst>
       <p:ext uri="{BB962C8B-B14F-4D97-AF65-F5344CB8AC3E}">

</xml_diff>